<commit_message>
fixed a name and a typo
</commit_message>
<xml_diff>
--- a/docs/content/en/cards-en.pptx
+++ b/docs/content/en/cards-en.pptx
@@ -3773,12 +3773,6 @@
               </a:rPr>
               <a:t>:</a:t>
             </a:r>
-            <a:r>
-              <a:rPr lang="fr-FR" sz="800" dirty="0" smtClean="0">
-                <a:latin typeface="Stone Serif" pitchFamily="2" charset="0"/>
-              </a:rPr>
-              <a:t/>
-            </a:r>
             <a:br>
               <a:rPr lang="fr-FR" sz="800" dirty="0" smtClean="0">
                 <a:latin typeface="Stone Serif" pitchFamily="2" charset="0"/>
@@ -4054,12 +4048,6 @@
               </a:rPr>
               <a:t>Do:</a:t>
             </a:r>
-            <a:r>
-              <a:rPr lang="fr-FR" sz="800" dirty="0" smtClean="0">
-                <a:latin typeface="Stone Serif" pitchFamily="2" charset="0"/>
-              </a:rPr>
-              <a:t/>
-            </a:r>
             <a:br>
               <a:rPr lang="fr-FR" sz="800" dirty="0" smtClean="0">
                 <a:latin typeface="Stone Serif" pitchFamily="2" charset="0"/>
@@ -4383,9 +4371,6 @@
               </a:rPr>
               <a:t>, wso2</a:t>
             </a:r>
-            <a:endParaRPr lang="fr-FR" sz="800" dirty="0">
-              <a:latin typeface="Stone Serif" pitchFamily="2" charset="0"/>
-            </a:endParaRPr>
           </a:p>
         </p:txBody>
       </p:sp>
@@ -5190,12 +5175,6 @@
               </a:rPr>
               <a:t>:</a:t>
             </a:r>
-            <a:r>
-              <a:rPr lang="fr-FR" sz="800" dirty="0" smtClean="0">
-                <a:latin typeface="Stone Serif" pitchFamily="2" charset="0"/>
-              </a:rPr>
-              <a:t/>
-            </a:r>
             <a:br>
               <a:rPr lang="fr-FR" sz="800" dirty="0" smtClean="0">
                 <a:latin typeface="Stone Serif" pitchFamily="2" charset="0"/>
@@ -5205,13 +5184,7 @@
               <a:rPr lang="fr-FR" sz="800" dirty="0" smtClean="0">
                 <a:latin typeface="Stone Serif" pitchFamily="2" charset="0"/>
               </a:rPr>
-              <a:t>- licences </a:t>
-            </a:r>
-            <a:r>
-              <a:rPr lang="fr-FR" sz="800" dirty="0" smtClean="0">
-                <a:latin typeface="Stone Serif" pitchFamily="2" charset="0"/>
-              </a:rPr>
-              <a:t>for software services</a:t>
+              <a:t>- licences for software services</a:t>
             </a:r>
             <a:r>
               <a:rPr lang="fr-FR" sz="800" dirty="0">
@@ -5522,12 +5495,6 @@
               </a:rPr>
               <a:t> a culture of sharing data</a:t>
             </a:r>
-            <a:r>
-              <a:rPr lang="fr-FR" sz="800" dirty="0" smtClean="0">
-                <a:latin typeface="Stone Serif" pitchFamily="2" charset="0"/>
-              </a:rPr>
-              <a:t/>
-            </a:r>
             <a:br>
               <a:rPr lang="fr-FR" sz="800" dirty="0" smtClean="0">
                 <a:latin typeface="Stone Serif" pitchFamily="2" charset="0"/>
@@ -5537,127 +5504,115 @@
               <a:rPr lang="fr-FR" sz="800" dirty="0" smtClean="0">
                 <a:latin typeface="Stone Serif" pitchFamily="2" charset="0"/>
               </a:rPr>
-              <a:t>- </a:t>
+              <a:t>- liaison </a:t>
+            </a:r>
+            <a:r>
+              <a:rPr lang="fr-FR" sz="800" dirty="0" err="1" smtClean="0">
+                <a:latin typeface="Stone Serif" pitchFamily="2" charset="0"/>
+              </a:rPr>
+              <a:t>with</a:t>
             </a:r>
             <a:r>
               <a:rPr lang="fr-FR" sz="800" dirty="0" smtClean="0">
                 <a:latin typeface="Stone Serif" pitchFamily="2" charset="0"/>
               </a:rPr>
-              <a:t>liaison </a:t>
+              <a:t> the </a:t>
             </a:r>
             <a:r>
               <a:rPr lang="fr-FR" sz="800" dirty="0" err="1" smtClean="0">
                 <a:latin typeface="Stone Serif" pitchFamily="2" charset="0"/>
               </a:rPr>
+              <a:t>legal</a:t>
+            </a:r>
+            <a:r>
+              <a:rPr lang="fr-FR" sz="800" dirty="0" smtClean="0">
+                <a:latin typeface="Stone Serif" pitchFamily="2" charset="0"/>
+              </a:rPr>
+              <a:t> team to </a:t>
+            </a:r>
+            <a:r>
+              <a:rPr lang="fr-FR" sz="800" dirty="0" err="1" smtClean="0">
+                <a:latin typeface="Stone Serif" pitchFamily="2" charset="0"/>
+              </a:rPr>
+              <a:t>verify</a:t>
+            </a:r>
+            <a:r>
+              <a:rPr lang="fr-FR" sz="800" dirty="0" smtClean="0">
+                <a:latin typeface="Stone Serif" pitchFamily="2" charset="0"/>
+              </a:rPr>
+              <a:t> </a:t>
+            </a:r>
+            <a:r>
+              <a:rPr lang="fr-FR" sz="800" dirty="0" err="1" smtClean="0">
+                <a:latin typeface="Stone Serif" pitchFamily="2" charset="0"/>
+              </a:rPr>
+              <a:t>which</a:t>
+            </a:r>
+            <a:r>
+              <a:rPr lang="fr-FR" sz="800" dirty="0" smtClean="0">
+                <a:latin typeface="Stone Serif" pitchFamily="2" charset="0"/>
+              </a:rPr>
+              <a:t> data </a:t>
+            </a:r>
+            <a:r>
+              <a:rPr lang="fr-FR" sz="800" dirty="0" err="1" smtClean="0">
+                <a:latin typeface="Stone Serif" pitchFamily="2" charset="0"/>
+              </a:rPr>
+              <a:t>can</a:t>
+            </a:r>
+            <a:r>
+              <a:rPr lang="fr-FR" sz="800" dirty="0" smtClean="0">
+                <a:latin typeface="Stone Serif" pitchFamily="2" charset="0"/>
+              </a:rPr>
+              <a:t> </a:t>
+            </a:r>
+            <a:r>
+              <a:rPr lang="fr-FR" sz="800" dirty="0" err="1" smtClean="0">
+                <a:latin typeface="Stone Serif" pitchFamily="2" charset="0"/>
+              </a:rPr>
+              <a:t>be</a:t>
+            </a:r>
+            <a:r>
+              <a:rPr lang="fr-FR" sz="800" dirty="0" smtClean="0">
+                <a:latin typeface="Stone Serif" pitchFamily="2" charset="0"/>
+              </a:rPr>
+              <a:t> </a:t>
+            </a:r>
+            <a:r>
+              <a:rPr lang="fr-FR" sz="800" dirty="0" err="1" smtClean="0">
+                <a:latin typeface="Stone Serif" pitchFamily="2" charset="0"/>
+              </a:rPr>
+              <a:t>shared</a:t>
+            </a:r>
+            <a:r>
+              <a:rPr lang="fr-FR" sz="800" dirty="0" smtClean="0">
+                <a:latin typeface="Stone Serif" pitchFamily="2" charset="0"/>
+              </a:rPr>
+              <a:t> </a:t>
+            </a:r>
+            <a:r>
+              <a:rPr lang="fr-FR" sz="800" dirty="0" err="1" smtClean="0">
+                <a:latin typeface="Stone Serif" pitchFamily="2" charset="0"/>
+              </a:rPr>
               <a:t>with</a:t>
             </a:r>
             <a:r>
               <a:rPr lang="fr-FR" sz="800" dirty="0" smtClean="0">
                 <a:latin typeface="Stone Serif" pitchFamily="2" charset="0"/>
               </a:rPr>
-              <a:t> the </a:t>
+              <a:t> </a:t>
             </a:r>
             <a:r>
               <a:rPr lang="fr-FR" sz="800" dirty="0" err="1" smtClean="0">
                 <a:latin typeface="Stone Serif" pitchFamily="2" charset="0"/>
               </a:rPr>
-              <a:t>legal</a:t>
+              <a:t>third</a:t>
             </a:r>
             <a:r>
               <a:rPr lang="fr-FR" sz="800" dirty="0" smtClean="0">
                 <a:latin typeface="Stone Serif" pitchFamily="2" charset="0"/>
               </a:rPr>
-              <a:t> team to </a:t>
-            </a:r>
-            <a:r>
-              <a:rPr lang="fr-FR" sz="800" dirty="0" err="1" smtClean="0">
-                <a:latin typeface="Stone Serif" pitchFamily="2" charset="0"/>
-              </a:rPr>
-              <a:t>verify</a:t>
-            </a:r>
-            <a:r>
-              <a:rPr lang="fr-FR" sz="800" dirty="0" smtClean="0">
-                <a:latin typeface="Stone Serif" pitchFamily="2" charset="0"/>
-              </a:rPr>
-              <a:t> </a:t>
-            </a:r>
-            <a:r>
-              <a:rPr lang="fr-FR" sz="800" dirty="0" err="1" smtClean="0">
-                <a:latin typeface="Stone Serif" pitchFamily="2" charset="0"/>
-              </a:rPr>
-              <a:t>which</a:t>
-            </a:r>
-            <a:r>
-              <a:rPr lang="fr-FR" sz="800" dirty="0" smtClean="0">
-                <a:latin typeface="Stone Serif" pitchFamily="2" charset="0"/>
-              </a:rPr>
-              <a:t> data </a:t>
-            </a:r>
-            <a:r>
-              <a:rPr lang="fr-FR" sz="800" dirty="0" err="1" smtClean="0">
-                <a:latin typeface="Stone Serif" pitchFamily="2" charset="0"/>
-              </a:rPr>
-              <a:t>can</a:t>
-            </a:r>
-            <a:r>
-              <a:rPr lang="fr-FR" sz="800" dirty="0" smtClean="0">
-                <a:latin typeface="Stone Serif" pitchFamily="2" charset="0"/>
-              </a:rPr>
-              <a:t> </a:t>
-            </a:r>
-            <a:r>
-              <a:rPr lang="fr-FR" sz="800" dirty="0" err="1" smtClean="0">
-                <a:latin typeface="Stone Serif" pitchFamily="2" charset="0"/>
-              </a:rPr>
-              <a:t>be</a:t>
-            </a:r>
-            <a:r>
-              <a:rPr lang="fr-FR" sz="800" dirty="0" smtClean="0">
-                <a:latin typeface="Stone Serif" pitchFamily="2" charset="0"/>
-              </a:rPr>
-              <a:t> </a:t>
-            </a:r>
-            <a:r>
-              <a:rPr lang="fr-FR" sz="800" dirty="0" err="1" smtClean="0">
-                <a:latin typeface="Stone Serif" pitchFamily="2" charset="0"/>
-              </a:rPr>
-              <a:t>shared</a:t>
-            </a:r>
-            <a:r>
-              <a:rPr lang="fr-FR" sz="800" dirty="0" smtClean="0">
-                <a:latin typeface="Stone Serif" pitchFamily="2" charset="0"/>
-              </a:rPr>
-              <a:t> </a:t>
-            </a:r>
-            <a:r>
-              <a:rPr lang="fr-FR" sz="800" dirty="0" err="1" smtClean="0">
-                <a:latin typeface="Stone Serif" pitchFamily="2" charset="0"/>
-              </a:rPr>
-              <a:t>with</a:t>
-            </a:r>
-            <a:r>
-              <a:rPr lang="fr-FR" sz="800" dirty="0" smtClean="0">
-                <a:latin typeface="Stone Serif" pitchFamily="2" charset="0"/>
-              </a:rPr>
-              <a:t> </a:t>
-            </a:r>
-            <a:r>
-              <a:rPr lang="fr-FR" sz="800" dirty="0" err="1" smtClean="0">
-                <a:latin typeface="Stone Serif" pitchFamily="2" charset="0"/>
-              </a:rPr>
-              <a:t>third</a:t>
-            </a:r>
-            <a:r>
-              <a:rPr lang="fr-FR" sz="800" dirty="0" smtClean="0">
-                <a:latin typeface="Stone Serif" pitchFamily="2" charset="0"/>
-              </a:rPr>
               <a:t> parties</a:t>
-            </a:r>
-            <a:r>
-              <a:rPr lang="fr-FR" sz="800" dirty="0" smtClean="0">
-                <a:latin typeface="Stone Serif" pitchFamily="2" charset="0"/>
-              </a:rPr>
-              <a:t/>
             </a:r>
             <a:br>
               <a:rPr lang="fr-FR" sz="800" dirty="0" smtClean="0">
@@ -6485,13 +6440,7 @@
               <a:rPr lang="fr-FR" sz="800" dirty="0" smtClean="0">
                 <a:latin typeface="Stone Serif" pitchFamily="2" charset="0"/>
               </a:rPr>
-              <a:t> </a:t>
-            </a:r>
-            <a:r>
-              <a:rPr lang="fr-FR" sz="800" dirty="0" smtClean="0">
-                <a:latin typeface="Stone Serif" pitchFamily="2" charset="0"/>
-              </a:rPr>
-              <a:t>–</a:t>
+              <a:t> –</a:t>
             </a:r>
             <a:r>
               <a:rPr lang="en-US" sz="800" dirty="0">
@@ -7742,9 +7691,6 @@
               </a:rPr>
               <a:t>?</a:t>
             </a:r>
-            <a:endParaRPr lang="fr-FR" sz="1100" dirty="0">
-              <a:latin typeface="Stone Serif" pitchFamily="2" charset="0"/>
-            </a:endParaRPr>
           </a:p>
         </p:txBody>
       </p:sp>
@@ -8859,13 +8805,7 @@
               <a:rPr lang="en-US" sz="800" dirty="0" smtClean="0">
                 <a:latin typeface="Stone Serif" pitchFamily="2" charset="0"/>
               </a:rPr>
-              <a:t>a</a:t>
-            </a:r>
-            <a:r>
-              <a:rPr lang="en-US" sz="800" dirty="0" smtClean="0">
-                <a:latin typeface="Stone Serif" pitchFamily="2" charset="0"/>
-              </a:rPr>
-              <a:t>nalyzes Twitter networks </a:t>
+              <a:t>analyzes Twitter networks </a:t>
             </a:r>
             <a:r>
               <a:rPr lang="en-US" sz="800" dirty="0">
@@ -9598,13 +9538,7 @@
               <a:rPr lang="en-US" sz="700" dirty="0" smtClean="0">
                 <a:latin typeface="Stone Serif" pitchFamily="2" charset="0"/>
               </a:rPr>
-              <a:t>- treat AI results as ground truth. AI has biases which need an interdisciplinar</a:t>
-            </a:r>
-            <a:r>
-              <a:rPr lang="en-US" sz="700" dirty="0" smtClean="0">
-                <a:latin typeface="Stone Serif" pitchFamily="2" charset="0"/>
-              </a:rPr>
-              <a:t>y team to identify and </a:t>
+              <a:t>- treat AI results as ground truth. AI has biases which need an interdisciplinary team to identify and </a:t>
             </a:r>
             <a:r>
               <a:rPr lang="en-US" sz="700" dirty="0" err="1" smtClean="0">
@@ -11001,12 +10935,6 @@
               </a:rPr>
               <a:t>:</a:t>
             </a:r>
-            <a:r>
-              <a:rPr lang="fr-FR" sz="800" dirty="0" smtClean="0">
-                <a:latin typeface="Stone Serif" pitchFamily="2" charset="0"/>
-              </a:rPr>
-              <a:t/>
-            </a:r>
             <a:br>
               <a:rPr lang="fr-FR" sz="800" dirty="0" smtClean="0">
                 <a:latin typeface="Stone Serif" pitchFamily="2" charset="0"/>
@@ -11065,9 +10993,6 @@
               </a:rPr>
               <a:t> and maintenance</a:t>
             </a:r>
-            <a:endParaRPr lang="fr-FR" sz="800" dirty="0">
-              <a:latin typeface="Stone Serif" pitchFamily="2" charset="0"/>
-            </a:endParaRPr>
           </a:p>
         </p:txBody>
       </p:sp>
@@ -13172,12 +13097,6 @@
               </a:rPr>
               <a:t>Do</a:t>
             </a:r>
-            <a:r>
-              <a:rPr lang="fr-FR" sz="700" dirty="0" smtClean="0">
-                <a:latin typeface="Stone Serif" pitchFamily="2" charset="0"/>
-              </a:rPr>
-              <a:t/>
-            </a:r>
             <a:br>
               <a:rPr lang="fr-FR" sz="700" dirty="0" smtClean="0">
                 <a:latin typeface="Stone Serif" pitchFamily="2" charset="0"/>
@@ -13496,13 +13415,7 @@
               <a:rPr lang="fr-FR" sz="800" dirty="0" smtClean="0">
                 <a:latin typeface="Stone Serif" pitchFamily="2" charset="0"/>
               </a:rPr>
-              <a:t>+ </a:t>
-            </a:r>
-            <a:r>
-              <a:rPr lang="fr-FR" sz="800" dirty="0" smtClean="0">
-                <a:latin typeface="Stone Serif" pitchFamily="2" charset="0"/>
-              </a:rPr>
-              <a:t>consulting groups</a:t>
+              <a:t>+ consulting groups</a:t>
             </a:r>
             <a:endParaRPr lang="fr-FR" sz="800" dirty="0">
               <a:latin typeface="Stone Serif" pitchFamily="2" charset="0"/>
@@ -16437,12 +16350,6 @@
               </a:rPr>
               <a:t>Do</a:t>
             </a:r>
-            <a:r>
-              <a:rPr lang="fr-FR" sz="700" dirty="0" smtClean="0">
-                <a:latin typeface="Stone Serif" pitchFamily="2" charset="0"/>
-              </a:rPr>
-              <a:t/>
-            </a:r>
             <a:br>
               <a:rPr lang="fr-FR" sz="700" dirty="0" smtClean="0">
                 <a:latin typeface="Stone Serif" pitchFamily="2" charset="0"/>
@@ -17441,9 +17348,6 @@
               </a:rPr>
               <a:t>?</a:t>
             </a:r>
-            <a:endParaRPr lang="fr-FR" sz="1100" dirty="0">
-              <a:latin typeface="Stone Serif" pitchFamily="2" charset="0"/>
-            </a:endParaRPr>
           </a:p>
         </p:txBody>
       </p:sp>
@@ -17488,9 +17392,6 @@
               </a:rPr>
               <a:t> business impact?</a:t>
             </a:r>
-            <a:endParaRPr lang="fr-FR" sz="1100" dirty="0">
-              <a:latin typeface="Stone Serif" pitchFamily="2" charset="0"/>
-            </a:endParaRPr>
           </a:p>
         </p:txBody>
       </p:sp>
@@ -17788,13 +17689,7 @@
               <a:rPr lang="fr-FR" sz="800" dirty="0" smtClean="0">
                 <a:latin typeface="Stone Serif" pitchFamily="2" charset="0"/>
               </a:rPr>
-              <a:t> (Tableau</a:t>
-            </a:r>
-            <a:r>
-              <a:rPr lang="fr-FR" sz="800" dirty="0" smtClean="0">
-                <a:latin typeface="Stone Serif" pitchFamily="2" charset="0"/>
-              </a:rPr>
-              <a:t>, </a:t>
+              <a:t> (Tableau, </a:t>
             </a:r>
             <a:r>
               <a:rPr lang="fr-FR" sz="800" dirty="0" err="1" smtClean="0">
@@ -18188,12 +18083,6 @@
               </a:rPr>
               <a:t>visualisingdata.com)</a:t>
             </a:r>
-            <a:r>
-              <a:rPr lang="fr-FR" sz="800" dirty="0" smtClean="0">
-                <a:latin typeface="Stone Serif" pitchFamily="2" charset="0"/>
-              </a:rPr>
-              <a:t/>
-            </a:r>
             <a:br>
               <a:rPr lang="fr-FR" sz="800" dirty="0" smtClean="0">
                 <a:latin typeface="Stone Serif" pitchFamily="2" charset="0"/>
@@ -18522,10 +18411,22 @@
               <a:t>Cairo</a:t>
             </a:r>
             <a:r>
+              <a:rPr lang="fr-FR" sz="700">
+                <a:latin typeface="Stone Serif" pitchFamily="2" charset="0"/>
+              </a:rPr>
+              <a:t>,</a:t>
+            </a:r>
+            <a:r>
+              <a:rPr lang="fr-FR" sz="700" smtClean="0">
+                <a:latin typeface="Stone Serif" pitchFamily="2" charset="0"/>
+              </a:rPr>
+              <a:t> </a:t>
+            </a:r>
+            <a:r>
               <a:rPr lang="fr-FR" sz="700" dirty="0" smtClean="0">
                 <a:latin typeface="Stone Serif" pitchFamily="2" charset="0"/>
               </a:rPr>
-              <a:t>., Kim Rees</a:t>
+              <a:t>Kim Rees</a:t>
             </a:r>
             <a:endParaRPr lang="fr-FR" sz="700" dirty="0">
               <a:latin typeface="Stone Serif" pitchFamily="2" charset="0"/>
@@ -18788,14 +18689,7 @@
                 <a:latin typeface="Stone Serif" pitchFamily="2" charset="0"/>
                 <a:hlinkClick r:id="rId2"/>
               </a:rPr>
-              <a:t>http://</a:t>
-            </a:r>
-            <a:r>
-              <a:rPr lang="fr-FR" sz="800" b="1" dirty="0" smtClean="0">
-                <a:latin typeface="Stone Serif" pitchFamily="2" charset="0"/>
-                <a:hlinkClick r:id="rId2"/>
-              </a:rPr>
-              <a:t>cartescolaire.paris</a:t>
+              <a:t>http://cartescolaire.paris</a:t>
             </a:r>
             <a:r>
               <a:rPr lang="fr-FR" sz="800" b="1" dirty="0" smtClean="0">
@@ -19805,12 +19699,6 @@
               </a:rPr>
               <a:t>Do</a:t>
             </a:r>
-            <a:r>
-              <a:rPr lang="fr-FR" sz="700" dirty="0" smtClean="0">
-                <a:latin typeface="Stone Serif" pitchFamily="2" charset="0"/>
-              </a:rPr>
-              <a:t/>
-            </a:r>
             <a:br>
               <a:rPr lang="fr-FR" sz="700" dirty="0" smtClean="0">
                 <a:latin typeface="Stone Serif" pitchFamily="2" charset="0"/>
@@ -20047,13 +19935,7 @@
               <a:rPr lang="fr-FR" sz="800" dirty="0" smtClean="0">
                 <a:latin typeface="Stone Serif" pitchFamily="2" charset="0"/>
               </a:rPr>
-              <a:t> Technologies, OVH</a:t>
-            </a:r>
-            <a:r>
-              <a:rPr lang="fr-FR" sz="800" dirty="0" smtClean="0">
-                <a:latin typeface="Stone Serif" pitchFamily="2" charset="0"/>
-              </a:rPr>
-              <a:t>, </a:t>
+              <a:t> Technologies, OVH, </a:t>
             </a:r>
             <a:r>
               <a:rPr lang="fr-FR" sz="800" dirty="0" err="1" smtClean="0">
@@ -20645,9 +20527,6 @@
               </a:rPr>
               <a:t>?</a:t>
             </a:r>
-            <a:endParaRPr lang="fr-FR" sz="1100" dirty="0">
-              <a:latin typeface="Stone Serif" pitchFamily="2" charset="0"/>
-            </a:endParaRPr>
           </a:p>
         </p:txBody>
       </p:sp>
@@ -20692,9 +20571,6 @@
               </a:rPr>
               <a:t> business impact?</a:t>
             </a:r>
-            <a:endParaRPr lang="fr-FR" sz="1100" dirty="0">
-              <a:latin typeface="Stone Serif" pitchFamily="2" charset="0"/>
-            </a:endParaRPr>
           </a:p>
         </p:txBody>
       </p:sp>
@@ -20912,12 +20788,6 @@
                 <a:latin typeface="Stone Serif" pitchFamily="2" charset="0"/>
               </a:rPr>
               <a:t>:</a:t>
-            </a:r>
-            <a:r>
-              <a:rPr lang="fr-FR" sz="800" dirty="0" smtClean="0">
-                <a:latin typeface="Stone Serif" pitchFamily="2" charset="0"/>
-              </a:rPr>
-              <a:t/>
             </a:r>
             <a:br>
               <a:rPr lang="fr-FR" sz="800" dirty="0" smtClean="0">
@@ -22684,12 +22554,6 @@
               </a:rPr>
               <a:t>Do</a:t>
             </a:r>
-            <a:r>
-              <a:rPr lang="fr-FR" sz="700" dirty="0" smtClean="0">
-                <a:latin typeface="Stone Serif" pitchFamily="2" charset="0"/>
-              </a:rPr>
-              <a:t/>
-            </a:r>
             <a:br>
               <a:rPr lang="fr-FR" sz="700" dirty="0" smtClean="0">
                 <a:latin typeface="Stone Serif" pitchFamily="2" charset="0"/>
@@ -23653,9 +23517,6 @@
               </a:rPr>
               <a:t>?</a:t>
             </a:r>
-            <a:endParaRPr lang="fr-FR" sz="1100" dirty="0">
-              <a:latin typeface="Stone Serif" pitchFamily="2" charset="0"/>
-            </a:endParaRPr>
           </a:p>
         </p:txBody>
       </p:sp>
@@ -23700,9 +23561,6 @@
               </a:rPr>
               <a:t> business impact?</a:t>
             </a:r>
-            <a:endParaRPr lang="fr-FR" sz="1100" dirty="0">
-              <a:latin typeface="Stone Serif" pitchFamily="2" charset="0"/>
-            </a:endParaRPr>
           </a:p>
         </p:txBody>
       </p:sp>
@@ -24001,29 +23859,20 @@
               <a:rPr lang="fr-FR" sz="800" dirty="0" smtClean="0">
                 <a:latin typeface="Stone Serif" pitchFamily="2" charset="0"/>
               </a:rPr>
-              <a:t>- </a:t>
+              <a:t>- training </a:t>
+            </a:r>
+            <a:r>
+              <a:rPr lang="fr-FR" sz="800" dirty="0" err="1" smtClean="0">
+                <a:latin typeface="Stone Serif" pitchFamily="2" charset="0"/>
+              </a:rPr>
+              <a:t>costs</a:t>
             </a:r>
             <a:r>
               <a:rPr lang="fr-FR" sz="800" dirty="0" smtClean="0">
                 <a:latin typeface="Stone Serif" pitchFamily="2" charset="0"/>
               </a:rPr>
-              <a:t>training </a:t>
-            </a:r>
-            <a:r>
-              <a:rPr lang="fr-FR" sz="800" dirty="0" err="1" smtClean="0">
-                <a:latin typeface="Stone Serif" pitchFamily="2" charset="0"/>
-              </a:rPr>
-              <a:t>costs</a:t>
-            </a:r>
-            <a:r>
-              <a:rPr lang="fr-FR" sz="800" dirty="0" smtClean="0">
-                <a:latin typeface="Stone Serif" pitchFamily="2" charset="0"/>
-              </a:rPr>
               <a:t> for staff.</a:t>
             </a:r>
-            <a:endParaRPr lang="fr-FR" sz="800" dirty="0" smtClean="0">
-              <a:latin typeface="Stone Serif" pitchFamily="2" charset="0"/>
-            </a:endParaRPr>
           </a:p>
         </p:txBody>
       </p:sp>
@@ -24584,7 +24433,19 @@
               <a:rPr lang="fr-FR" sz="700" dirty="0">
                 <a:latin typeface="Stone Serif" pitchFamily="2" charset="0"/>
               </a:rPr>
-              <a:t>Quadrature du Net, Tarik </a:t>
+              <a:t>Quadrature du Net, </a:t>
+            </a:r>
+            <a:r>
+              <a:rPr lang="fr-FR" sz="700" dirty="0" err="1" smtClean="0">
+                <a:latin typeface="Stone Serif" pitchFamily="2" charset="0"/>
+              </a:rPr>
+              <a:t>Tariq</a:t>
+            </a:r>
+            <a:r>
+              <a:rPr lang="fr-FR" sz="700" dirty="0" smtClean="0">
+                <a:latin typeface="Stone Serif" pitchFamily="2" charset="0"/>
+              </a:rPr>
+              <a:t> </a:t>
             </a:r>
             <a:r>
               <a:rPr lang="fr-FR" sz="700" dirty="0" err="1">
@@ -25825,47 +25686,32 @@
               <a:rPr lang="fr-FR" sz="700" dirty="0" smtClean="0">
                 <a:latin typeface="Stone Serif" pitchFamily="2" charset="0"/>
               </a:rPr>
-              <a:t> to the «</a:t>
+              <a:t> to the « Internet of Shit » : gadget applications, </a:t>
+            </a:r>
+            <a:r>
+              <a:rPr lang="fr-FR" sz="700" dirty="0" err="1" smtClean="0">
+                <a:latin typeface="Stone Serif" pitchFamily="2" charset="0"/>
+              </a:rPr>
+              <a:t>badly</a:t>
             </a:r>
             <a:r>
               <a:rPr lang="fr-FR" sz="700" dirty="0" smtClean="0">
                 <a:latin typeface="Stone Serif" pitchFamily="2" charset="0"/>
               </a:rPr>
-              <a:t> Internet of Shit » : </a:t>
+              <a:t> </a:t>
+            </a:r>
+            <a:r>
+              <a:rPr lang="fr-FR" sz="700" dirty="0" err="1" smtClean="0">
+                <a:latin typeface="Stone Serif" pitchFamily="2" charset="0"/>
+              </a:rPr>
+              <a:t>secured</a:t>
             </a:r>
             <a:r>
               <a:rPr lang="fr-FR" sz="700" dirty="0" smtClean="0">
                 <a:latin typeface="Stone Serif" pitchFamily="2" charset="0"/>
               </a:rPr>
-              <a:t>gadget applications, </a:t>
-            </a:r>
-            <a:r>
-              <a:rPr lang="fr-FR" sz="700" dirty="0" err="1" smtClean="0">
-                <a:latin typeface="Stone Serif" pitchFamily="2" charset="0"/>
-              </a:rPr>
-              <a:t>badly</a:t>
-            </a:r>
-            <a:r>
-              <a:rPr lang="fr-FR" sz="700" dirty="0" smtClean="0">
-                <a:latin typeface="Stone Serif" pitchFamily="2" charset="0"/>
-              </a:rPr>
-              <a:t> </a:t>
-            </a:r>
-            <a:r>
-              <a:rPr lang="fr-FR" sz="700" dirty="0" err="1" smtClean="0">
-                <a:latin typeface="Stone Serif" pitchFamily="2" charset="0"/>
-              </a:rPr>
-              <a:t>secured</a:t>
-            </a:r>
-            <a:r>
-              <a:rPr lang="fr-FR" sz="700" dirty="0" smtClean="0">
-                <a:latin typeface="Stone Serif" pitchFamily="2" charset="0"/>
-              </a:rPr>
               <a:t>.</a:t>
             </a:r>
-            <a:endParaRPr lang="fr-FR" sz="700" dirty="0" smtClean="0">
-              <a:latin typeface="Stone Serif" pitchFamily="2" charset="0"/>
-            </a:endParaRPr>
           </a:p>
         </p:txBody>
       </p:sp>
@@ -26071,12 +25917,6 @@
                 <a:latin typeface="Stone Serif" pitchFamily="2" charset="0"/>
               </a:rPr>
               <a:t>Do</a:t>
-            </a:r>
-            <a:r>
-              <a:rPr lang="fr-FR" sz="700" dirty="0" smtClean="0">
-                <a:latin typeface="Stone Serif" pitchFamily="2" charset="0"/>
-              </a:rPr>
-              <a:t/>
             </a:r>
             <a:br>
               <a:rPr lang="fr-FR" sz="700" dirty="0" smtClean="0">
@@ -26338,13 +26178,7 @@
               <a:rPr lang="fr-FR" sz="700" dirty="0" smtClean="0">
                 <a:latin typeface="Stone Serif" pitchFamily="2" charset="0"/>
               </a:rPr>
-              <a:t>, Orange, </a:t>
-            </a:r>
-            <a:r>
-              <a:rPr lang="fr-FR" sz="700" dirty="0" smtClean="0">
-                <a:latin typeface="Stone Serif" pitchFamily="2" charset="0"/>
-              </a:rPr>
-              <a:t>PTC, 3DS, </a:t>
+              <a:t>, Orange, PTC, 3DS, </a:t>
             </a:r>
             <a:r>
               <a:rPr lang="fr-FR" sz="700" dirty="0" err="1" smtClean="0">
@@ -26976,9 +26810,6 @@
               </a:rPr>
               <a:t>?</a:t>
             </a:r>
-            <a:endParaRPr lang="fr-FR" sz="1100" dirty="0">
-              <a:latin typeface="Stone Serif" pitchFamily="2" charset="0"/>
-            </a:endParaRPr>
           </a:p>
         </p:txBody>
       </p:sp>
@@ -27023,9 +26854,6 @@
               </a:rPr>
               <a:t> business impact?</a:t>
             </a:r>
-            <a:endParaRPr lang="fr-FR" sz="1100" dirty="0">
-              <a:latin typeface="Stone Serif" pitchFamily="2" charset="0"/>
-            </a:endParaRPr>
           </a:p>
         </p:txBody>
       </p:sp>
@@ -27244,12 +27072,6 @@
               </a:rPr>
               <a:t>:</a:t>
             </a:r>
-            <a:r>
-              <a:rPr lang="fr-FR" sz="800" dirty="0" smtClean="0">
-                <a:latin typeface="Stone Serif" pitchFamily="2" charset="0"/>
-              </a:rPr>
-              <a:t/>
-            </a:r>
             <a:br>
               <a:rPr lang="fr-FR" sz="800" dirty="0" smtClean="0">
                 <a:latin typeface="Stone Serif" pitchFamily="2" charset="0"/>
@@ -27259,13 +27081,7 @@
               <a:rPr lang="fr-FR" sz="800" dirty="0" smtClean="0">
                 <a:latin typeface="Stone Serif" pitchFamily="2" charset="0"/>
               </a:rPr>
-              <a:t>- </a:t>
-            </a:r>
-            <a:r>
-              <a:rPr lang="fr-FR" sz="800" dirty="0" smtClean="0">
-                <a:latin typeface="Stone Serif" pitchFamily="2" charset="0"/>
-              </a:rPr>
-              <a:t>R&amp;D</a:t>
+              <a:t>- R&amp;D</a:t>
             </a:r>
             <a:r>
               <a:rPr lang="fr-FR" sz="800" dirty="0">
@@ -27600,9 +27416,6 @@
               </a:rPr>
               <a:t>?</a:t>
             </a:r>
-            <a:endParaRPr lang="fr-FR" sz="800" dirty="0" smtClean="0">
-              <a:latin typeface="Stone Serif" pitchFamily="2" charset="0"/>
-            </a:endParaRPr>
           </a:p>
         </p:txBody>
       </p:sp>
@@ -29928,9 +29741,6 @@
               </a:rPr>
               <a:t>?</a:t>
             </a:r>
-            <a:endParaRPr lang="fr-FR" sz="1100" dirty="0">
-              <a:latin typeface="Stone Serif" pitchFamily="2" charset="0"/>
-            </a:endParaRPr>
           </a:p>
         </p:txBody>
       </p:sp>
@@ -29975,9 +29785,6 @@
               </a:rPr>
               <a:t> business impact?</a:t>
             </a:r>
-            <a:endParaRPr lang="fr-FR" sz="1100" dirty="0">
-              <a:latin typeface="Stone Serif" pitchFamily="2" charset="0"/>
-            </a:endParaRPr>
           </a:p>
         </p:txBody>
       </p:sp>
@@ -32158,9 +31965,6 @@
               </a:rPr>
               <a:t>?</a:t>
             </a:r>
-            <a:endParaRPr lang="fr-FR" sz="1100" dirty="0">
-              <a:latin typeface="Stone Serif" pitchFamily="2" charset="0"/>
-            </a:endParaRPr>
           </a:p>
         </p:txBody>
       </p:sp>
@@ -32205,9 +32009,6 @@
               </a:rPr>
               <a:t> business impact?</a:t>
             </a:r>
-            <a:endParaRPr lang="fr-FR" sz="1100" dirty="0">
-              <a:latin typeface="Stone Serif" pitchFamily="2" charset="0"/>
-            </a:endParaRPr>
           </a:p>
         </p:txBody>
       </p:sp>
@@ -33278,54 +33079,48 @@
               <a:rPr lang="fr-FR" sz="800" dirty="0" smtClean="0">
                 <a:latin typeface="Stone Serif" pitchFamily="2" charset="0"/>
               </a:rPr>
+              <a:t> for </a:t>
+            </a:r>
+            <a:r>
+              <a:rPr lang="fr-FR" sz="800" dirty="0" err="1" smtClean="0">
+                <a:latin typeface="Stone Serif" pitchFamily="2" charset="0"/>
+              </a:rPr>
+              <a:t>legal</a:t>
+            </a:r>
+            <a:r>
+              <a:rPr lang="fr-FR" sz="800" dirty="0" smtClean="0">
+                <a:latin typeface="Stone Serif" pitchFamily="2" charset="0"/>
+              </a:rPr>
+              <a:t> documents, to </a:t>
+            </a:r>
+            <a:r>
+              <a:rPr lang="fr-FR" sz="800" dirty="0" err="1" smtClean="0">
+                <a:latin typeface="Stone Serif" pitchFamily="2" charset="0"/>
+              </a:rPr>
+              <a:t>save</a:t>
+            </a:r>
+            <a:r>
+              <a:rPr lang="fr-FR" sz="800" dirty="0" smtClean="0">
+                <a:latin typeface="Stone Serif" pitchFamily="2" charset="0"/>
+              </a:rPr>
+              <a:t> time on </a:t>
+            </a:r>
+            <a:r>
+              <a:rPr lang="fr-FR" sz="800" dirty="0" err="1" smtClean="0">
+                <a:latin typeface="Stone Serif" pitchFamily="2" charset="0"/>
+              </a:rPr>
+              <a:t>contract</a:t>
+            </a:r>
+            <a:r>
+              <a:rPr lang="fr-FR" sz="800" dirty="0" smtClean="0">
+                <a:latin typeface="Stone Serif" pitchFamily="2" charset="0"/>
+              </a:rPr>
               <a:t> </a:t>
             </a:r>
             <a:r>
-              <a:rPr lang="fr-FR" sz="800" dirty="0" smtClean="0">
-                <a:latin typeface="Stone Serif" pitchFamily="2" charset="0"/>
-              </a:rPr>
-              <a:t>for </a:t>
-            </a:r>
-            <a:r>
               <a:rPr lang="fr-FR" sz="800" dirty="0" err="1" smtClean="0">
                 <a:latin typeface="Stone Serif" pitchFamily="2" charset="0"/>
               </a:rPr>
-              <a:t>legal</a:t>
-            </a:r>
-            <a:r>
-              <a:rPr lang="fr-FR" sz="800" dirty="0" smtClean="0">
-                <a:latin typeface="Stone Serif" pitchFamily="2" charset="0"/>
-              </a:rPr>
-              <a:t> documents, to </a:t>
-            </a:r>
-            <a:r>
-              <a:rPr lang="fr-FR" sz="800" dirty="0" err="1" smtClean="0">
-                <a:latin typeface="Stone Serif" pitchFamily="2" charset="0"/>
-              </a:rPr>
-              <a:t>save</a:t>
-            </a:r>
-            <a:r>
-              <a:rPr lang="fr-FR" sz="800" dirty="0" smtClean="0">
-                <a:latin typeface="Stone Serif" pitchFamily="2" charset="0"/>
-              </a:rPr>
-              <a:t> time on </a:t>
-            </a:r>
-            <a:r>
-              <a:rPr lang="fr-FR" sz="800" dirty="0" err="1" smtClean="0">
-                <a:latin typeface="Stone Serif" pitchFamily="2" charset="0"/>
-              </a:rPr>
-              <a:t>contract</a:t>
-            </a:r>
-            <a:r>
-              <a:rPr lang="fr-FR" sz="800" dirty="0" smtClean="0">
-                <a:latin typeface="Stone Serif" pitchFamily="2" charset="0"/>
-              </a:rPr>
-              <a:t> </a:t>
-            </a:r>
-            <a:r>
-              <a:rPr lang="fr-FR" sz="800" dirty="0" err="1" smtClean="0">
-                <a:latin typeface="Stone Serif" pitchFamily="2" charset="0"/>
-              </a:rPr>
               <a:t>writing</a:t>
             </a:r>
             <a:r>
@@ -33334,9 +33129,6 @@
               </a:rPr>
               <a:t>.</a:t>
             </a:r>
-            <a:endParaRPr lang="fr-FR" sz="800" dirty="0">
-              <a:latin typeface="Stone Serif" pitchFamily="2" charset="0"/>
-            </a:endParaRPr>
           </a:p>
         </p:txBody>
       </p:sp>

</xml_diff>

<commit_message>
added blockchain memo car in EN and FR
</commit_message>
<xml_diff>
--- a/docs/content/en/cards-en.pptx
+++ b/docs/content/en/cards-en.pptx
@@ -5,10 +5,10 @@
     <p:sldMasterId id="2147483684" r:id="rId1"/>
   </p:sldMasterIdLst>
   <p:notesMasterIdLst>
-    <p:notesMasterId r:id="rId12"/>
+    <p:notesMasterId r:id="rId13"/>
   </p:notesMasterIdLst>
   <p:handoutMasterIdLst>
-    <p:handoutMasterId r:id="rId13"/>
+    <p:handoutMasterId r:id="rId14"/>
   </p:handoutMasterIdLst>
   <p:sldIdLst>
     <p:sldId id="256" r:id="rId2"/>
@@ -21,6 +21,7 @@
     <p:sldId id="268" r:id="rId9"/>
     <p:sldId id="264" r:id="rId10"/>
     <p:sldId id="265" r:id="rId11"/>
+    <p:sldId id="269" r:id="rId12"/>
   </p:sldIdLst>
   <p:sldSz cx="7559675" cy="5381625"/>
   <p:notesSz cx="9144000" cy="6858000"/>
@@ -209,7 +210,7 @@
           <a:p>
             <a:fld id="{D121557B-95DC-4F9D-80D7-494E711A263C}" type="datetimeFigureOut">
               <a:rPr lang="fr-FR" smtClean="0"/>
-              <a:t>13/05/2019</a:t>
+              <a:t>16/05/2019</a:t>
             </a:fld>
             <a:endParaRPr lang="fr-FR"/>
           </a:p>
@@ -375,7 +376,7 @@
           <a:p>
             <a:fld id="{34B0D5AD-2B20-4FC5-9805-AA792A2BEE79}" type="datetimeFigureOut">
               <a:rPr lang="fr-FR" smtClean="0"/>
-              <a:t>13/05/2019</a:t>
+              <a:t>16/05/2019</a:t>
             </a:fld>
             <a:endParaRPr lang="fr-FR"/>
           </a:p>
@@ -836,7 +837,7 @@
           <a:p>
             <a:fld id="{654FF092-CFE9-4329-97B3-D872B1066925}" type="datetimeFigureOut">
               <a:rPr lang="fr-FR" smtClean="0"/>
-              <a:t>13/05/2019</a:t>
+              <a:t>16/05/2019</a:t>
             </a:fld>
             <a:endParaRPr lang="fr-FR"/>
           </a:p>
@@ -1006,7 +1007,7 @@
           <a:p>
             <a:fld id="{654FF092-CFE9-4329-97B3-D872B1066925}" type="datetimeFigureOut">
               <a:rPr lang="fr-FR" smtClean="0"/>
-              <a:t>13/05/2019</a:t>
+              <a:t>16/05/2019</a:t>
             </a:fld>
             <a:endParaRPr lang="fr-FR"/>
           </a:p>
@@ -1186,7 +1187,7 @@
           <a:p>
             <a:fld id="{654FF092-CFE9-4329-97B3-D872B1066925}" type="datetimeFigureOut">
               <a:rPr lang="fr-FR" smtClean="0"/>
-              <a:t>13/05/2019</a:t>
+              <a:t>16/05/2019</a:t>
             </a:fld>
             <a:endParaRPr lang="fr-FR"/>
           </a:p>
@@ -1356,7 +1357,7 @@
           <a:p>
             <a:fld id="{654FF092-CFE9-4329-97B3-D872B1066925}" type="datetimeFigureOut">
               <a:rPr lang="fr-FR" smtClean="0"/>
-              <a:t>13/05/2019</a:t>
+              <a:t>16/05/2019</a:t>
             </a:fld>
             <a:endParaRPr lang="fr-FR"/>
           </a:p>
@@ -1600,7 +1601,7 @@
           <a:p>
             <a:fld id="{654FF092-CFE9-4329-97B3-D872B1066925}" type="datetimeFigureOut">
               <a:rPr lang="fr-FR" smtClean="0"/>
-              <a:t>13/05/2019</a:t>
+              <a:t>16/05/2019</a:t>
             </a:fld>
             <a:endParaRPr lang="fr-FR"/>
           </a:p>
@@ -1832,7 +1833,7 @@
           <a:p>
             <a:fld id="{654FF092-CFE9-4329-97B3-D872B1066925}" type="datetimeFigureOut">
               <a:rPr lang="fr-FR" smtClean="0"/>
-              <a:t>13/05/2019</a:t>
+              <a:t>16/05/2019</a:t>
             </a:fld>
             <a:endParaRPr lang="fr-FR"/>
           </a:p>
@@ -2199,7 +2200,7 @@
           <a:p>
             <a:fld id="{654FF092-CFE9-4329-97B3-D872B1066925}" type="datetimeFigureOut">
               <a:rPr lang="fr-FR" smtClean="0"/>
-              <a:t>13/05/2019</a:t>
+              <a:t>16/05/2019</a:t>
             </a:fld>
             <a:endParaRPr lang="fr-FR"/>
           </a:p>
@@ -2317,7 +2318,7 @@
           <a:p>
             <a:fld id="{654FF092-CFE9-4329-97B3-D872B1066925}" type="datetimeFigureOut">
               <a:rPr lang="fr-FR" smtClean="0"/>
-              <a:t>13/05/2019</a:t>
+              <a:t>16/05/2019</a:t>
             </a:fld>
             <a:endParaRPr lang="fr-FR"/>
           </a:p>
@@ -2412,7 +2413,7 @@
           <a:p>
             <a:fld id="{654FF092-CFE9-4329-97B3-D872B1066925}" type="datetimeFigureOut">
               <a:rPr lang="fr-FR" smtClean="0"/>
-              <a:t>13/05/2019</a:t>
+              <a:t>16/05/2019</a:t>
             </a:fld>
             <a:endParaRPr lang="fr-FR"/>
           </a:p>
@@ -2689,7 +2690,7 @@
           <a:p>
             <a:fld id="{654FF092-CFE9-4329-97B3-D872B1066925}" type="datetimeFigureOut">
               <a:rPr lang="fr-FR" smtClean="0"/>
-              <a:t>13/05/2019</a:t>
+              <a:t>16/05/2019</a:t>
             </a:fld>
             <a:endParaRPr lang="fr-FR"/>
           </a:p>
@@ -2946,7 +2947,7 @@
           <a:p>
             <a:fld id="{654FF092-CFE9-4329-97B3-D872B1066925}" type="datetimeFigureOut">
               <a:rPr lang="fr-FR" smtClean="0"/>
-              <a:t>13/05/2019</a:t>
+              <a:t>16/05/2019</a:t>
             </a:fld>
             <a:endParaRPr lang="fr-FR"/>
           </a:p>
@@ -3159,7 +3160,7 @@
           <a:p>
             <a:fld id="{654FF092-CFE9-4329-97B3-D872B1066925}" type="datetimeFigureOut">
               <a:rPr lang="fr-FR" smtClean="0"/>
-              <a:t>13/05/2019</a:t>
+              <a:t>16/05/2019</a:t>
             </a:fld>
             <a:endParaRPr lang="fr-FR"/>
           </a:p>
@@ -9005,6 +9006,2571 @@
 </p:sld>
 </file>
 
+<file path=ppt/slides/slide11.xml><?xml version="1.0" encoding="utf-8"?>
+<p:sld xmlns:a="http://schemas.openxmlformats.org/drawingml/2006/main" xmlns:r="http://schemas.openxmlformats.org/officeDocument/2006/relationships" xmlns:p="http://schemas.openxmlformats.org/presentationml/2006/main">
+  <p:cSld>
+    <p:spTree>
+      <p:nvGrpSpPr>
+        <p:cNvPr id="1" name=""/>
+        <p:cNvGrpSpPr/>
+        <p:nvPr/>
+      </p:nvGrpSpPr>
+      <p:grpSpPr>
+        <a:xfrm>
+          <a:off x="0" y="0"/>
+          <a:ext cx="0" cy="0"/>
+          <a:chOff x="0" y="0"/>
+          <a:chExt cx="0" cy="0"/>
+        </a:xfrm>
+      </p:grpSpPr>
+      <p:sp>
+        <p:nvSpPr>
+          <p:cNvPr id="17" name="Sous-titre 2"/>
+          <p:cNvSpPr txBox="1">
+            <a:spLocks/>
+          </p:cNvSpPr>
+          <p:nvPr/>
+        </p:nvSpPr>
+        <p:spPr>
+          <a:xfrm>
+            <a:off x="4097348" y="2913631"/>
+            <a:ext cx="3203542" cy="590853"/>
+          </a:xfrm>
+          <a:prstGeom prst="rect">
+            <a:avLst/>
+          </a:prstGeom>
+          <a:ln>
+            <a:solidFill>
+              <a:schemeClr val="tx1"/>
+            </a:solidFill>
+            <a:prstDash val="dash"/>
+          </a:ln>
+        </p:spPr>
+        <p:txBody>
+          <a:bodyPr vert="horz" lIns="91440" tIns="45720" rIns="91440" bIns="45720" rtlCol="0">
+            <a:noAutofit/>
+          </a:bodyPr>
+          <a:lstStyle>
+            <a:lvl1pPr marL="0" indent="0" algn="ctr" defTabSz="717530" rtl="0" eaLnBrk="1" latinLnBrk="0" hangingPunct="1">
+              <a:lnSpc>
+                <a:spcPct val="90000"/>
+              </a:lnSpc>
+              <a:spcBef>
+                <a:spcPts val="785"/>
+              </a:spcBef>
+              <a:buFont typeface="Arial" panose="020B0604020202020204" pitchFamily="34" charset="0"/>
+              <a:buNone/>
+              <a:defRPr sz="1883" kern="1200">
+                <a:solidFill>
+                  <a:schemeClr val="tx1"/>
+                </a:solidFill>
+                <a:latin typeface="+mn-lt"/>
+                <a:ea typeface="+mn-ea"/>
+                <a:cs typeface="+mn-cs"/>
+              </a:defRPr>
+            </a:lvl1pPr>
+            <a:lvl2pPr marL="358765" indent="0" algn="ctr" defTabSz="717530" rtl="0" eaLnBrk="1" latinLnBrk="0" hangingPunct="1">
+              <a:lnSpc>
+                <a:spcPct val="90000"/>
+              </a:lnSpc>
+              <a:spcBef>
+                <a:spcPts val="392"/>
+              </a:spcBef>
+              <a:buFont typeface="Arial" panose="020B0604020202020204" pitchFamily="34" charset="0"/>
+              <a:buNone/>
+              <a:defRPr sz="1569" kern="1200">
+                <a:solidFill>
+                  <a:schemeClr val="tx1"/>
+                </a:solidFill>
+                <a:latin typeface="+mn-lt"/>
+                <a:ea typeface="+mn-ea"/>
+                <a:cs typeface="+mn-cs"/>
+              </a:defRPr>
+            </a:lvl2pPr>
+            <a:lvl3pPr marL="717530" indent="0" algn="ctr" defTabSz="717530" rtl="0" eaLnBrk="1" latinLnBrk="0" hangingPunct="1">
+              <a:lnSpc>
+                <a:spcPct val="90000"/>
+              </a:lnSpc>
+              <a:spcBef>
+                <a:spcPts val="392"/>
+              </a:spcBef>
+              <a:buFont typeface="Arial" panose="020B0604020202020204" pitchFamily="34" charset="0"/>
+              <a:buNone/>
+              <a:defRPr sz="1412" kern="1200">
+                <a:solidFill>
+                  <a:schemeClr val="tx1"/>
+                </a:solidFill>
+                <a:latin typeface="+mn-lt"/>
+                <a:ea typeface="+mn-ea"/>
+                <a:cs typeface="+mn-cs"/>
+              </a:defRPr>
+            </a:lvl3pPr>
+            <a:lvl4pPr marL="1076295" indent="0" algn="ctr" defTabSz="717530" rtl="0" eaLnBrk="1" latinLnBrk="0" hangingPunct="1">
+              <a:lnSpc>
+                <a:spcPct val="90000"/>
+              </a:lnSpc>
+              <a:spcBef>
+                <a:spcPts val="392"/>
+              </a:spcBef>
+              <a:buFont typeface="Arial" panose="020B0604020202020204" pitchFamily="34" charset="0"/>
+              <a:buNone/>
+              <a:defRPr sz="1256" kern="1200">
+                <a:solidFill>
+                  <a:schemeClr val="tx1"/>
+                </a:solidFill>
+                <a:latin typeface="+mn-lt"/>
+                <a:ea typeface="+mn-ea"/>
+                <a:cs typeface="+mn-cs"/>
+              </a:defRPr>
+            </a:lvl4pPr>
+            <a:lvl5pPr marL="1435059" indent="0" algn="ctr" defTabSz="717530" rtl="0" eaLnBrk="1" latinLnBrk="0" hangingPunct="1">
+              <a:lnSpc>
+                <a:spcPct val="90000"/>
+              </a:lnSpc>
+              <a:spcBef>
+                <a:spcPts val="392"/>
+              </a:spcBef>
+              <a:buFont typeface="Arial" panose="020B0604020202020204" pitchFamily="34" charset="0"/>
+              <a:buNone/>
+              <a:defRPr sz="1256" kern="1200">
+                <a:solidFill>
+                  <a:schemeClr val="tx1"/>
+                </a:solidFill>
+                <a:latin typeface="+mn-lt"/>
+                <a:ea typeface="+mn-ea"/>
+                <a:cs typeface="+mn-cs"/>
+              </a:defRPr>
+            </a:lvl5pPr>
+            <a:lvl6pPr marL="1793824" indent="0" algn="ctr" defTabSz="717530" rtl="0" eaLnBrk="1" latinLnBrk="0" hangingPunct="1">
+              <a:lnSpc>
+                <a:spcPct val="90000"/>
+              </a:lnSpc>
+              <a:spcBef>
+                <a:spcPts val="392"/>
+              </a:spcBef>
+              <a:buFont typeface="Arial" panose="020B0604020202020204" pitchFamily="34" charset="0"/>
+              <a:buNone/>
+              <a:defRPr sz="1256" kern="1200">
+                <a:solidFill>
+                  <a:schemeClr val="tx1"/>
+                </a:solidFill>
+                <a:latin typeface="+mn-lt"/>
+                <a:ea typeface="+mn-ea"/>
+                <a:cs typeface="+mn-cs"/>
+              </a:defRPr>
+            </a:lvl6pPr>
+            <a:lvl7pPr marL="2152589" indent="0" algn="ctr" defTabSz="717530" rtl="0" eaLnBrk="1" latinLnBrk="0" hangingPunct="1">
+              <a:lnSpc>
+                <a:spcPct val="90000"/>
+              </a:lnSpc>
+              <a:spcBef>
+                <a:spcPts val="392"/>
+              </a:spcBef>
+              <a:buFont typeface="Arial" panose="020B0604020202020204" pitchFamily="34" charset="0"/>
+              <a:buNone/>
+              <a:defRPr sz="1256" kern="1200">
+                <a:solidFill>
+                  <a:schemeClr val="tx1"/>
+                </a:solidFill>
+                <a:latin typeface="+mn-lt"/>
+                <a:ea typeface="+mn-ea"/>
+                <a:cs typeface="+mn-cs"/>
+              </a:defRPr>
+            </a:lvl7pPr>
+            <a:lvl8pPr marL="2511354" indent="0" algn="ctr" defTabSz="717530" rtl="0" eaLnBrk="1" latinLnBrk="0" hangingPunct="1">
+              <a:lnSpc>
+                <a:spcPct val="90000"/>
+              </a:lnSpc>
+              <a:spcBef>
+                <a:spcPts val="392"/>
+              </a:spcBef>
+              <a:buFont typeface="Arial" panose="020B0604020202020204" pitchFamily="34" charset="0"/>
+              <a:buNone/>
+              <a:defRPr sz="1256" kern="1200">
+                <a:solidFill>
+                  <a:schemeClr val="tx1"/>
+                </a:solidFill>
+                <a:latin typeface="+mn-lt"/>
+                <a:ea typeface="+mn-ea"/>
+                <a:cs typeface="+mn-cs"/>
+              </a:defRPr>
+            </a:lvl8pPr>
+            <a:lvl9pPr marL="2870119" indent="0" algn="ctr" defTabSz="717530" rtl="0" eaLnBrk="1" latinLnBrk="0" hangingPunct="1">
+              <a:lnSpc>
+                <a:spcPct val="90000"/>
+              </a:lnSpc>
+              <a:spcBef>
+                <a:spcPts val="392"/>
+              </a:spcBef>
+              <a:buFont typeface="Arial" panose="020B0604020202020204" pitchFamily="34" charset="0"/>
+              <a:buNone/>
+              <a:defRPr sz="1256" kern="1200">
+                <a:solidFill>
+                  <a:schemeClr val="tx1"/>
+                </a:solidFill>
+                <a:latin typeface="+mn-lt"/>
+                <a:ea typeface="+mn-ea"/>
+                <a:cs typeface="+mn-cs"/>
+              </a:defRPr>
+            </a:lvl9pPr>
+          </a:lstStyle>
+          <a:p>
+            <a:pPr algn="l">
+              <a:lnSpc>
+                <a:spcPct val="135000"/>
+              </a:lnSpc>
+            </a:pPr>
+            <a:r>
+              <a:rPr lang="fr-FR" sz="800" dirty="0" err="1" smtClean="0">
+                <a:latin typeface="Stone Serif" pitchFamily="2" charset="0"/>
+              </a:rPr>
+              <a:t>StratumnHQ</a:t>
+            </a:r>
+            <a:r>
+              <a:rPr lang="fr-FR" sz="800" dirty="0" smtClean="0">
+                <a:latin typeface="Stone Serif" pitchFamily="2" charset="0"/>
+              </a:rPr>
+              <a:t>, TheLedger.be, </a:t>
+            </a:r>
+            <a:r>
+              <a:rPr lang="fr-FR" sz="800" dirty="0" err="1" smtClean="0">
+                <a:latin typeface="Stone Serif" pitchFamily="2" charset="0"/>
+              </a:rPr>
+              <a:t>ChainAccelerator</a:t>
+            </a:r>
+            <a:endParaRPr lang="fr-FR" sz="800" dirty="0">
+              <a:latin typeface="Stone Serif" pitchFamily="2" charset="0"/>
+            </a:endParaRPr>
+          </a:p>
+        </p:txBody>
+      </p:sp>
+      <p:sp>
+        <p:nvSpPr>
+          <p:cNvPr id="6" name="ZoneTexte 5"/>
+          <p:cNvSpPr txBox="1"/>
+          <p:nvPr/>
+        </p:nvSpPr>
+        <p:spPr>
+          <a:xfrm>
+            <a:off x="4097350" y="2670212"/>
+            <a:ext cx="3203540" cy="279307"/>
+          </a:xfrm>
+          <a:prstGeom prst="rect">
+            <a:avLst/>
+          </a:prstGeom>
+          <a:solidFill>
+            <a:srgbClr val="FFBDF5"/>
+          </a:solidFill>
+        </p:spPr>
+        <p:txBody>
+          <a:bodyPr wrap="square" rtlCol="0">
+            <a:spAutoFit/>
+          </a:bodyPr>
+          <a:lstStyle/>
+          <a:p>
+            <a:pPr>
+              <a:lnSpc>
+                <a:spcPct val="135000"/>
+              </a:lnSpc>
+            </a:pPr>
+            <a:r>
+              <a:rPr lang="fr-FR" sz="900" dirty="0" err="1" smtClean="0">
+                <a:latin typeface="Stone Serif" pitchFamily="2" charset="0"/>
+              </a:rPr>
+              <a:t>Companies</a:t>
+            </a:r>
+            <a:r>
+              <a:rPr lang="fr-FR" sz="900" dirty="0" smtClean="0">
+                <a:latin typeface="Stone Serif" pitchFamily="2" charset="0"/>
+              </a:rPr>
+              <a:t> to guide </a:t>
+            </a:r>
+            <a:r>
+              <a:rPr lang="fr-FR" sz="900" dirty="0" err="1" smtClean="0">
+                <a:latin typeface="Stone Serif" pitchFamily="2" charset="0"/>
+              </a:rPr>
+              <a:t>you</a:t>
+            </a:r>
+            <a:endParaRPr lang="fr-FR" sz="900" dirty="0">
+              <a:latin typeface="Stone Serif" pitchFamily="2" charset="0"/>
+            </a:endParaRPr>
+          </a:p>
+        </p:txBody>
+      </p:sp>
+      <p:sp>
+        <p:nvSpPr>
+          <p:cNvPr id="3" name="Sous-titre 2"/>
+          <p:cNvSpPr>
+            <a:spLocks noGrp="1"/>
+          </p:cNvSpPr>
+          <p:nvPr>
+            <p:ph type="subTitle" idx="1"/>
+          </p:nvPr>
+        </p:nvSpPr>
+        <p:spPr>
+          <a:xfrm>
+            <a:off x="4090260" y="1248868"/>
+            <a:ext cx="3224941" cy="1306355"/>
+          </a:xfrm>
+          <a:ln>
+            <a:solidFill>
+              <a:schemeClr val="tx1"/>
+            </a:solidFill>
+            <a:prstDash val="dash"/>
+          </a:ln>
+        </p:spPr>
+        <p:txBody>
+          <a:bodyPr>
+            <a:normAutofit fontScale="92500" lnSpcReduction="20000"/>
+          </a:bodyPr>
+          <a:lstStyle/>
+          <a:p>
+            <a:pPr algn="just">
+              <a:lnSpc>
+                <a:spcPct val="145000"/>
+              </a:lnSpc>
+              <a:spcBef>
+                <a:spcPts val="0"/>
+              </a:spcBef>
+            </a:pPr>
+            <a:r>
+              <a:rPr lang="en-US" sz="800" dirty="0">
+                <a:latin typeface="Stone Serif" pitchFamily="2" charset="0"/>
+              </a:rPr>
+              <a:t>- Disintermediation. </a:t>
+            </a:r>
+            <a:r>
+              <a:rPr lang="en-US" sz="800" dirty="0" smtClean="0">
+                <a:latin typeface="Stone Serif" pitchFamily="2" charset="0"/>
+              </a:rPr>
+              <a:t>A </a:t>
+            </a:r>
+            <a:r>
+              <a:rPr lang="en-US" sz="800" dirty="0" err="1" smtClean="0">
+                <a:latin typeface="Stone Serif" pitchFamily="2" charset="0"/>
+              </a:rPr>
+              <a:t>blockchain</a:t>
+            </a:r>
+            <a:r>
+              <a:rPr lang="en-US" sz="800" dirty="0" smtClean="0">
+                <a:latin typeface="Stone Serif" pitchFamily="2" charset="0"/>
+              </a:rPr>
+              <a:t> </a:t>
+            </a:r>
+            <a:r>
+              <a:rPr lang="en-US" sz="800" dirty="0">
+                <a:latin typeface="Stone Serif" pitchFamily="2" charset="0"/>
+              </a:rPr>
+              <a:t>guarantees the inalterability of registered </a:t>
+            </a:r>
+            <a:r>
+              <a:rPr lang="en-US" sz="800" dirty="0" smtClean="0">
+                <a:latin typeface="Stone Serif" pitchFamily="2" charset="0"/>
+              </a:rPr>
+              <a:t>transactions. For this reason, it can replace </a:t>
+            </a:r>
+            <a:r>
+              <a:rPr lang="en-US" sz="800" dirty="0">
+                <a:latin typeface="Stone Serif" pitchFamily="2" charset="0"/>
+              </a:rPr>
+              <a:t>trusted third parties responsible for the notarization of acts: notaries, certification offices, </a:t>
+            </a:r>
+            <a:r>
+              <a:rPr lang="en-US" sz="800" dirty="0" smtClean="0">
+                <a:latin typeface="Stone Serif" pitchFamily="2" charset="0"/>
+              </a:rPr>
+              <a:t>chartered organizations, </a:t>
+            </a:r>
+            <a:r>
+              <a:rPr lang="en-US" sz="800" dirty="0">
+                <a:latin typeface="Stone Serif" pitchFamily="2" charset="0"/>
+              </a:rPr>
+              <a:t>public regulators and official </a:t>
+            </a:r>
+            <a:r>
+              <a:rPr lang="en-US" sz="800" dirty="0" smtClean="0">
+                <a:latin typeface="Stone Serif" pitchFamily="2" charset="0"/>
+              </a:rPr>
+              <a:t>agencies. The </a:t>
+            </a:r>
+            <a:r>
+              <a:rPr lang="en-US" sz="800" dirty="0">
+                <a:latin typeface="Stone Serif" pitchFamily="2" charset="0"/>
+              </a:rPr>
+              <a:t>guarantee provided by these organizations would now be provided by </a:t>
+            </a:r>
+            <a:r>
+              <a:rPr lang="en-US" sz="800" dirty="0" smtClean="0">
+                <a:latin typeface="Stone Serif" pitchFamily="2" charset="0"/>
+              </a:rPr>
+              <a:t>a </a:t>
+            </a:r>
+            <a:r>
+              <a:rPr lang="en-US" sz="800" dirty="0" err="1" smtClean="0">
+                <a:latin typeface="Stone Serif" pitchFamily="2" charset="0"/>
+              </a:rPr>
+              <a:t>blockchain</a:t>
+            </a:r>
+            <a:r>
+              <a:rPr lang="en-US" sz="800" dirty="0">
+                <a:latin typeface="Stone Serif" pitchFamily="2" charset="0"/>
+              </a:rPr>
+              <a:t>.</a:t>
+            </a:r>
+          </a:p>
+          <a:p>
+            <a:pPr algn="just">
+              <a:lnSpc>
+                <a:spcPct val="145000"/>
+              </a:lnSpc>
+              <a:spcBef>
+                <a:spcPts val="0"/>
+              </a:spcBef>
+            </a:pPr>
+            <a:r>
+              <a:rPr lang="en-US" sz="800" dirty="0">
+                <a:latin typeface="Stone Serif" pitchFamily="2" charset="0"/>
+              </a:rPr>
+              <a:t>- Re-intermediation. New players invent several </a:t>
+            </a:r>
+            <a:r>
+              <a:rPr lang="en-US" sz="800" dirty="0" err="1">
+                <a:latin typeface="Stone Serif" pitchFamily="2" charset="0"/>
+              </a:rPr>
+              <a:t>blockchain</a:t>
+            </a:r>
+            <a:r>
+              <a:rPr lang="en-US" sz="800" dirty="0">
+                <a:latin typeface="Stone Serif" pitchFamily="2" charset="0"/>
+              </a:rPr>
+              <a:t> variants ("distributed ledgers"), implement and manage them, and create related services (certification, audit, marketplaces, etc.)</a:t>
+            </a:r>
+            <a:endParaRPr lang="fr-FR" sz="800" dirty="0" smtClean="0">
+              <a:latin typeface="Stone Serif" pitchFamily="2" charset="0"/>
+            </a:endParaRPr>
+          </a:p>
+        </p:txBody>
+      </p:sp>
+      <p:sp>
+        <p:nvSpPr>
+          <p:cNvPr id="2" name="Titre 1"/>
+          <p:cNvSpPr>
+            <a:spLocks noGrp="1"/>
+          </p:cNvSpPr>
+          <p:nvPr>
+            <p:ph type="ctrTitle"/>
+          </p:nvPr>
+        </p:nvSpPr>
+        <p:spPr>
+          <a:xfrm>
+            <a:off x="432659" y="249842"/>
+            <a:ext cx="6896718" cy="592691"/>
+          </a:xfrm>
+          <a:solidFill>
+            <a:srgbClr val="E80C72"/>
+          </a:solidFill>
+          <a:ln>
+            <a:solidFill>
+              <a:schemeClr val="tx1">
+                <a:lumMod val="50000"/>
+                <a:lumOff val="50000"/>
+              </a:schemeClr>
+            </a:solidFill>
+          </a:ln>
+        </p:spPr>
+        <p:txBody>
+          <a:bodyPr>
+            <a:noAutofit/>
+          </a:bodyPr>
+          <a:lstStyle/>
+          <a:p>
+            <a:pPr>
+              <a:lnSpc>
+                <a:spcPct val="135000"/>
+              </a:lnSpc>
+            </a:pPr>
+            <a:r>
+              <a:rPr lang="fr-FR" sz="3200" dirty="0" err="1" smtClean="0">
+                <a:solidFill>
+                  <a:schemeClr val="bg1"/>
+                </a:solidFill>
+                <a:latin typeface="Stone Serif" pitchFamily="2" charset="0"/>
+              </a:rPr>
+              <a:t>Blockchain</a:t>
+            </a:r>
+            <a:endParaRPr lang="fr-FR" sz="3200" dirty="0">
+              <a:solidFill>
+                <a:schemeClr val="bg1"/>
+              </a:solidFill>
+              <a:latin typeface="Stone Serif" pitchFamily="2" charset="0"/>
+            </a:endParaRPr>
+          </a:p>
+        </p:txBody>
+      </p:sp>
+      <p:sp>
+        <p:nvSpPr>
+          <p:cNvPr id="8" name="Sous-titre 2"/>
+          <p:cNvSpPr txBox="1">
+            <a:spLocks/>
+          </p:cNvSpPr>
+          <p:nvPr/>
+        </p:nvSpPr>
+        <p:spPr>
+          <a:xfrm>
+            <a:off x="432657" y="1248866"/>
+            <a:ext cx="3409241" cy="1375426"/>
+          </a:xfrm>
+          <a:prstGeom prst="rect">
+            <a:avLst/>
+          </a:prstGeom>
+          <a:ln>
+            <a:solidFill>
+              <a:schemeClr val="tx1"/>
+            </a:solidFill>
+            <a:prstDash val="dash"/>
+          </a:ln>
+        </p:spPr>
+        <p:txBody>
+          <a:bodyPr vert="horz" lIns="91440" tIns="45720" rIns="91440" bIns="45720" rtlCol="0">
+            <a:noAutofit/>
+          </a:bodyPr>
+          <a:lstStyle>
+            <a:lvl1pPr marL="0" indent="0" algn="ctr" defTabSz="717530" rtl="0" eaLnBrk="1" latinLnBrk="0" hangingPunct="1">
+              <a:lnSpc>
+                <a:spcPct val="90000"/>
+              </a:lnSpc>
+              <a:spcBef>
+                <a:spcPts val="785"/>
+              </a:spcBef>
+              <a:buFont typeface="Arial" panose="020B0604020202020204" pitchFamily="34" charset="0"/>
+              <a:buNone/>
+              <a:defRPr sz="1883" kern="1200">
+                <a:solidFill>
+                  <a:schemeClr val="tx1"/>
+                </a:solidFill>
+                <a:latin typeface="+mn-lt"/>
+                <a:ea typeface="+mn-ea"/>
+                <a:cs typeface="+mn-cs"/>
+              </a:defRPr>
+            </a:lvl1pPr>
+            <a:lvl2pPr marL="358765" indent="0" algn="ctr" defTabSz="717530" rtl="0" eaLnBrk="1" latinLnBrk="0" hangingPunct="1">
+              <a:lnSpc>
+                <a:spcPct val="90000"/>
+              </a:lnSpc>
+              <a:spcBef>
+                <a:spcPts val="392"/>
+              </a:spcBef>
+              <a:buFont typeface="Arial" panose="020B0604020202020204" pitchFamily="34" charset="0"/>
+              <a:buNone/>
+              <a:defRPr sz="1569" kern="1200">
+                <a:solidFill>
+                  <a:schemeClr val="tx1"/>
+                </a:solidFill>
+                <a:latin typeface="+mn-lt"/>
+                <a:ea typeface="+mn-ea"/>
+                <a:cs typeface="+mn-cs"/>
+              </a:defRPr>
+            </a:lvl2pPr>
+            <a:lvl3pPr marL="717530" indent="0" algn="ctr" defTabSz="717530" rtl="0" eaLnBrk="1" latinLnBrk="0" hangingPunct="1">
+              <a:lnSpc>
+                <a:spcPct val="90000"/>
+              </a:lnSpc>
+              <a:spcBef>
+                <a:spcPts val="392"/>
+              </a:spcBef>
+              <a:buFont typeface="Arial" panose="020B0604020202020204" pitchFamily="34" charset="0"/>
+              <a:buNone/>
+              <a:defRPr sz="1412" kern="1200">
+                <a:solidFill>
+                  <a:schemeClr val="tx1"/>
+                </a:solidFill>
+                <a:latin typeface="+mn-lt"/>
+                <a:ea typeface="+mn-ea"/>
+                <a:cs typeface="+mn-cs"/>
+              </a:defRPr>
+            </a:lvl3pPr>
+            <a:lvl4pPr marL="1076295" indent="0" algn="ctr" defTabSz="717530" rtl="0" eaLnBrk="1" latinLnBrk="0" hangingPunct="1">
+              <a:lnSpc>
+                <a:spcPct val="90000"/>
+              </a:lnSpc>
+              <a:spcBef>
+                <a:spcPts val="392"/>
+              </a:spcBef>
+              <a:buFont typeface="Arial" panose="020B0604020202020204" pitchFamily="34" charset="0"/>
+              <a:buNone/>
+              <a:defRPr sz="1256" kern="1200">
+                <a:solidFill>
+                  <a:schemeClr val="tx1"/>
+                </a:solidFill>
+                <a:latin typeface="+mn-lt"/>
+                <a:ea typeface="+mn-ea"/>
+                <a:cs typeface="+mn-cs"/>
+              </a:defRPr>
+            </a:lvl4pPr>
+            <a:lvl5pPr marL="1435059" indent="0" algn="ctr" defTabSz="717530" rtl="0" eaLnBrk="1" latinLnBrk="0" hangingPunct="1">
+              <a:lnSpc>
+                <a:spcPct val="90000"/>
+              </a:lnSpc>
+              <a:spcBef>
+                <a:spcPts val="392"/>
+              </a:spcBef>
+              <a:buFont typeface="Arial" panose="020B0604020202020204" pitchFamily="34" charset="0"/>
+              <a:buNone/>
+              <a:defRPr sz="1256" kern="1200">
+                <a:solidFill>
+                  <a:schemeClr val="tx1"/>
+                </a:solidFill>
+                <a:latin typeface="+mn-lt"/>
+                <a:ea typeface="+mn-ea"/>
+                <a:cs typeface="+mn-cs"/>
+              </a:defRPr>
+            </a:lvl5pPr>
+            <a:lvl6pPr marL="1793824" indent="0" algn="ctr" defTabSz="717530" rtl="0" eaLnBrk="1" latinLnBrk="0" hangingPunct="1">
+              <a:lnSpc>
+                <a:spcPct val="90000"/>
+              </a:lnSpc>
+              <a:spcBef>
+                <a:spcPts val="392"/>
+              </a:spcBef>
+              <a:buFont typeface="Arial" panose="020B0604020202020204" pitchFamily="34" charset="0"/>
+              <a:buNone/>
+              <a:defRPr sz="1256" kern="1200">
+                <a:solidFill>
+                  <a:schemeClr val="tx1"/>
+                </a:solidFill>
+                <a:latin typeface="+mn-lt"/>
+                <a:ea typeface="+mn-ea"/>
+                <a:cs typeface="+mn-cs"/>
+              </a:defRPr>
+            </a:lvl6pPr>
+            <a:lvl7pPr marL="2152589" indent="0" algn="ctr" defTabSz="717530" rtl="0" eaLnBrk="1" latinLnBrk="0" hangingPunct="1">
+              <a:lnSpc>
+                <a:spcPct val="90000"/>
+              </a:lnSpc>
+              <a:spcBef>
+                <a:spcPts val="392"/>
+              </a:spcBef>
+              <a:buFont typeface="Arial" panose="020B0604020202020204" pitchFamily="34" charset="0"/>
+              <a:buNone/>
+              <a:defRPr sz="1256" kern="1200">
+                <a:solidFill>
+                  <a:schemeClr val="tx1"/>
+                </a:solidFill>
+                <a:latin typeface="+mn-lt"/>
+                <a:ea typeface="+mn-ea"/>
+                <a:cs typeface="+mn-cs"/>
+              </a:defRPr>
+            </a:lvl7pPr>
+            <a:lvl8pPr marL="2511354" indent="0" algn="ctr" defTabSz="717530" rtl="0" eaLnBrk="1" latinLnBrk="0" hangingPunct="1">
+              <a:lnSpc>
+                <a:spcPct val="90000"/>
+              </a:lnSpc>
+              <a:spcBef>
+                <a:spcPts val="392"/>
+              </a:spcBef>
+              <a:buFont typeface="Arial" panose="020B0604020202020204" pitchFamily="34" charset="0"/>
+              <a:buNone/>
+              <a:defRPr sz="1256" kern="1200">
+                <a:solidFill>
+                  <a:schemeClr val="tx1"/>
+                </a:solidFill>
+                <a:latin typeface="+mn-lt"/>
+                <a:ea typeface="+mn-ea"/>
+                <a:cs typeface="+mn-cs"/>
+              </a:defRPr>
+            </a:lvl8pPr>
+            <a:lvl9pPr marL="2870119" indent="0" algn="ctr" defTabSz="717530" rtl="0" eaLnBrk="1" latinLnBrk="0" hangingPunct="1">
+              <a:lnSpc>
+                <a:spcPct val="90000"/>
+              </a:lnSpc>
+              <a:spcBef>
+                <a:spcPts val="392"/>
+              </a:spcBef>
+              <a:buFont typeface="Arial" panose="020B0604020202020204" pitchFamily="34" charset="0"/>
+              <a:buNone/>
+              <a:defRPr sz="1256" kern="1200">
+                <a:solidFill>
+                  <a:schemeClr val="tx1"/>
+                </a:solidFill>
+                <a:latin typeface="+mn-lt"/>
+                <a:ea typeface="+mn-ea"/>
+                <a:cs typeface="+mn-cs"/>
+              </a:defRPr>
+            </a:lvl9pPr>
+          </a:lstStyle>
+          <a:p>
+            <a:pPr algn="just">
+              <a:lnSpc>
+                <a:spcPct val="135000"/>
+              </a:lnSpc>
+              <a:spcBef>
+                <a:spcPts val="0"/>
+              </a:spcBef>
+            </a:pPr>
+            <a:r>
+              <a:rPr lang="en-US" sz="800" dirty="0">
+                <a:latin typeface="Stone Serif" pitchFamily="2" charset="0"/>
+              </a:rPr>
+              <a:t>The </a:t>
+            </a:r>
+            <a:r>
+              <a:rPr lang="en-US" sz="800" dirty="0" err="1">
+                <a:latin typeface="Stone Serif" pitchFamily="2" charset="0"/>
+              </a:rPr>
+              <a:t>blockchain</a:t>
+            </a:r>
+            <a:r>
+              <a:rPr lang="en-US" sz="800" dirty="0">
+                <a:latin typeface="Stone Serif" pitchFamily="2" charset="0"/>
+              </a:rPr>
+              <a:t> is a technology </a:t>
+            </a:r>
+            <a:r>
+              <a:rPr lang="en-US" sz="800" dirty="0" smtClean="0">
+                <a:latin typeface="Stone Serif" pitchFamily="2" charset="0"/>
+              </a:rPr>
+              <a:t>with similarities to a </a:t>
+            </a:r>
+            <a:r>
+              <a:rPr lang="en-US" sz="800" dirty="0">
+                <a:latin typeface="Stone Serif" pitchFamily="2" charset="0"/>
+              </a:rPr>
+              <a:t>database (</a:t>
+            </a:r>
+            <a:r>
+              <a:rPr lang="en-US" sz="800" dirty="0" err="1">
+                <a:latin typeface="Stone Serif" pitchFamily="2" charset="0"/>
+              </a:rPr>
+              <a:t>bdd</a:t>
+            </a:r>
+            <a:r>
+              <a:rPr lang="en-US" sz="800" dirty="0">
+                <a:latin typeface="Stone Serif" pitchFamily="2" charset="0"/>
+              </a:rPr>
+              <a:t>): it allows </a:t>
+            </a:r>
+            <a:r>
+              <a:rPr lang="en-US" sz="800" dirty="0" smtClean="0">
+                <a:latin typeface="Stone Serif" pitchFamily="2" charset="0"/>
+              </a:rPr>
+              <a:t>to store and </a:t>
+            </a:r>
+            <a:r>
+              <a:rPr lang="en-US" sz="800" dirty="0">
+                <a:latin typeface="Stone Serif" pitchFamily="2" charset="0"/>
+              </a:rPr>
+              <a:t>access </a:t>
+            </a:r>
+            <a:r>
+              <a:rPr lang="en-US" sz="800" dirty="0" smtClean="0">
+                <a:latin typeface="Stone Serif" pitchFamily="2" charset="0"/>
+              </a:rPr>
+              <a:t>data on </a:t>
+            </a:r>
+            <a:r>
+              <a:rPr lang="en-US" sz="800" dirty="0">
+                <a:latin typeface="Stone Serif" pitchFamily="2" charset="0"/>
+              </a:rPr>
+              <a:t>a computer support. Unlike a database, the data stored on a </a:t>
+            </a:r>
+            <a:r>
+              <a:rPr lang="en-US" sz="800" dirty="0" err="1">
+                <a:latin typeface="Stone Serif" pitchFamily="2" charset="0"/>
+              </a:rPr>
+              <a:t>blockchain</a:t>
+            </a:r>
+            <a:r>
+              <a:rPr lang="en-US" sz="800" dirty="0">
+                <a:latin typeface="Stone Serif" pitchFamily="2" charset="0"/>
+              </a:rPr>
+              <a:t> is </a:t>
+            </a:r>
+            <a:r>
+              <a:rPr lang="en-US" sz="800" dirty="0" smtClean="0">
+                <a:latin typeface="Stone Serif" pitchFamily="2" charset="0"/>
+              </a:rPr>
+              <a:t>unalterable</a:t>
+            </a:r>
+            <a:r>
+              <a:rPr lang="en-US" sz="800" dirty="0">
+                <a:latin typeface="Stone Serif" pitchFamily="2" charset="0"/>
+              </a:rPr>
+              <a:t>: it can not be deleted or modified. Another difference: the </a:t>
+            </a:r>
+            <a:r>
+              <a:rPr lang="en-US" sz="800" dirty="0" err="1">
+                <a:latin typeface="Stone Serif" pitchFamily="2" charset="0"/>
+              </a:rPr>
+              <a:t>blockchain</a:t>
+            </a:r>
+            <a:r>
+              <a:rPr lang="en-US" sz="800" dirty="0">
+                <a:latin typeface="Stone Serif" pitchFamily="2" charset="0"/>
+              </a:rPr>
+              <a:t> is not controlled by a particular actor: everyone has a copy. This ensures transparency </a:t>
+            </a:r>
+            <a:r>
+              <a:rPr lang="en-US" sz="800">
+                <a:latin typeface="Stone Serif" pitchFamily="2" charset="0"/>
+              </a:rPr>
+              <a:t>and </a:t>
+            </a:r>
+            <a:r>
+              <a:rPr lang="en-US" sz="800" smtClean="0">
+                <a:latin typeface="Stone Serif" pitchFamily="2" charset="0"/>
+              </a:rPr>
+              <a:t>inalterability</a:t>
+            </a:r>
+            <a:r>
+              <a:rPr lang="en-US" sz="800" dirty="0">
+                <a:latin typeface="Stone Serif" pitchFamily="2" charset="0"/>
+              </a:rPr>
+              <a:t>, and eliminates the need for a trusted third party.</a:t>
+            </a:r>
+            <a:endParaRPr lang="fr-FR" sz="800" dirty="0">
+              <a:latin typeface="Stone Serif" pitchFamily="2" charset="0"/>
+            </a:endParaRPr>
+          </a:p>
+        </p:txBody>
+      </p:sp>
+      <p:sp>
+        <p:nvSpPr>
+          <p:cNvPr id="5" name="ZoneTexte 4"/>
+          <p:cNvSpPr txBox="1"/>
+          <p:nvPr/>
+        </p:nvSpPr>
+        <p:spPr>
+          <a:xfrm>
+            <a:off x="432658" y="957446"/>
+            <a:ext cx="3409240" cy="320857"/>
+          </a:xfrm>
+          <a:prstGeom prst="rect">
+            <a:avLst/>
+          </a:prstGeom>
+          <a:solidFill>
+            <a:srgbClr val="FFBDF5"/>
+          </a:solidFill>
+        </p:spPr>
+        <p:txBody>
+          <a:bodyPr wrap="square" rtlCol="0">
+            <a:spAutoFit/>
+          </a:bodyPr>
+          <a:lstStyle/>
+          <a:p>
+            <a:pPr>
+              <a:lnSpc>
+                <a:spcPct val="135000"/>
+              </a:lnSpc>
+            </a:pPr>
+            <a:r>
+              <a:rPr lang="fr-FR" sz="1100" dirty="0" err="1" smtClean="0">
+                <a:latin typeface="Stone Serif" pitchFamily="2" charset="0"/>
+              </a:rPr>
+              <a:t>What</a:t>
+            </a:r>
+            <a:r>
+              <a:rPr lang="fr-FR" sz="1100" dirty="0" smtClean="0">
+                <a:latin typeface="Stone Serif" pitchFamily="2" charset="0"/>
+              </a:rPr>
+              <a:t> </a:t>
+            </a:r>
+            <a:r>
+              <a:rPr lang="fr-FR" sz="1100" dirty="0" err="1" smtClean="0">
+                <a:latin typeface="Stone Serif" pitchFamily="2" charset="0"/>
+              </a:rPr>
+              <a:t>is</a:t>
+            </a:r>
+            <a:r>
+              <a:rPr lang="fr-FR" sz="1100" dirty="0" smtClean="0">
+                <a:latin typeface="Stone Serif" pitchFamily="2" charset="0"/>
+              </a:rPr>
+              <a:t> </a:t>
+            </a:r>
+            <a:r>
+              <a:rPr lang="fr-FR" sz="1100" dirty="0" err="1" smtClean="0">
+                <a:latin typeface="Stone Serif" pitchFamily="2" charset="0"/>
+              </a:rPr>
+              <a:t>it</a:t>
+            </a:r>
+            <a:r>
+              <a:rPr lang="fr-FR" sz="1100" dirty="0" smtClean="0">
+                <a:latin typeface="Stone Serif" pitchFamily="2" charset="0"/>
+              </a:rPr>
+              <a:t>?</a:t>
+            </a:r>
+            <a:endParaRPr lang="fr-FR" sz="1100" dirty="0">
+              <a:latin typeface="Stone Serif" pitchFamily="2" charset="0"/>
+            </a:endParaRPr>
+          </a:p>
+        </p:txBody>
+      </p:sp>
+      <p:sp>
+        <p:nvSpPr>
+          <p:cNvPr id="9" name="ZoneTexte 8"/>
+          <p:cNvSpPr txBox="1"/>
+          <p:nvPr/>
+        </p:nvSpPr>
+        <p:spPr>
+          <a:xfrm>
+            <a:off x="4083172" y="957446"/>
+            <a:ext cx="3246204" cy="320857"/>
+          </a:xfrm>
+          <a:prstGeom prst="rect">
+            <a:avLst/>
+          </a:prstGeom>
+          <a:solidFill>
+            <a:srgbClr val="FFBDF5"/>
+          </a:solidFill>
+        </p:spPr>
+        <p:txBody>
+          <a:bodyPr wrap="square" rtlCol="0">
+            <a:spAutoFit/>
+          </a:bodyPr>
+          <a:lstStyle/>
+          <a:p>
+            <a:pPr>
+              <a:lnSpc>
+                <a:spcPct val="135000"/>
+              </a:lnSpc>
+            </a:pPr>
+            <a:r>
+              <a:rPr lang="fr-FR" sz="1100" dirty="0" err="1" smtClean="0">
+                <a:latin typeface="Stone Serif" pitchFamily="2" charset="0"/>
+              </a:rPr>
+              <a:t>What</a:t>
+            </a:r>
+            <a:r>
+              <a:rPr lang="fr-FR" sz="1100" dirty="0" smtClean="0">
+                <a:latin typeface="Stone Serif" pitchFamily="2" charset="0"/>
+              </a:rPr>
+              <a:t> business impact?</a:t>
+            </a:r>
+            <a:endParaRPr lang="fr-FR" sz="1100" dirty="0">
+              <a:latin typeface="Stone Serif" pitchFamily="2" charset="0"/>
+            </a:endParaRPr>
+          </a:p>
+        </p:txBody>
+      </p:sp>
+      <p:sp>
+        <p:nvSpPr>
+          <p:cNvPr id="7" name="Sous-titre 2"/>
+          <p:cNvSpPr txBox="1">
+            <a:spLocks/>
+          </p:cNvSpPr>
+          <p:nvPr/>
+        </p:nvSpPr>
+        <p:spPr>
+          <a:xfrm>
+            <a:off x="432658" y="2894941"/>
+            <a:ext cx="3416328" cy="613799"/>
+          </a:xfrm>
+          <a:prstGeom prst="rect">
+            <a:avLst/>
+          </a:prstGeom>
+          <a:ln>
+            <a:solidFill>
+              <a:schemeClr val="tx1"/>
+            </a:solidFill>
+            <a:prstDash val="dash"/>
+          </a:ln>
+        </p:spPr>
+        <p:txBody>
+          <a:bodyPr vert="horz" lIns="91440" tIns="45720" rIns="91440" bIns="45720" rtlCol="0">
+            <a:noAutofit/>
+          </a:bodyPr>
+          <a:lstStyle>
+            <a:lvl1pPr marL="0" indent="0" algn="ctr" defTabSz="717530" rtl="0" eaLnBrk="1" latinLnBrk="0" hangingPunct="1">
+              <a:lnSpc>
+                <a:spcPct val="90000"/>
+              </a:lnSpc>
+              <a:spcBef>
+                <a:spcPts val="785"/>
+              </a:spcBef>
+              <a:buFont typeface="Arial" panose="020B0604020202020204" pitchFamily="34" charset="0"/>
+              <a:buNone/>
+              <a:defRPr sz="1883" kern="1200">
+                <a:solidFill>
+                  <a:schemeClr val="tx1"/>
+                </a:solidFill>
+                <a:latin typeface="+mn-lt"/>
+                <a:ea typeface="+mn-ea"/>
+                <a:cs typeface="+mn-cs"/>
+              </a:defRPr>
+            </a:lvl1pPr>
+            <a:lvl2pPr marL="358765" indent="0" algn="ctr" defTabSz="717530" rtl="0" eaLnBrk="1" latinLnBrk="0" hangingPunct="1">
+              <a:lnSpc>
+                <a:spcPct val="90000"/>
+              </a:lnSpc>
+              <a:spcBef>
+                <a:spcPts val="392"/>
+              </a:spcBef>
+              <a:buFont typeface="Arial" panose="020B0604020202020204" pitchFamily="34" charset="0"/>
+              <a:buNone/>
+              <a:defRPr sz="1569" kern="1200">
+                <a:solidFill>
+                  <a:schemeClr val="tx1"/>
+                </a:solidFill>
+                <a:latin typeface="+mn-lt"/>
+                <a:ea typeface="+mn-ea"/>
+                <a:cs typeface="+mn-cs"/>
+              </a:defRPr>
+            </a:lvl2pPr>
+            <a:lvl3pPr marL="717530" indent="0" algn="ctr" defTabSz="717530" rtl="0" eaLnBrk="1" latinLnBrk="0" hangingPunct="1">
+              <a:lnSpc>
+                <a:spcPct val="90000"/>
+              </a:lnSpc>
+              <a:spcBef>
+                <a:spcPts val="392"/>
+              </a:spcBef>
+              <a:buFont typeface="Arial" panose="020B0604020202020204" pitchFamily="34" charset="0"/>
+              <a:buNone/>
+              <a:defRPr sz="1412" kern="1200">
+                <a:solidFill>
+                  <a:schemeClr val="tx1"/>
+                </a:solidFill>
+                <a:latin typeface="+mn-lt"/>
+                <a:ea typeface="+mn-ea"/>
+                <a:cs typeface="+mn-cs"/>
+              </a:defRPr>
+            </a:lvl3pPr>
+            <a:lvl4pPr marL="1076295" indent="0" algn="ctr" defTabSz="717530" rtl="0" eaLnBrk="1" latinLnBrk="0" hangingPunct="1">
+              <a:lnSpc>
+                <a:spcPct val="90000"/>
+              </a:lnSpc>
+              <a:spcBef>
+                <a:spcPts val="392"/>
+              </a:spcBef>
+              <a:buFont typeface="Arial" panose="020B0604020202020204" pitchFamily="34" charset="0"/>
+              <a:buNone/>
+              <a:defRPr sz="1256" kern="1200">
+                <a:solidFill>
+                  <a:schemeClr val="tx1"/>
+                </a:solidFill>
+                <a:latin typeface="+mn-lt"/>
+                <a:ea typeface="+mn-ea"/>
+                <a:cs typeface="+mn-cs"/>
+              </a:defRPr>
+            </a:lvl4pPr>
+            <a:lvl5pPr marL="1435059" indent="0" algn="ctr" defTabSz="717530" rtl="0" eaLnBrk="1" latinLnBrk="0" hangingPunct="1">
+              <a:lnSpc>
+                <a:spcPct val="90000"/>
+              </a:lnSpc>
+              <a:spcBef>
+                <a:spcPts val="392"/>
+              </a:spcBef>
+              <a:buFont typeface="Arial" panose="020B0604020202020204" pitchFamily="34" charset="0"/>
+              <a:buNone/>
+              <a:defRPr sz="1256" kern="1200">
+                <a:solidFill>
+                  <a:schemeClr val="tx1"/>
+                </a:solidFill>
+                <a:latin typeface="+mn-lt"/>
+                <a:ea typeface="+mn-ea"/>
+                <a:cs typeface="+mn-cs"/>
+              </a:defRPr>
+            </a:lvl5pPr>
+            <a:lvl6pPr marL="1793824" indent="0" algn="ctr" defTabSz="717530" rtl="0" eaLnBrk="1" latinLnBrk="0" hangingPunct="1">
+              <a:lnSpc>
+                <a:spcPct val="90000"/>
+              </a:lnSpc>
+              <a:spcBef>
+                <a:spcPts val="392"/>
+              </a:spcBef>
+              <a:buFont typeface="Arial" panose="020B0604020202020204" pitchFamily="34" charset="0"/>
+              <a:buNone/>
+              <a:defRPr sz="1256" kern="1200">
+                <a:solidFill>
+                  <a:schemeClr val="tx1"/>
+                </a:solidFill>
+                <a:latin typeface="+mn-lt"/>
+                <a:ea typeface="+mn-ea"/>
+                <a:cs typeface="+mn-cs"/>
+              </a:defRPr>
+            </a:lvl6pPr>
+            <a:lvl7pPr marL="2152589" indent="0" algn="ctr" defTabSz="717530" rtl="0" eaLnBrk="1" latinLnBrk="0" hangingPunct="1">
+              <a:lnSpc>
+                <a:spcPct val="90000"/>
+              </a:lnSpc>
+              <a:spcBef>
+                <a:spcPts val="392"/>
+              </a:spcBef>
+              <a:buFont typeface="Arial" panose="020B0604020202020204" pitchFamily="34" charset="0"/>
+              <a:buNone/>
+              <a:defRPr sz="1256" kern="1200">
+                <a:solidFill>
+                  <a:schemeClr val="tx1"/>
+                </a:solidFill>
+                <a:latin typeface="+mn-lt"/>
+                <a:ea typeface="+mn-ea"/>
+                <a:cs typeface="+mn-cs"/>
+              </a:defRPr>
+            </a:lvl7pPr>
+            <a:lvl8pPr marL="2511354" indent="0" algn="ctr" defTabSz="717530" rtl="0" eaLnBrk="1" latinLnBrk="0" hangingPunct="1">
+              <a:lnSpc>
+                <a:spcPct val="90000"/>
+              </a:lnSpc>
+              <a:spcBef>
+                <a:spcPts val="392"/>
+              </a:spcBef>
+              <a:buFont typeface="Arial" panose="020B0604020202020204" pitchFamily="34" charset="0"/>
+              <a:buNone/>
+              <a:defRPr sz="1256" kern="1200">
+                <a:solidFill>
+                  <a:schemeClr val="tx1"/>
+                </a:solidFill>
+                <a:latin typeface="+mn-lt"/>
+                <a:ea typeface="+mn-ea"/>
+                <a:cs typeface="+mn-cs"/>
+              </a:defRPr>
+            </a:lvl8pPr>
+            <a:lvl9pPr marL="2870119" indent="0" algn="ctr" defTabSz="717530" rtl="0" eaLnBrk="1" latinLnBrk="0" hangingPunct="1">
+              <a:lnSpc>
+                <a:spcPct val="90000"/>
+              </a:lnSpc>
+              <a:spcBef>
+                <a:spcPts val="392"/>
+              </a:spcBef>
+              <a:buFont typeface="Arial" panose="020B0604020202020204" pitchFamily="34" charset="0"/>
+              <a:buNone/>
+              <a:defRPr sz="1256" kern="1200">
+                <a:solidFill>
+                  <a:schemeClr val="tx1"/>
+                </a:solidFill>
+                <a:latin typeface="+mn-lt"/>
+                <a:ea typeface="+mn-ea"/>
+                <a:cs typeface="+mn-cs"/>
+              </a:defRPr>
+            </a:lvl9pPr>
+          </a:lstStyle>
+          <a:p>
+            <a:pPr algn="l">
+              <a:lnSpc>
+                <a:spcPct val="145000"/>
+              </a:lnSpc>
+            </a:pPr>
+            <a:r>
+              <a:rPr lang="fr-FR" sz="800" dirty="0" smtClean="0">
+                <a:latin typeface="Stone Serif" pitchFamily="2" charset="0"/>
+              </a:rPr>
+              <a:t>Nadia </a:t>
+            </a:r>
+            <a:r>
+              <a:rPr lang="fr-FR" sz="800" dirty="0" err="1" smtClean="0">
+                <a:latin typeface="Stone Serif" pitchFamily="2" charset="0"/>
+              </a:rPr>
+              <a:t>Filali</a:t>
+            </a:r>
+            <a:r>
+              <a:rPr lang="fr-FR" sz="800" dirty="0" smtClean="0">
+                <a:latin typeface="Stone Serif" pitchFamily="2" charset="0"/>
+              </a:rPr>
+              <a:t>, </a:t>
+            </a:r>
+            <a:r>
+              <a:rPr lang="fr-FR" sz="800" dirty="0" err="1" smtClean="0">
+                <a:latin typeface="Stone Serif" pitchFamily="2" charset="0"/>
+              </a:rPr>
+              <a:t>Sajida</a:t>
+            </a:r>
+            <a:r>
+              <a:rPr lang="fr-FR" sz="800" dirty="0" smtClean="0">
+                <a:latin typeface="Stone Serif" pitchFamily="2" charset="0"/>
+              </a:rPr>
+              <a:t> </a:t>
+            </a:r>
+            <a:r>
+              <a:rPr lang="fr-FR" sz="800" dirty="0" err="1">
+                <a:latin typeface="Stone Serif" pitchFamily="2" charset="0"/>
+              </a:rPr>
+              <a:t>Zouarhi</a:t>
+            </a:r>
+            <a:r>
+              <a:rPr lang="fr-FR" sz="800" dirty="0">
+                <a:latin typeface="Stone Serif" pitchFamily="2" charset="0"/>
+              </a:rPr>
+              <a:t>, Luca </a:t>
+            </a:r>
+            <a:r>
+              <a:rPr lang="fr-FR" sz="800" dirty="0" err="1">
+                <a:latin typeface="Stone Serif" pitchFamily="2" charset="0"/>
+              </a:rPr>
+              <a:t>Comparini</a:t>
+            </a:r>
+            <a:r>
+              <a:rPr lang="fr-FR" sz="800" dirty="0">
+                <a:latin typeface="Stone Serif" pitchFamily="2" charset="0"/>
+              </a:rPr>
+              <a:t>, Xavier </a:t>
+            </a:r>
+            <a:r>
+              <a:rPr lang="fr-FR" sz="800" dirty="0" err="1">
+                <a:latin typeface="Stone Serif" pitchFamily="2" charset="0"/>
+              </a:rPr>
+              <a:t>Lavayssiere</a:t>
+            </a:r>
+            <a:r>
+              <a:rPr lang="fr-FR" sz="800" dirty="0">
+                <a:latin typeface="Stone Serif" pitchFamily="2" charset="0"/>
+              </a:rPr>
+              <a:t>, @</a:t>
+            </a:r>
+            <a:r>
+              <a:rPr lang="fr-FR" sz="800" dirty="0" err="1">
+                <a:latin typeface="Stone Serif" pitchFamily="2" charset="0"/>
+              </a:rPr>
+              <a:t>leshackeuses</a:t>
+            </a:r>
+            <a:endParaRPr lang="fr-FR" sz="800" dirty="0">
+              <a:latin typeface="Stone Serif" pitchFamily="2" charset="0"/>
+            </a:endParaRPr>
+          </a:p>
+        </p:txBody>
+      </p:sp>
+      <p:sp>
+        <p:nvSpPr>
+          <p:cNvPr id="16" name="ZoneTexte 15"/>
+          <p:cNvSpPr txBox="1"/>
+          <p:nvPr/>
+        </p:nvSpPr>
+        <p:spPr>
+          <a:xfrm>
+            <a:off x="432665" y="2668618"/>
+            <a:ext cx="3416321" cy="279307"/>
+          </a:xfrm>
+          <a:prstGeom prst="rect">
+            <a:avLst/>
+          </a:prstGeom>
+          <a:solidFill>
+            <a:srgbClr val="FFBDF5"/>
+          </a:solidFill>
+        </p:spPr>
+        <p:txBody>
+          <a:bodyPr wrap="square" rtlCol="0">
+            <a:spAutoFit/>
+          </a:bodyPr>
+          <a:lstStyle/>
+          <a:p>
+            <a:pPr>
+              <a:lnSpc>
+                <a:spcPct val="135000"/>
+              </a:lnSpc>
+            </a:pPr>
+            <a:r>
+              <a:rPr lang="fr-FR" sz="900" dirty="0" err="1" smtClean="0">
+                <a:latin typeface="Stone Serif" pitchFamily="2" charset="0"/>
+              </a:rPr>
+              <a:t>Influencers</a:t>
+            </a:r>
+            <a:r>
+              <a:rPr lang="fr-FR" sz="900" dirty="0" smtClean="0">
+                <a:latin typeface="Stone Serif" pitchFamily="2" charset="0"/>
+              </a:rPr>
+              <a:t> to </a:t>
+            </a:r>
+            <a:r>
+              <a:rPr lang="fr-FR" sz="900" dirty="0" err="1" smtClean="0">
+                <a:latin typeface="Stone Serif" pitchFamily="2" charset="0"/>
+              </a:rPr>
+              <a:t>follow</a:t>
+            </a:r>
+            <a:endParaRPr lang="fr-FR" sz="900" dirty="0" smtClean="0">
+              <a:latin typeface="Stone Serif" pitchFamily="2" charset="0"/>
+            </a:endParaRPr>
+          </a:p>
+        </p:txBody>
+      </p:sp>
+      <p:pic>
+        <p:nvPicPr>
+          <p:cNvPr id="28" name="Image 27"/>
+          <p:cNvPicPr>
+            <a:picLocks noChangeAspect="1"/>
+          </p:cNvPicPr>
+          <p:nvPr/>
+        </p:nvPicPr>
+        <p:blipFill>
+          <a:blip r:embed="rId2" cstate="print">
+            <a:extLst>
+              <a:ext uri="{28A0092B-C50C-407E-A947-70E740481C1C}">
+                <a14:useLocalDpi xmlns:a14="http://schemas.microsoft.com/office/drawing/2010/main" val="0"/>
+              </a:ext>
+            </a:extLst>
+          </a:blip>
+          <a:stretch>
+            <a:fillRect/>
+          </a:stretch>
+        </p:blipFill>
+        <p:spPr>
+          <a:xfrm rot="16200000">
+            <a:off x="-120915" y="4769262"/>
+            <a:ext cx="672857" cy="278333"/>
+          </a:xfrm>
+          <a:prstGeom prst="rect">
+            <a:avLst/>
+          </a:prstGeom>
+        </p:spPr>
+      </p:pic>
+      <p:sp>
+        <p:nvSpPr>
+          <p:cNvPr id="29" name="ZoneTexte 28"/>
+          <p:cNvSpPr txBox="1"/>
+          <p:nvPr/>
+        </p:nvSpPr>
+        <p:spPr>
+          <a:xfrm rot="16200000">
+            <a:off x="-881993" y="3351266"/>
+            <a:ext cx="2340098" cy="230832"/>
+          </a:xfrm>
+          <a:prstGeom prst="rect">
+            <a:avLst/>
+          </a:prstGeom>
+          <a:noFill/>
+          <a:ln>
+            <a:noFill/>
+          </a:ln>
+        </p:spPr>
+        <p:txBody>
+          <a:bodyPr wrap="square" rtlCol="0">
+            <a:spAutoFit/>
+          </a:bodyPr>
+          <a:lstStyle/>
+          <a:p>
+            <a:r>
+              <a:rPr lang="fr-FR" sz="700" dirty="0" smtClean="0"/>
+              <a:t>Pour aller plus </a:t>
+            </a:r>
+            <a:r>
+              <a:rPr lang="fr-FR" sz="700" dirty="0"/>
+              <a:t>loin : </a:t>
+            </a:r>
+            <a:r>
+              <a:rPr lang="fr-FR" sz="700" dirty="0">
+                <a:hlinkClick r:id="rId3"/>
+              </a:rPr>
+              <a:t>https://</a:t>
+            </a:r>
+            <a:r>
+              <a:rPr lang="fr-FR" sz="900" dirty="0" smtClean="0">
+                <a:hlinkClick r:id="rId3"/>
+              </a:rPr>
+              <a:t>emlyon.github.io/mk99</a:t>
+            </a:r>
+            <a:r>
+              <a:rPr lang="fr-FR" sz="700" dirty="0" smtClean="0"/>
+              <a:t>  </a:t>
+            </a:r>
+            <a:endParaRPr lang="fr-FR" sz="700" dirty="0"/>
+          </a:p>
+        </p:txBody>
+      </p:sp>
+      <p:sp>
+        <p:nvSpPr>
+          <p:cNvPr id="23" name="Sous-titre 2"/>
+          <p:cNvSpPr txBox="1">
+            <a:spLocks/>
+          </p:cNvSpPr>
+          <p:nvPr/>
+        </p:nvSpPr>
+        <p:spPr>
+          <a:xfrm>
+            <a:off x="432368" y="3852847"/>
+            <a:ext cx="1311374" cy="1292778"/>
+          </a:xfrm>
+          <a:prstGeom prst="rect">
+            <a:avLst/>
+          </a:prstGeom>
+          <a:ln>
+            <a:solidFill>
+              <a:schemeClr val="tx1"/>
+            </a:solidFill>
+            <a:prstDash val="dash"/>
+          </a:ln>
+        </p:spPr>
+        <p:txBody>
+          <a:bodyPr vert="horz" lIns="91440" tIns="45720" rIns="91440" bIns="45720" rtlCol="0">
+            <a:normAutofit/>
+          </a:bodyPr>
+          <a:lstStyle>
+            <a:lvl1pPr marL="0" indent="0" algn="ctr" defTabSz="717530" rtl="0" eaLnBrk="1" latinLnBrk="0" hangingPunct="1">
+              <a:lnSpc>
+                <a:spcPct val="90000"/>
+              </a:lnSpc>
+              <a:spcBef>
+                <a:spcPts val="785"/>
+              </a:spcBef>
+              <a:buFont typeface="Arial" panose="020B0604020202020204" pitchFamily="34" charset="0"/>
+              <a:buNone/>
+              <a:defRPr sz="1883" kern="1200">
+                <a:solidFill>
+                  <a:schemeClr val="tx1"/>
+                </a:solidFill>
+                <a:latin typeface="+mn-lt"/>
+                <a:ea typeface="+mn-ea"/>
+                <a:cs typeface="+mn-cs"/>
+              </a:defRPr>
+            </a:lvl1pPr>
+            <a:lvl2pPr marL="358765" indent="0" algn="ctr" defTabSz="717530" rtl="0" eaLnBrk="1" latinLnBrk="0" hangingPunct="1">
+              <a:lnSpc>
+                <a:spcPct val="90000"/>
+              </a:lnSpc>
+              <a:spcBef>
+                <a:spcPts val="392"/>
+              </a:spcBef>
+              <a:buFont typeface="Arial" panose="020B0604020202020204" pitchFamily="34" charset="0"/>
+              <a:buNone/>
+              <a:defRPr sz="1569" kern="1200">
+                <a:solidFill>
+                  <a:schemeClr val="tx1"/>
+                </a:solidFill>
+                <a:latin typeface="+mn-lt"/>
+                <a:ea typeface="+mn-ea"/>
+                <a:cs typeface="+mn-cs"/>
+              </a:defRPr>
+            </a:lvl2pPr>
+            <a:lvl3pPr marL="717530" indent="0" algn="ctr" defTabSz="717530" rtl="0" eaLnBrk="1" latinLnBrk="0" hangingPunct="1">
+              <a:lnSpc>
+                <a:spcPct val="90000"/>
+              </a:lnSpc>
+              <a:spcBef>
+                <a:spcPts val="392"/>
+              </a:spcBef>
+              <a:buFont typeface="Arial" panose="020B0604020202020204" pitchFamily="34" charset="0"/>
+              <a:buNone/>
+              <a:defRPr sz="1412" kern="1200">
+                <a:solidFill>
+                  <a:schemeClr val="tx1"/>
+                </a:solidFill>
+                <a:latin typeface="+mn-lt"/>
+                <a:ea typeface="+mn-ea"/>
+                <a:cs typeface="+mn-cs"/>
+              </a:defRPr>
+            </a:lvl3pPr>
+            <a:lvl4pPr marL="1076295" indent="0" algn="ctr" defTabSz="717530" rtl="0" eaLnBrk="1" latinLnBrk="0" hangingPunct="1">
+              <a:lnSpc>
+                <a:spcPct val="90000"/>
+              </a:lnSpc>
+              <a:spcBef>
+                <a:spcPts val="392"/>
+              </a:spcBef>
+              <a:buFont typeface="Arial" panose="020B0604020202020204" pitchFamily="34" charset="0"/>
+              <a:buNone/>
+              <a:defRPr sz="1256" kern="1200">
+                <a:solidFill>
+                  <a:schemeClr val="tx1"/>
+                </a:solidFill>
+                <a:latin typeface="+mn-lt"/>
+                <a:ea typeface="+mn-ea"/>
+                <a:cs typeface="+mn-cs"/>
+              </a:defRPr>
+            </a:lvl4pPr>
+            <a:lvl5pPr marL="1435059" indent="0" algn="ctr" defTabSz="717530" rtl="0" eaLnBrk="1" latinLnBrk="0" hangingPunct="1">
+              <a:lnSpc>
+                <a:spcPct val="90000"/>
+              </a:lnSpc>
+              <a:spcBef>
+                <a:spcPts val="392"/>
+              </a:spcBef>
+              <a:buFont typeface="Arial" panose="020B0604020202020204" pitchFamily="34" charset="0"/>
+              <a:buNone/>
+              <a:defRPr sz="1256" kern="1200">
+                <a:solidFill>
+                  <a:schemeClr val="tx1"/>
+                </a:solidFill>
+                <a:latin typeface="+mn-lt"/>
+                <a:ea typeface="+mn-ea"/>
+                <a:cs typeface="+mn-cs"/>
+              </a:defRPr>
+            </a:lvl5pPr>
+            <a:lvl6pPr marL="1793824" indent="0" algn="ctr" defTabSz="717530" rtl="0" eaLnBrk="1" latinLnBrk="0" hangingPunct="1">
+              <a:lnSpc>
+                <a:spcPct val="90000"/>
+              </a:lnSpc>
+              <a:spcBef>
+                <a:spcPts val="392"/>
+              </a:spcBef>
+              <a:buFont typeface="Arial" panose="020B0604020202020204" pitchFamily="34" charset="0"/>
+              <a:buNone/>
+              <a:defRPr sz="1256" kern="1200">
+                <a:solidFill>
+                  <a:schemeClr val="tx1"/>
+                </a:solidFill>
+                <a:latin typeface="+mn-lt"/>
+                <a:ea typeface="+mn-ea"/>
+                <a:cs typeface="+mn-cs"/>
+              </a:defRPr>
+            </a:lvl6pPr>
+            <a:lvl7pPr marL="2152589" indent="0" algn="ctr" defTabSz="717530" rtl="0" eaLnBrk="1" latinLnBrk="0" hangingPunct="1">
+              <a:lnSpc>
+                <a:spcPct val="90000"/>
+              </a:lnSpc>
+              <a:spcBef>
+                <a:spcPts val="392"/>
+              </a:spcBef>
+              <a:buFont typeface="Arial" panose="020B0604020202020204" pitchFamily="34" charset="0"/>
+              <a:buNone/>
+              <a:defRPr sz="1256" kern="1200">
+                <a:solidFill>
+                  <a:schemeClr val="tx1"/>
+                </a:solidFill>
+                <a:latin typeface="+mn-lt"/>
+                <a:ea typeface="+mn-ea"/>
+                <a:cs typeface="+mn-cs"/>
+              </a:defRPr>
+            </a:lvl7pPr>
+            <a:lvl8pPr marL="2511354" indent="0" algn="ctr" defTabSz="717530" rtl="0" eaLnBrk="1" latinLnBrk="0" hangingPunct="1">
+              <a:lnSpc>
+                <a:spcPct val="90000"/>
+              </a:lnSpc>
+              <a:spcBef>
+                <a:spcPts val="392"/>
+              </a:spcBef>
+              <a:buFont typeface="Arial" panose="020B0604020202020204" pitchFamily="34" charset="0"/>
+              <a:buNone/>
+              <a:defRPr sz="1256" kern="1200">
+                <a:solidFill>
+                  <a:schemeClr val="tx1"/>
+                </a:solidFill>
+                <a:latin typeface="+mn-lt"/>
+                <a:ea typeface="+mn-ea"/>
+                <a:cs typeface="+mn-cs"/>
+              </a:defRPr>
+            </a:lvl8pPr>
+            <a:lvl9pPr marL="2870119" indent="0" algn="ctr" defTabSz="717530" rtl="0" eaLnBrk="1" latinLnBrk="0" hangingPunct="1">
+              <a:lnSpc>
+                <a:spcPct val="90000"/>
+              </a:lnSpc>
+              <a:spcBef>
+                <a:spcPts val="392"/>
+              </a:spcBef>
+              <a:buFont typeface="Arial" panose="020B0604020202020204" pitchFamily="34" charset="0"/>
+              <a:buNone/>
+              <a:defRPr sz="1256" kern="1200">
+                <a:solidFill>
+                  <a:schemeClr val="tx1"/>
+                </a:solidFill>
+                <a:latin typeface="+mn-lt"/>
+                <a:ea typeface="+mn-ea"/>
+                <a:cs typeface="+mn-cs"/>
+              </a:defRPr>
+            </a:lvl9pPr>
+          </a:lstStyle>
+          <a:p>
+            <a:pPr algn="l">
+              <a:lnSpc>
+                <a:spcPct val="135000"/>
+              </a:lnSpc>
+            </a:pPr>
+            <a:r>
+              <a:rPr lang="en-US" sz="800" b="1" dirty="0" err="1">
+                <a:latin typeface="Stone Serif" pitchFamily="2" charset="0"/>
+              </a:rPr>
+              <a:t>Quantmetry</a:t>
+            </a:r>
+            <a:r>
+              <a:rPr lang="en-US" sz="800" b="1" dirty="0">
+                <a:latin typeface="Stone Serif" pitchFamily="2" charset="0"/>
+              </a:rPr>
+              <a:t> </a:t>
+            </a:r>
+            <a:r>
+              <a:rPr lang="en-US" sz="800" dirty="0">
+                <a:latin typeface="Stone Serif" pitchFamily="2" charset="0"/>
+              </a:rPr>
+              <a:t>uses the </a:t>
+            </a:r>
+            <a:r>
+              <a:rPr lang="en-US" sz="800" dirty="0" err="1">
+                <a:latin typeface="Stone Serif" pitchFamily="2" charset="0"/>
+              </a:rPr>
+              <a:t>blockchain</a:t>
+            </a:r>
+            <a:r>
+              <a:rPr lang="en-US" sz="800" dirty="0">
+                <a:latin typeface="Stone Serif" pitchFamily="2" charset="0"/>
+              </a:rPr>
+              <a:t> to ensure the transfer of assets (here, datasets) between stakeholders, without </a:t>
+            </a:r>
+            <a:r>
+              <a:rPr lang="en-US" sz="800" dirty="0" smtClean="0">
+                <a:latin typeface="Stone Serif" pitchFamily="2" charset="0"/>
+              </a:rPr>
+              <a:t>the need for trusted </a:t>
+            </a:r>
+            <a:r>
+              <a:rPr lang="en-US" sz="800" dirty="0">
+                <a:latin typeface="Stone Serif" pitchFamily="2" charset="0"/>
+              </a:rPr>
+              <a:t>third parties.</a:t>
+            </a:r>
+            <a:endParaRPr lang="fr-FR" sz="800" dirty="0">
+              <a:latin typeface="Stone Serif" pitchFamily="2" charset="0"/>
+            </a:endParaRPr>
+          </a:p>
+        </p:txBody>
+      </p:sp>
+      <p:sp>
+        <p:nvSpPr>
+          <p:cNvPr id="24" name="Sous-titre 2"/>
+          <p:cNvSpPr txBox="1">
+            <a:spLocks/>
+          </p:cNvSpPr>
+          <p:nvPr/>
+        </p:nvSpPr>
+        <p:spPr>
+          <a:xfrm>
+            <a:off x="3668954" y="3846212"/>
+            <a:ext cx="1073169" cy="1276467"/>
+          </a:xfrm>
+          <a:prstGeom prst="rect">
+            <a:avLst/>
+          </a:prstGeom>
+          <a:ln>
+            <a:solidFill>
+              <a:schemeClr val="tx1"/>
+            </a:solidFill>
+            <a:prstDash val="dash"/>
+          </a:ln>
+        </p:spPr>
+        <p:txBody>
+          <a:bodyPr vert="horz" lIns="91440" tIns="45720" rIns="91440" bIns="45720" rtlCol="0">
+            <a:normAutofit/>
+          </a:bodyPr>
+          <a:lstStyle>
+            <a:lvl1pPr marL="0" indent="0" algn="ctr" defTabSz="717530" rtl="0" eaLnBrk="1" latinLnBrk="0" hangingPunct="1">
+              <a:lnSpc>
+                <a:spcPct val="90000"/>
+              </a:lnSpc>
+              <a:spcBef>
+                <a:spcPts val="785"/>
+              </a:spcBef>
+              <a:buFont typeface="Arial" panose="020B0604020202020204" pitchFamily="34" charset="0"/>
+              <a:buNone/>
+              <a:defRPr sz="1883" kern="1200">
+                <a:solidFill>
+                  <a:schemeClr val="tx1"/>
+                </a:solidFill>
+                <a:latin typeface="+mn-lt"/>
+                <a:ea typeface="+mn-ea"/>
+                <a:cs typeface="+mn-cs"/>
+              </a:defRPr>
+            </a:lvl1pPr>
+            <a:lvl2pPr marL="358765" indent="0" algn="ctr" defTabSz="717530" rtl="0" eaLnBrk="1" latinLnBrk="0" hangingPunct="1">
+              <a:lnSpc>
+                <a:spcPct val="90000"/>
+              </a:lnSpc>
+              <a:spcBef>
+                <a:spcPts val="392"/>
+              </a:spcBef>
+              <a:buFont typeface="Arial" panose="020B0604020202020204" pitchFamily="34" charset="0"/>
+              <a:buNone/>
+              <a:defRPr sz="1569" kern="1200">
+                <a:solidFill>
+                  <a:schemeClr val="tx1"/>
+                </a:solidFill>
+                <a:latin typeface="+mn-lt"/>
+                <a:ea typeface="+mn-ea"/>
+                <a:cs typeface="+mn-cs"/>
+              </a:defRPr>
+            </a:lvl2pPr>
+            <a:lvl3pPr marL="717530" indent="0" algn="ctr" defTabSz="717530" rtl="0" eaLnBrk="1" latinLnBrk="0" hangingPunct="1">
+              <a:lnSpc>
+                <a:spcPct val="90000"/>
+              </a:lnSpc>
+              <a:spcBef>
+                <a:spcPts val="392"/>
+              </a:spcBef>
+              <a:buFont typeface="Arial" panose="020B0604020202020204" pitchFamily="34" charset="0"/>
+              <a:buNone/>
+              <a:defRPr sz="1412" kern="1200">
+                <a:solidFill>
+                  <a:schemeClr val="tx1"/>
+                </a:solidFill>
+                <a:latin typeface="+mn-lt"/>
+                <a:ea typeface="+mn-ea"/>
+                <a:cs typeface="+mn-cs"/>
+              </a:defRPr>
+            </a:lvl3pPr>
+            <a:lvl4pPr marL="1076295" indent="0" algn="ctr" defTabSz="717530" rtl="0" eaLnBrk="1" latinLnBrk="0" hangingPunct="1">
+              <a:lnSpc>
+                <a:spcPct val="90000"/>
+              </a:lnSpc>
+              <a:spcBef>
+                <a:spcPts val="392"/>
+              </a:spcBef>
+              <a:buFont typeface="Arial" panose="020B0604020202020204" pitchFamily="34" charset="0"/>
+              <a:buNone/>
+              <a:defRPr sz="1256" kern="1200">
+                <a:solidFill>
+                  <a:schemeClr val="tx1"/>
+                </a:solidFill>
+                <a:latin typeface="+mn-lt"/>
+                <a:ea typeface="+mn-ea"/>
+                <a:cs typeface="+mn-cs"/>
+              </a:defRPr>
+            </a:lvl4pPr>
+            <a:lvl5pPr marL="1435059" indent="0" algn="ctr" defTabSz="717530" rtl="0" eaLnBrk="1" latinLnBrk="0" hangingPunct="1">
+              <a:lnSpc>
+                <a:spcPct val="90000"/>
+              </a:lnSpc>
+              <a:spcBef>
+                <a:spcPts val="392"/>
+              </a:spcBef>
+              <a:buFont typeface="Arial" panose="020B0604020202020204" pitchFamily="34" charset="0"/>
+              <a:buNone/>
+              <a:defRPr sz="1256" kern="1200">
+                <a:solidFill>
+                  <a:schemeClr val="tx1"/>
+                </a:solidFill>
+                <a:latin typeface="+mn-lt"/>
+                <a:ea typeface="+mn-ea"/>
+                <a:cs typeface="+mn-cs"/>
+              </a:defRPr>
+            </a:lvl5pPr>
+            <a:lvl6pPr marL="1793824" indent="0" algn="ctr" defTabSz="717530" rtl="0" eaLnBrk="1" latinLnBrk="0" hangingPunct="1">
+              <a:lnSpc>
+                <a:spcPct val="90000"/>
+              </a:lnSpc>
+              <a:spcBef>
+                <a:spcPts val="392"/>
+              </a:spcBef>
+              <a:buFont typeface="Arial" panose="020B0604020202020204" pitchFamily="34" charset="0"/>
+              <a:buNone/>
+              <a:defRPr sz="1256" kern="1200">
+                <a:solidFill>
+                  <a:schemeClr val="tx1"/>
+                </a:solidFill>
+                <a:latin typeface="+mn-lt"/>
+                <a:ea typeface="+mn-ea"/>
+                <a:cs typeface="+mn-cs"/>
+              </a:defRPr>
+            </a:lvl6pPr>
+            <a:lvl7pPr marL="2152589" indent="0" algn="ctr" defTabSz="717530" rtl="0" eaLnBrk="1" latinLnBrk="0" hangingPunct="1">
+              <a:lnSpc>
+                <a:spcPct val="90000"/>
+              </a:lnSpc>
+              <a:spcBef>
+                <a:spcPts val="392"/>
+              </a:spcBef>
+              <a:buFont typeface="Arial" panose="020B0604020202020204" pitchFamily="34" charset="0"/>
+              <a:buNone/>
+              <a:defRPr sz="1256" kern="1200">
+                <a:solidFill>
+                  <a:schemeClr val="tx1"/>
+                </a:solidFill>
+                <a:latin typeface="+mn-lt"/>
+                <a:ea typeface="+mn-ea"/>
+                <a:cs typeface="+mn-cs"/>
+              </a:defRPr>
+            </a:lvl7pPr>
+            <a:lvl8pPr marL="2511354" indent="0" algn="ctr" defTabSz="717530" rtl="0" eaLnBrk="1" latinLnBrk="0" hangingPunct="1">
+              <a:lnSpc>
+                <a:spcPct val="90000"/>
+              </a:lnSpc>
+              <a:spcBef>
+                <a:spcPts val="392"/>
+              </a:spcBef>
+              <a:buFont typeface="Arial" panose="020B0604020202020204" pitchFamily="34" charset="0"/>
+              <a:buNone/>
+              <a:defRPr sz="1256" kern="1200">
+                <a:solidFill>
+                  <a:schemeClr val="tx1"/>
+                </a:solidFill>
+                <a:latin typeface="+mn-lt"/>
+                <a:ea typeface="+mn-ea"/>
+                <a:cs typeface="+mn-cs"/>
+              </a:defRPr>
+            </a:lvl8pPr>
+            <a:lvl9pPr marL="2870119" indent="0" algn="ctr" defTabSz="717530" rtl="0" eaLnBrk="1" latinLnBrk="0" hangingPunct="1">
+              <a:lnSpc>
+                <a:spcPct val="90000"/>
+              </a:lnSpc>
+              <a:spcBef>
+                <a:spcPts val="392"/>
+              </a:spcBef>
+              <a:buFont typeface="Arial" panose="020B0604020202020204" pitchFamily="34" charset="0"/>
+              <a:buNone/>
+              <a:defRPr sz="1256" kern="1200">
+                <a:solidFill>
+                  <a:schemeClr val="tx1"/>
+                </a:solidFill>
+                <a:latin typeface="+mn-lt"/>
+                <a:ea typeface="+mn-ea"/>
+                <a:cs typeface="+mn-cs"/>
+              </a:defRPr>
+            </a:lvl9pPr>
+          </a:lstStyle>
+          <a:p>
+            <a:pPr algn="l">
+              <a:lnSpc>
+                <a:spcPct val="135000"/>
+              </a:lnSpc>
+            </a:pPr>
+            <a:r>
+              <a:rPr lang="fr-FR" sz="800" b="1" dirty="0" err="1" smtClean="0">
+                <a:latin typeface="Stone Serif" pitchFamily="2" charset="0"/>
+              </a:rPr>
+              <a:t>BCDiploma</a:t>
+            </a:r>
+            <a:r>
+              <a:rPr lang="fr-FR" sz="800" dirty="0" smtClean="0">
+                <a:latin typeface="Stone Serif" pitchFamily="2" charset="0"/>
+              </a:rPr>
+              <a:t>: start-up </a:t>
+            </a:r>
+            <a:r>
+              <a:rPr lang="fr-FR" sz="800" dirty="0" err="1" smtClean="0">
+                <a:latin typeface="Stone Serif" pitchFamily="2" charset="0"/>
+              </a:rPr>
+              <a:t>developing</a:t>
+            </a:r>
+            <a:r>
+              <a:rPr lang="fr-FR" sz="800" dirty="0" smtClean="0">
+                <a:latin typeface="Stone Serif" pitchFamily="2" charset="0"/>
+              </a:rPr>
+              <a:t> a solution for the certification and authentification of </a:t>
+            </a:r>
+            <a:r>
+              <a:rPr lang="fr-FR" sz="800" dirty="0" err="1" smtClean="0">
+                <a:latin typeface="Stone Serif" pitchFamily="2" charset="0"/>
+              </a:rPr>
+              <a:t>diploma</a:t>
+            </a:r>
+            <a:r>
+              <a:rPr lang="fr-FR" sz="800" dirty="0" smtClean="0">
+                <a:latin typeface="Stone Serif" pitchFamily="2" charset="0"/>
+              </a:rPr>
+              <a:t>, </a:t>
+            </a:r>
+            <a:r>
+              <a:rPr lang="fr-FR" sz="800" dirty="0" err="1" smtClean="0">
+                <a:latin typeface="Stone Serif" pitchFamily="2" charset="0"/>
+              </a:rPr>
+              <a:t>across</a:t>
+            </a:r>
+            <a:r>
+              <a:rPr lang="fr-FR" sz="800" dirty="0" smtClean="0">
+                <a:latin typeface="Stone Serif" pitchFamily="2" charset="0"/>
+              </a:rPr>
+              <a:t> </a:t>
+            </a:r>
+            <a:r>
+              <a:rPr lang="fr-FR" sz="800" dirty="0" err="1" smtClean="0">
+                <a:latin typeface="Stone Serif" pitchFamily="2" charset="0"/>
+              </a:rPr>
+              <a:t>schools</a:t>
+            </a:r>
+            <a:r>
+              <a:rPr lang="fr-FR" sz="800" dirty="0" smtClean="0">
+                <a:latin typeface="Stone Serif" pitchFamily="2" charset="0"/>
+              </a:rPr>
+              <a:t>.</a:t>
+            </a:r>
+            <a:endParaRPr lang="fr-FR" sz="800" dirty="0">
+              <a:latin typeface="Stone Serif" pitchFamily="2" charset="0"/>
+            </a:endParaRPr>
+          </a:p>
+        </p:txBody>
+      </p:sp>
+      <p:sp>
+        <p:nvSpPr>
+          <p:cNvPr id="30" name="Sous-titre 2"/>
+          <p:cNvSpPr txBox="1">
+            <a:spLocks/>
+          </p:cNvSpPr>
+          <p:nvPr/>
+        </p:nvSpPr>
+        <p:spPr>
+          <a:xfrm>
+            <a:off x="1840155" y="3846268"/>
+            <a:ext cx="1732386" cy="1276411"/>
+          </a:xfrm>
+          <a:prstGeom prst="rect">
+            <a:avLst/>
+          </a:prstGeom>
+          <a:ln>
+            <a:solidFill>
+              <a:schemeClr val="tx1"/>
+            </a:solidFill>
+            <a:prstDash val="dash"/>
+          </a:ln>
+        </p:spPr>
+        <p:txBody>
+          <a:bodyPr vert="horz" lIns="91440" tIns="45720" rIns="91440" bIns="45720" rtlCol="0">
+            <a:noAutofit/>
+          </a:bodyPr>
+          <a:lstStyle>
+            <a:lvl1pPr marL="0" indent="0" algn="ctr" defTabSz="717530" rtl="0" eaLnBrk="1" latinLnBrk="0" hangingPunct="1">
+              <a:lnSpc>
+                <a:spcPct val="90000"/>
+              </a:lnSpc>
+              <a:spcBef>
+                <a:spcPts val="785"/>
+              </a:spcBef>
+              <a:buFont typeface="Arial" panose="020B0604020202020204" pitchFamily="34" charset="0"/>
+              <a:buNone/>
+              <a:defRPr sz="1883" kern="1200">
+                <a:solidFill>
+                  <a:schemeClr val="tx1"/>
+                </a:solidFill>
+                <a:latin typeface="+mn-lt"/>
+                <a:ea typeface="+mn-ea"/>
+                <a:cs typeface="+mn-cs"/>
+              </a:defRPr>
+            </a:lvl1pPr>
+            <a:lvl2pPr marL="358765" indent="0" algn="ctr" defTabSz="717530" rtl="0" eaLnBrk="1" latinLnBrk="0" hangingPunct="1">
+              <a:lnSpc>
+                <a:spcPct val="90000"/>
+              </a:lnSpc>
+              <a:spcBef>
+                <a:spcPts val="392"/>
+              </a:spcBef>
+              <a:buFont typeface="Arial" panose="020B0604020202020204" pitchFamily="34" charset="0"/>
+              <a:buNone/>
+              <a:defRPr sz="1569" kern="1200">
+                <a:solidFill>
+                  <a:schemeClr val="tx1"/>
+                </a:solidFill>
+                <a:latin typeface="+mn-lt"/>
+                <a:ea typeface="+mn-ea"/>
+                <a:cs typeface="+mn-cs"/>
+              </a:defRPr>
+            </a:lvl2pPr>
+            <a:lvl3pPr marL="717530" indent="0" algn="ctr" defTabSz="717530" rtl="0" eaLnBrk="1" latinLnBrk="0" hangingPunct="1">
+              <a:lnSpc>
+                <a:spcPct val="90000"/>
+              </a:lnSpc>
+              <a:spcBef>
+                <a:spcPts val="392"/>
+              </a:spcBef>
+              <a:buFont typeface="Arial" panose="020B0604020202020204" pitchFamily="34" charset="0"/>
+              <a:buNone/>
+              <a:defRPr sz="1412" kern="1200">
+                <a:solidFill>
+                  <a:schemeClr val="tx1"/>
+                </a:solidFill>
+                <a:latin typeface="+mn-lt"/>
+                <a:ea typeface="+mn-ea"/>
+                <a:cs typeface="+mn-cs"/>
+              </a:defRPr>
+            </a:lvl3pPr>
+            <a:lvl4pPr marL="1076295" indent="0" algn="ctr" defTabSz="717530" rtl="0" eaLnBrk="1" latinLnBrk="0" hangingPunct="1">
+              <a:lnSpc>
+                <a:spcPct val="90000"/>
+              </a:lnSpc>
+              <a:spcBef>
+                <a:spcPts val="392"/>
+              </a:spcBef>
+              <a:buFont typeface="Arial" panose="020B0604020202020204" pitchFamily="34" charset="0"/>
+              <a:buNone/>
+              <a:defRPr sz="1256" kern="1200">
+                <a:solidFill>
+                  <a:schemeClr val="tx1"/>
+                </a:solidFill>
+                <a:latin typeface="+mn-lt"/>
+                <a:ea typeface="+mn-ea"/>
+                <a:cs typeface="+mn-cs"/>
+              </a:defRPr>
+            </a:lvl4pPr>
+            <a:lvl5pPr marL="1435059" indent="0" algn="ctr" defTabSz="717530" rtl="0" eaLnBrk="1" latinLnBrk="0" hangingPunct="1">
+              <a:lnSpc>
+                <a:spcPct val="90000"/>
+              </a:lnSpc>
+              <a:spcBef>
+                <a:spcPts val="392"/>
+              </a:spcBef>
+              <a:buFont typeface="Arial" panose="020B0604020202020204" pitchFamily="34" charset="0"/>
+              <a:buNone/>
+              <a:defRPr sz="1256" kern="1200">
+                <a:solidFill>
+                  <a:schemeClr val="tx1"/>
+                </a:solidFill>
+                <a:latin typeface="+mn-lt"/>
+                <a:ea typeface="+mn-ea"/>
+                <a:cs typeface="+mn-cs"/>
+              </a:defRPr>
+            </a:lvl5pPr>
+            <a:lvl6pPr marL="1793824" indent="0" algn="ctr" defTabSz="717530" rtl="0" eaLnBrk="1" latinLnBrk="0" hangingPunct="1">
+              <a:lnSpc>
+                <a:spcPct val="90000"/>
+              </a:lnSpc>
+              <a:spcBef>
+                <a:spcPts val="392"/>
+              </a:spcBef>
+              <a:buFont typeface="Arial" panose="020B0604020202020204" pitchFamily="34" charset="0"/>
+              <a:buNone/>
+              <a:defRPr sz="1256" kern="1200">
+                <a:solidFill>
+                  <a:schemeClr val="tx1"/>
+                </a:solidFill>
+                <a:latin typeface="+mn-lt"/>
+                <a:ea typeface="+mn-ea"/>
+                <a:cs typeface="+mn-cs"/>
+              </a:defRPr>
+            </a:lvl6pPr>
+            <a:lvl7pPr marL="2152589" indent="0" algn="ctr" defTabSz="717530" rtl="0" eaLnBrk="1" latinLnBrk="0" hangingPunct="1">
+              <a:lnSpc>
+                <a:spcPct val="90000"/>
+              </a:lnSpc>
+              <a:spcBef>
+                <a:spcPts val="392"/>
+              </a:spcBef>
+              <a:buFont typeface="Arial" panose="020B0604020202020204" pitchFamily="34" charset="0"/>
+              <a:buNone/>
+              <a:defRPr sz="1256" kern="1200">
+                <a:solidFill>
+                  <a:schemeClr val="tx1"/>
+                </a:solidFill>
+                <a:latin typeface="+mn-lt"/>
+                <a:ea typeface="+mn-ea"/>
+                <a:cs typeface="+mn-cs"/>
+              </a:defRPr>
+            </a:lvl7pPr>
+            <a:lvl8pPr marL="2511354" indent="0" algn="ctr" defTabSz="717530" rtl="0" eaLnBrk="1" latinLnBrk="0" hangingPunct="1">
+              <a:lnSpc>
+                <a:spcPct val="90000"/>
+              </a:lnSpc>
+              <a:spcBef>
+                <a:spcPts val="392"/>
+              </a:spcBef>
+              <a:buFont typeface="Arial" panose="020B0604020202020204" pitchFamily="34" charset="0"/>
+              <a:buNone/>
+              <a:defRPr sz="1256" kern="1200">
+                <a:solidFill>
+                  <a:schemeClr val="tx1"/>
+                </a:solidFill>
+                <a:latin typeface="+mn-lt"/>
+                <a:ea typeface="+mn-ea"/>
+                <a:cs typeface="+mn-cs"/>
+              </a:defRPr>
+            </a:lvl8pPr>
+            <a:lvl9pPr marL="2870119" indent="0" algn="ctr" defTabSz="717530" rtl="0" eaLnBrk="1" latinLnBrk="0" hangingPunct="1">
+              <a:lnSpc>
+                <a:spcPct val="90000"/>
+              </a:lnSpc>
+              <a:spcBef>
+                <a:spcPts val="392"/>
+              </a:spcBef>
+              <a:buFont typeface="Arial" panose="020B0604020202020204" pitchFamily="34" charset="0"/>
+              <a:buNone/>
+              <a:defRPr sz="1256" kern="1200">
+                <a:solidFill>
+                  <a:schemeClr val="tx1"/>
+                </a:solidFill>
+                <a:latin typeface="+mn-lt"/>
+                <a:ea typeface="+mn-ea"/>
+                <a:cs typeface="+mn-cs"/>
+              </a:defRPr>
+            </a:lvl9pPr>
+          </a:lstStyle>
+          <a:p>
+            <a:pPr algn="l">
+              <a:lnSpc>
+                <a:spcPct val="135000"/>
+              </a:lnSpc>
+            </a:pPr>
+            <a:r>
+              <a:rPr lang="fr-FR" sz="800" b="1" dirty="0" err="1" smtClean="0">
+                <a:latin typeface="Stone Serif" pitchFamily="2" charset="0"/>
+              </a:rPr>
+              <a:t>bitcoin</a:t>
+            </a:r>
+            <a:r>
+              <a:rPr lang="fr-FR" sz="800" dirty="0" smtClean="0">
+                <a:latin typeface="Stone Serif" pitchFamily="2" charset="0"/>
+              </a:rPr>
+              <a:t> </a:t>
+            </a:r>
+            <a:r>
+              <a:rPr lang="en-US" sz="800" dirty="0">
+                <a:latin typeface="Stone Serif" pitchFamily="2" charset="0"/>
+              </a:rPr>
+              <a:t>- This currency uses the </a:t>
+            </a:r>
+            <a:r>
+              <a:rPr lang="en-US" sz="800" dirty="0" err="1">
+                <a:latin typeface="Stone Serif" pitchFamily="2" charset="0"/>
+              </a:rPr>
+              <a:t>blockchain</a:t>
+            </a:r>
+            <a:r>
+              <a:rPr lang="en-US" sz="800" dirty="0">
+                <a:latin typeface="Stone Serif" pitchFamily="2" charset="0"/>
+              </a:rPr>
+              <a:t> to determine </a:t>
+            </a:r>
+            <a:r>
+              <a:rPr lang="en-US" sz="800" dirty="0" smtClean="0">
+                <a:latin typeface="Stone Serif" pitchFamily="2" charset="0"/>
+              </a:rPr>
+              <a:t>how new currency units are created, </a:t>
+            </a:r>
+            <a:r>
+              <a:rPr lang="en-US" sz="800" dirty="0">
+                <a:latin typeface="Stone Serif" pitchFamily="2" charset="0"/>
+              </a:rPr>
+              <a:t>and to </a:t>
+            </a:r>
+            <a:r>
+              <a:rPr lang="en-US" sz="800" dirty="0" smtClean="0">
+                <a:latin typeface="Stone Serif" pitchFamily="2" charset="0"/>
+              </a:rPr>
+              <a:t>manage </a:t>
+            </a:r>
+            <a:r>
+              <a:rPr lang="en-US" sz="800" dirty="0">
+                <a:latin typeface="Stone Serif" pitchFamily="2" charset="0"/>
+              </a:rPr>
+              <a:t>financial transactions. </a:t>
+            </a:r>
+            <a:r>
+              <a:rPr lang="en-US" sz="800" dirty="0" err="1">
+                <a:latin typeface="Stone Serif" pitchFamily="2" charset="0"/>
+              </a:rPr>
+              <a:t>Bitcoin</a:t>
+            </a:r>
+            <a:r>
+              <a:rPr lang="en-US" sz="800" dirty="0">
+                <a:latin typeface="Stone Serif" pitchFamily="2" charset="0"/>
+              </a:rPr>
+              <a:t> was created as the first use case of the </a:t>
+            </a:r>
+            <a:r>
+              <a:rPr lang="en-US" sz="800" dirty="0" err="1">
+                <a:latin typeface="Stone Serif" pitchFamily="2" charset="0"/>
+              </a:rPr>
+              <a:t>blockchain</a:t>
+            </a:r>
+            <a:r>
+              <a:rPr lang="en-US" sz="800" dirty="0">
+                <a:latin typeface="Stone Serif" pitchFamily="2" charset="0"/>
+              </a:rPr>
+              <a:t> in 2009.</a:t>
+            </a:r>
+            <a:endParaRPr lang="fr-FR" sz="800" dirty="0">
+              <a:latin typeface="Stone Serif" pitchFamily="2" charset="0"/>
+            </a:endParaRPr>
+          </a:p>
+        </p:txBody>
+      </p:sp>
+      <p:sp>
+        <p:nvSpPr>
+          <p:cNvPr id="12" name="ZoneTexte 11"/>
+          <p:cNvSpPr txBox="1"/>
+          <p:nvPr/>
+        </p:nvSpPr>
+        <p:spPr>
+          <a:xfrm>
+            <a:off x="432658" y="3572412"/>
+            <a:ext cx="4309466" cy="320857"/>
+          </a:xfrm>
+          <a:prstGeom prst="rect">
+            <a:avLst/>
+          </a:prstGeom>
+          <a:solidFill>
+            <a:srgbClr val="FFBDF5"/>
+          </a:solidFill>
+        </p:spPr>
+        <p:txBody>
+          <a:bodyPr wrap="square" rtlCol="0">
+            <a:spAutoFit/>
+          </a:bodyPr>
+          <a:lstStyle/>
+          <a:p>
+            <a:pPr>
+              <a:lnSpc>
+                <a:spcPct val="135000"/>
+              </a:lnSpc>
+            </a:pPr>
+            <a:r>
+              <a:rPr lang="fr-FR" sz="1100" dirty="0" smtClean="0">
+                <a:latin typeface="Stone Serif" pitchFamily="2" charset="0"/>
+              </a:rPr>
+              <a:t>3 </a:t>
+            </a:r>
+            <a:r>
+              <a:rPr lang="fr-FR" sz="1100" dirty="0" smtClean="0">
+                <a:latin typeface="Stone Serif" pitchFamily="2" charset="0"/>
+              </a:rPr>
+              <a:t>use cases</a:t>
+            </a:r>
+            <a:endParaRPr lang="fr-FR" sz="1100" dirty="0">
+              <a:latin typeface="Stone Serif" pitchFamily="2" charset="0"/>
+            </a:endParaRPr>
+          </a:p>
+        </p:txBody>
+      </p:sp>
+      <p:sp>
+        <p:nvSpPr>
+          <p:cNvPr id="32" name="ZoneTexte 31"/>
+          <p:cNvSpPr txBox="1"/>
+          <p:nvPr/>
+        </p:nvSpPr>
+        <p:spPr>
+          <a:xfrm>
+            <a:off x="113682" y="28960"/>
+            <a:ext cx="934068" cy="300082"/>
+          </a:xfrm>
+          <a:prstGeom prst="rect">
+            <a:avLst/>
+          </a:prstGeom>
+          <a:solidFill>
+            <a:srgbClr val="FFBDF5"/>
+          </a:solidFill>
+        </p:spPr>
+        <p:txBody>
+          <a:bodyPr wrap="square" rtlCol="0">
+            <a:spAutoFit/>
+          </a:bodyPr>
+          <a:lstStyle/>
+          <a:p>
+            <a:pPr>
+              <a:lnSpc>
+                <a:spcPct val="135000"/>
+              </a:lnSpc>
+            </a:pPr>
+            <a:r>
+              <a:rPr lang="fr-FR" sz="1000" dirty="0" smtClean="0">
+                <a:latin typeface="Stone Serif" pitchFamily="2" charset="0"/>
+              </a:rPr>
+              <a:t>Techno</a:t>
+            </a:r>
+            <a:endParaRPr lang="fr-FR" sz="1000" dirty="0">
+              <a:latin typeface="Stone Serif" pitchFamily="2" charset="0"/>
+            </a:endParaRPr>
+          </a:p>
+        </p:txBody>
+      </p:sp>
+      <p:sp>
+        <p:nvSpPr>
+          <p:cNvPr id="18" name="Sous-titre 2"/>
+          <p:cNvSpPr txBox="1">
+            <a:spLocks/>
+          </p:cNvSpPr>
+          <p:nvPr/>
+        </p:nvSpPr>
+        <p:spPr>
+          <a:xfrm>
+            <a:off x="4880615" y="3824485"/>
+            <a:ext cx="2349525" cy="1298194"/>
+          </a:xfrm>
+          <a:prstGeom prst="rect">
+            <a:avLst/>
+          </a:prstGeom>
+          <a:ln>
+            <a:solidFill>
+              <a:schemeClr val="tx1"/>
+            </a:solidFill>
+            <a:prstDash val="dash"/>
+          </a:ln>
+        </p:spPr>
+        <p:txBody>
+          <a:bodyPr vert="horz" lIns="91440" tIns="45720" rIns="91440" bIns="45720" rtlCol="0">
+            <a:noAutofit/>
+          </a:bodyPr>
+          <a:lstStyle>
+            <a:lvl1pPr marL="0" indent="0" algn="ctr" defTabSz="717530" rtl="0" eaLnBrk="1" latinLnBrk="0" hangingPunct="1">
+              <a:lnSpc>
+                <a:spcPct val="90000"/>
+              </a:lnSpc>
+              <a:spcBef>
+                <a:spcPts val="785"/>
+              </a:spcBef>
+              <a:buFont typeface="Arial" panose="020B0604020202020204" pitchFamily="34" charset="0"/>
+              <a:buNone/>
+              <a:defRPr sz="1883" kern="1200">
+                <a:solidFill>
+                  <a:schemeClr val="tx1"/>
+                </a:solidFill>
+                <a:latin typeface="+mn-lt"/>
+                <a:ea typeface="+mn-ea"/>
+                <a:cs typeface="+mn-cs"/>
+              </a:defRPr>
+            </a:lvl1pPr>
+            <a:lvl2pPr marL="358765" indent="0" algn="ctr" defTabSz="717530" rtl="0" eaLnBrk="1" latinLnBrk="0" hangingPunct="1">
+              <a:lnSpc>
+                <a:spcPct val="90000"/>
+              </a:lnSpc>
+              <a:spcBef>
+                <a:spcPts val="392"/>
+              </a:spcBef>
+              <a:buFont typeface="Arial" panose="020B0604020202020204" pitchFamily="34" charset="0"/>
+              <a:buNone/>
+              <a:defRPr sz="1569" kern="1200">
+                <a:solidFill>
+                  <a:schemeClr val="tx1"/>
+                </a:solidFill>
+                <a:latin typeface="+mn-lt"/>
+                <a:ea typeface="+mn-ea"/>
+                <a:cs typeface="+mn-cs"/>
+              </a:defRPr>
+            </a:lvl2pPr>
+            <a:lvl3pPr marL="717530" indent="0" algn="ctr" defTabSz="717530" rtl="0" eaLnBrk="1" latinLnBrk="0" hangingPunct="1">
+              <a:lnSpc>
+                <a:spcPct val="90000"/>
+              </a:lnSpc>
+              <a:spcBef>
+                <a:spcPts val="392"/>
+              </a:spcBef>
+              <a:buFont typeface="Arial" panose="020B0604020202020204" pitchFamily="34" charset="0"/>
+              <a:buNone/>
+              <a:defRPr sz="1412" kern="1200">
+                <a:solidFill>
+                  <a:schemeClr val="tx1"/>
+                </a:solidFill>
+                <a:latin typeface="+mn-lt"/>
+                <a:ea typeface="+mn-ea"/>
+                <a:cs typeface="+mn-cs"/>
+              </a:defRPr>
+            </a:lvl3pPr>
+            <a:lvl4pPr marL="1076295" indent="0" algn="ctr" defTabSz="717530" rtl="0" eaLnBrk="1" latinLnBrk="0" hangingPunct="1">
+              <a:lnSpc>
+                <a:spcPct val="90000"/>
+              </a:lnSpc>
+              <a:spcBef>
+                <a:spcPts val="392"/>
+              </a:spcBef>
+              <a:buFont typeface="Arial" panose="020B0604020202020204" pitchFamily="34" charset="0"/>
+              <a:buNone/>
+              <a:defRPr sz="1256" kern="1200">
+                <a:solidFill>
+                  <a:schemeClr val="tx1"/>
+                </a:solidFill>
+                <a:latin typeface="+mn-lt"/>
+                <a:ea typeface="+mn-ea"/>
+                <a:cs typeface="+mn-cs"/>
+              </a:defRPr>
+            </a:lvl4pPr>
+            <a:lvl5pPr marL="1435059" indent="0" algn="ctr" defTabSz="717530" rtl="0" eaLnBrk="1" latinLnBrk="0" hangingPunct="1">
+              <a:lnSpc>
+                <a:spcPct val="90000"/>
+              </a:lnSpc>
+              <a:spcBef>
+                <a:spcPts val="392"/>
+              </a:spcBef>
+              <a:buFont typeface="Arial" panose="020B0604020202020204" pitchFamily="34" charset="0"/>
+              <a:buNone/>
+              <a:defRPr sz="1256" kern="1200">
+                <a:solidFill>
+                  <a:schemeClr val="tx1"/>
+                </a:solidFill>
+                <a:latin typeface="+mn-lt"/>
+                <a:ea typeface="+mn-ea"/>
+                <a:cs typeface="+mn-cs"/>
+              </a:defRPr>
+            </a:lvl5pPr>
+            <a:lvl6pPr marL="1793824" indent="0" algn="ctr" defTabSz="717530" rtl="0" eaLnBrk="1" latinLnBrk="0" hangingPunct="1">
+              <a:lnSpc>
+                <a:spcPct val="90000"/>
+              </a:lnSpc>
+              <a:spcBef>
+                <a:spcPts val="392"/>
+              </a:spcBef>
+              <a:buFont typeface="Arial" panose="020B0604020202020204" pitchFamily="34" charset="0"/>
+              <a:buNone/>
+              <a:defRPr sz="1256" kern="1200">
+                <a:solidFill>
+                  <a:schemeClr val="tx1"/>
+                </a:solidFill>
+                <a:latin typeface="+mn-lt"/>
+                <a:ea typeface="+mn-ea"/>
+                <a:cs typeface="+mn-cs"/>
+              </a:defRPr>
+            </a:lvl6pPr>
+            <a:lvl7pPr marL="2152589" indent="0" algn="ctr" defTabSz="717530" rtl="0" eaLnBrk="1" latinLnBrk="0" hangingPunct="1">
+              <a:lnSpc>
+                <a:spcPct val="90000"/>
+              </a:lnSpc>
+              <a:spcBef>
+                <a:spcPts val="392"/>
+              </a:spcBef>
+              <a:buFont typeface="Arial" panose="020B0604020202020204" pitchFamily="34" charset="0"/>
+              <a:buNone/>
+              <a:defRPr sz="1256" kern="1200">
+                <a:solidFill>
+                  <a:schemeClr val="tx1"/>
+                </a:solidFill>
+                <a:latin typeface="+mn-lt"/>
+                <a:ea typeface="+mn-ea"/>
+                <a:cs typeface="+mn-cs"/>
+              </a:defRPr>
+            </a:lvl7pPr>
+            <a:lvl8pPr marL="2511354" indent="0" algn="ctr" defTabSz="717530" rtl="0" eaLnBrk="1" latinLnBrk="0" hangingPunct="1">
+              <a:lnSpc>
+                <a:spcPct val="90000"/>
+              </a:lnSpc>
+              <a:spcBef>
+                <a:spcPts val="392"/>
+              </a:spcBef>
+              <a:buFont typeface="Arial" panose="020B0604020202020204" pitchFamily="34" charset="0"/>
+              <a:buNone/>
+              <a:defRPr sz="1256" kern="1200">
+                <a:solidFill>
+                  <a:schemeClr val="tx1"/>
+                </a:solidFill>
+                <a:latin typeface="+mn-lt"/>
+                <a:ea typeface="+mn-ea"/>
+                <a:cs typeface="+mn-cs"/>
+              </a:defRPr>
+            </a:lvl8pPr>
+            <a:lvl9pPr marL="2870119" indent="0" algn="ctr" defTabSz="717530" rtl="0" eaLnBrk="1" latinLnBrk="0" hangingPunct="1">
+              <a:lnSpc>
+                <a:spcPct val="90000"/>
+              </a:lnSpc>
+              <a:spcBef>
+                <a:spcPts val="392"/>
+              </a:spcBef>
+              <a:buFont typeface="Arial" panose="020B0604020202020204" pitchFamily="34" charset="0"/>
+              <a:buNone/>
+              <a:defRPr sz="1256" kern="1200">
+                <a:solidFill>
+                  <a:schemeClr val="tx1"/>
+                </a:solidFill>
+                <a:latin typeface="+mn-lt"/>
+                <a:ea typeface="+mn-ea"/>
+                <a:cs typeface="+mn-cs"/>
+              </a:defRPr>
+            </a:lvl9pPr>
+          </a:lstStyle>
+          <a:p>
+            <a:pPr algn="l">
+              <a:lnSpc>
+                <a:spcPct val="135000"/>
+              </a:lnSpc>
+            </a:pPr>
+            <a:r>
+              <a:rPr lang="en-US" sz="800" dirty="0">
+                <a:latin typeface="Stone Serif" pitchFamily="2" charset="0"/>
+              </a:rPr>
+              <a:t>Always ask yourself these questions before embarking on a </a:t>
+            </a:r>
+            <a:r>
+              <a:rPr lang="en-US" sz="800" dirty="0" err="1">
+                <a:latin typeface="Stone Serif" pitchFamily="2" charset="0"/>
+              </a:rPr>
+              <a:t>blockchain</a:t>
+            </a:r>
+            <a:r>
+              <a:rPr lang="en-US" sz="800" dirty="0">
+                <a:latin typeface="Stone Serif" pitchFamily="2" charset="0"/>
+              </a:rPr>
+              <a:t> project:</a:t>
+            </a:r>
+          </a:p>
+          <a:p>
+            <a:pPr marL="171450" indent="-171450" algn="l">
+              <a:lnSpc>
+                <a:spcPct val="135000"/>
+              </a:lnSpc>
+              <a:buFontTx/>
+              <a:buChar char="-"/>
+            </a:pPr>
+            <a:r>
+              <a:rPr lang="en-US" sz="800" dirty="0">
+                <a:latin typeface="Stone Serif" pitchFamily="2" charset="0"/>
+              </a:rPr>
+              <a:t>Does the project involve the need to do without a trusted third party</a:t>
+            </a:r>
+            <a:r>
+              <a:rPr lang="en-US" sz="800" dirty="0" smtClean="0">
+                <a:latin typeface="Stone Serif" pitchFamily="2" charset="0"/>
+              </a:rPr>
+              <a:t>?</a:t>
+            </a:r>
+          </a:p>
+          <a:p>
+            <a:pPr marL="171450" indent="-171450" algn="l">
+              <a:lnSpc>
+                <a:spcPct val="135000"/>
+              </a:lnSpc>
+              <a:buFontTx/>
+              <a:buChar char="-"/>
+            </a:pPr>
+            <a:r>
+              <a:rPr lang="en-US" sz="800" dirty="0" smtClean="0">
+                <a:latin typeface="Stone Serif" pitchFamily="2" charset="0"/>
+              </a:rPr>
+              <a:t>Would </a:t>
+            </a:r>
+            <a:r>
+              <a:rPr lang="en-US" sz="800" dirty="0">
+                <a:latin typeface="Stone Serif" pitchFamily="2" charset="0"/>
+              </a:rPr>
+              <a:t>a "classic" database suffice</a:t>
+            </a:r>
+            <a:r>
+              <a:rPr lang="en-US" sz="800" dirty="0" smtClean="0">
+                <a:latin typeface="Stone Serif" pitchFamily="2" charset="0"/>
+              </a:rPr>
+              <a:t>?</a:t>
+            </a:r>
+          </a:p>
+        </p:txBody>
+      </p:sp>
+      <p:sp>
+        <p:nvSpPr>
+          <p:cNvPr id="19" name="ZoneTexte 18"/>
+          <p:cNvSpPr txBox="1"/>
+          <p:nvPr/>
+        </p:nvSpPr>
+        <p:spPr>
+          <a:xfrm>
+            <a:off x="4880617" y="3581066"/>
+            <a:ext cx="2349524" cy="279307"/>
+          </a:xfrm>
+          <a:prstGeom prst="rect">
+            <a:avLst/>
+          </a:prstGeom>
+          <a:solidFill>
+            <a:srgbClr val="FFBDF5"/>
+          </a:solidFill>
+        </p:spPr>
+        <p:txBody>
+          <a:bodyPr wrap="square" rtlCol="0">
+            <a:spAutoFit/>
+          </a:bodyPr>
+          <a:lstStyle/>
+          <a:p>
+            <a:pPr>
+              <a:lnSpc>
+                <a:spcPct val="135000"/>
+              </a:lnSpc>
+            </a:pPr>
+            <a:r>
+              <a:rPr lang="fr-FR" sz="900" dirty="0" err="1" smtClean="0">
+                <a:latin typeface="Stone Serif" pitchFamily="2" charset="0"/>
+              </a:rPr>
+              <a:t>Traps</a:t>
+            </a:r>
+            <a:r>
+              <a:rPr lang="fr-FR" sz="900" dirty="0" smtClean="0">
+                <a:latin typeface="Stone Serif" pitchFamily="2" charset="0"/>
+              </a:rPr>
+              <a:t> to </a:t>
+            </a:r>
+            <a:r>
+              <a:rPr lang="fr-FR" sz="900" dirty="0" err="1" smtClean="0">
+                <a:latin typeface="Stone Serif" pitchFamily="2" charset="0"/>
+              </a:rPr>
+              <a:t>avoid</a:t>
+            </a:r>
+            <a:endParaRPr lang="fr-FR" sz="900" dirty="0">
+              <a:latin typeface="Stone Serif" pitchFamily="2" charset="0"/>
+            </a:endParaRPr>
+          </a:p>
+        </p:txBody>
+      </p:sp>
+    </p:spTree>
+    <p:extLst>
+      <p:ext uri="{BB962C8B-B14F-4D97-AF65-F5344CB8AC3E}">
+        <p14:creationId xmlns:p14="http://schemas.microsoft.com/office/powerpoint/2010/main" val="2008707808"/>
+      </p:ext>
+    </p:extLst>
+  </p:cSld>
+  <p:clrMapOvr>
+    <a:masterClrMapping/>
+  </p:clrMapOvr>
+</p:sld>
+</file>
+
 <file path=ppt/slides/slide2.xml><?xml version="1.0" encoding="utf-8"?>
 <p:sld xmlns:a="http://schemas.openxmlformats.org/drawingml/2006/main" xmlns:r="http://schemas.openxmlformats.org/officeDocument/2006/relationships" xmlns:p="http://schemas.openxmlformats.org/presentationml/2006/main">
   <p:cSld>
@@ -18411,22 +20977,16 @@
               <a:t>Cairo</a:t>
             </a:r>
             <a:r>
-              <a:rPr lang="fr-FR" sz="700">
+              <a:rPr lang="fr-FR" sz="700" dirty="0">
                 <a:latin typeface="Stone Serif" pitchFamily="2" charset="0"/>
               </a:rPr>
               <a:t>,</a:t>
             </a:r>
             <a:r>
-              <a:rPr lang="fr-FR" sz="700" smtClean="0">
-                <a:latin typeface="Stone Serif" pitchFamily="2" charset="0"/>
-              </a:rPr>
-              <a:t> </a:t>
-            </a:r>
-            <a:r>
               <a:rPr lang="fr-FR" sz="700" dirty="0" smtClean="0">
                 <a:latin typeface="Stone Serif" pitchFamily="2" charset="0"/>
               </a:rPr>
-              <a:t>Kim Rees</a:t>
+              <a:t> Kim Rees</a:t>
             </a:r>
             <a:endParaRPr lang="fr-FR" sz="700" dirty="0">
               <a:latin typeface="Stone Serif" pitchFamily="2" charset="0"/>

</xml_diff>

<commit_message>
fixed typo in blockchain EN card
</commit_message>
<xml_diff>
--- a/docs/content/en/cards-en.pptx
+++ b/docs/content/en/cards-en.pptx
@@ -9729,94 +9729,88 @@
               <a:rPr lang="en-US" sz="800" dirty="0" smtClean="0">
                 <a:latin typeface="Stone Serif" pitchFamily="2" charset="0"/>
               </a:rPr>
-              <a:t>with similarities to a </a:t>
+              <a:t>with similarities to </a:t>
+            </a:r>
+            <a:r>
+              <a:rPr lang="en-US" sz="800" smtClean="0">
+                <a:latin typeface="Stone Serif" pitchFamily="2" charset="0"/>
+              </a:rPr>
+              <a:t>a </a:t>
+            </a:r>
+            <a:r>
+              <a:rPr lang="en-US" sz="800" smtClean="0">
+                <a:latin typeface="Stone Serif" pitchFamily="2" charset="0"/>
+              </a:rPr>
+              <a:t>database: </a:t>
             </a:r>
             <a:r>
               <a:rPr lang="en-US" sz="800" dirty="0">
                 <a:latin typeface="Stone Serif" pitchFamily="2" charset="0"/>
               </a:rPr>
-              <a:t>database (</a:t>
+              <a:t>it allows </a:t>
+            </a:r>
+            <a:r>
+              <a:rPr lang="en-US" sz="800" dirty="0" smtClean="0">
+                <a:latin typeface="Stone Serif" pitchFamily="2" charset="0"/>
+              </a:rPr>
+              <a:t>to store and </a:t>
+            </a:r>
+            <a:r>
+              <a:rPr lang="en-US" sz="800" dirty="0">
+                <a:latin typeface="Stone Serif" pitchFamily="2" charset="0"/>
+              </a:rPr>
+              <a:t>access </a:t>
+            </a:r>
+            <a:r>
+              <a:rPr lang="en-US" sz="800" dirty="0" smtClean="0">
+                <a:latin typeface="Stone Serif" pitchFamily="2" charset="0"/>
+              </a:rPr>
+              <a:t>data on </a:t>
+            </a:r>
+            <a:r>
+              <a:rPr lang="en-US" sz="800" dirty="0">
+                <a:latin typeface="Stone Serif" pitchFamily="2" charset="0"/>
+              </a:rPr>
+              <a:t>a computer support. Unlike a database, the data stored on a </a:t>
             </a:r>
             <a:r>
               <a:rPr lang="en-US" sz="800" dirty="0" err="1">
                 <a:latin typeface="Stone Serif" pitchFamily="2" charset="0"/>
               </a:rPr>
-              <a:t>bdd</a:t>
+              <a:t>blockchain</a:t>
             </a:r>
             <a:r>
               <a:rPr lang="en-US" sz="800" dirty="0">
                 <a:latin typeface="Stone Serif" pitchFamily="2" charset="0"/>
               </a:rPr>
-              <a:t>): it allows </a:t>
+              <a:t> is </a:t>
             </a:r>
             <a:r>
               <a:rPr lang="en-US" sz="800" dirty="0" smtClean="0">
                 <a:latin typeface="Stone Serif" pitchFamily="2" charset="0"/>
               </a:rPr>
-              <a:t>to store and </a:t>
+              <a:t>unalterable</a:t>
             </a:r>
             <a:r>
               <a:rPr lang="en-US" sz="800" dirty="0">
                 <a:latin typeface="Stone Serif" pitchFamily="2" charset="0"/>
               </a:rPr>
-              <a:t>access </a:t>
+              <a:t>: it can not be deleted or modified. Another difference: the </a:t>
+            </a:r>
+            <a:r>
+              <a:rPr lang="en-US" sz="800" dirty="0" err="1">
+                <a:latin typeface="Stone Serif" pitchFamily="2" charset="0"/>
+              </a:rPr>
+              <a:t>blockchain</a:t>
+            </a:r>
+            <a:r>
+              <a:rPr lang="en-US" sz="800" dirty="0">
+                <a:latin typeface="Stone Serif" pitchFamily="2" charset="0"/>
+              </a:rPr>
+              <a:t> is not controlled by a particular actor: everyone has a copy. This ensures transparency and </a:t>
             </a:r>
             <a:r>
               <a:rPr lang="en-US" sz="800" dirty="0" smtClean="0">
-                <a:latin typeface="Stone Serif" pitchFamily="2" charset="0"/>
-              </a:rPr>
-              <a:t>data on </a:t>
-            </a:r>
-            <a:r>
-              <a:rPr lang="en-US" sz="800" dirty="0">
-                <a:latin typeface="Stone Serif" pitchFamily="2" charset="0"/>
-              </a:rPr>
-              <a:t>a computer support. Unlike a database, the data stored on a </a:t>
-            </a:r>
-            <a:r>
-              <a:rPr lang="en-US" sz="800" dirty="0" err="1">
-                <a:latin typeface="Stone Serif" pitchFamily="2" charset="0"/>
-              </a:rPr>
-              <a:t>blockchain</a:t>
-            </a:r>
-            <a:r>
-              <a:rPr lang="en-US" sz="800" dirty="0">
-                <a:latin typeface="Stone Serif" pitchFamily="2" charset="0"/>
-              </a:rPr>
-              <a:t> is </a:t>
-            </a:r>
-            <a:r>
-              <a:rPr lang="en-US" sz="800" dirty="0" smtClean="0">
-                <a:latin typeface="Stone Serif" pitchFamily="2" charset="0"/>
-              </a:rPr>
-              <a:t>unalterable</a:t>
-            </a:r>
-            <a:r>
-              <a:rPr lang="en-US" sz="800" dirty="0">
-                <a:latin typeface="Stone Serif" pitchFamily="2" charset="0"/>
-              </a:rPr>
-              <a:t>: it can not be deleted or modified. Another difference: the </a:t>
-            </a:r>
-            <a:r>
-              <a:rPr lang="en-US" sz="800" dirty="0" err="1">
-                <a:latin typeface="Stone Serif" pitchFamily="2" charset="0"/>
-              </a:rPr>
-              <a:t>blockchain</a:t>
-            </a:r>
-            <a:r>
-              <a:rPr lang="en-US" sz="800" dirty="0">
-                <a:latin typeface="Stone Serif" pitchFamily="2" charset="0"/>
-              </a:rPr>
-              <a:t> is not controlled by a particular actor: everyone has a copy. This ensures transparency </a:t>
-            </a:r>
-            <a:r>
-              <a:rPr lang="en-US" sz="800">
-                <a:latin typeface="Stone Serif" pitchFamily="2" charset="0"/>
-              </a:rPr>
-              <a:t>and </a:t>
-            </a:r>
-            <a:r>
-              <a:rPr lang="en-US" sz="800" smtClean="0">
                 <a:latin typeface="Stone Serif" pitchFamily="2" charset="0"/>
               </a:rPr>
               <a:t>inalterability</a:t>
@@ -11184,13 +11178,7 @@
               <a:rPr lang="fr-FR" sz="1100" dirty="0" smtClean="0">
                 <a:latin typeface="Stone Serif" pitchFamily="2" charset="0"/>
               </a:rPr>
-              <a:t>3 </a:t>
-            </a:r>
-            <a:r>
-              <a:rPr lang="fr-FR" sz="1100" dirty="0" smtClean="0">
-                <a:latin typeface="Stone Serif" pitchFamily="2" charset="0"/>
-              </a:rPr>
-              <a:t>use cases</a:t>
+              <a:t>3 use cases</a:t>
             </a:r>
             <a:endParaRPr lang="fr-FR" sz="1100" dirty="0">
               <a:latin typeface="Stone Serif" pitchFamily="2" charset="0"/>

</xml_diff>

<commit_message>
fixed typo and improved content on dataviz FR
</commit_message>
<xml_diff>
--- a/docs/content/en/cards-en.pptx
+++ b/docs/content/en/cards-en.pptx
@@ -9735,13 +9735,7 @@
               <a:rPr lang="en-US" sz="800" smtClean="0">
                 <a:latin typeface="Stone Serif" pitchFamily="2" charset="0"/>
               </a:rPr>
-              <a:t>a </a:t>
-            </a:r>
-            <a:r>
-              <a:rPr lang="en-US" sz="800" smtClean="0">
-                <a:latin typeface="Stone Serif" pitchFamily="2" charset="0"/>
-              </a:rPr>
-              <a:t>database: </a:t>
+              <a:t>a database: </a:t>
             </a:r>
             <a:r>
               <a:rPr lang="en-US" sz="800" dirty="0">
@@ -12081,27 +12075,39 @@
               <a:rPr lang="en-US" sz="700" dirty="0" smtClean="0">
                 <a:latin typeface="Stone Serif" pitchFamily="2" charset="0"/>
               </a:rPr>
-              <a:t>analysis suffices.</a:t>
+              <a:t>analysis suffices</a:t>
+            </a:r>
+            <a:r>
+              <a:rPr lang="en-US" sz="700" dirty="0" smtClean="0">
+                <a:latin typeface="Stone Serif" pitchFamily="2" charset="0"/>
+              </a:rPr>
+              <a:t>.</a:t>
+            </a:r>
+            <a:r>
+              <a:rPr lang="en-US" sz="700" dirty="0">
+                <a:latin typeface="Stone Serif" pitchFamily="2" charset="0"/>
+              </a:rPr>
+              <a:t/>
             </a:r>
             <a:br>
-              <a:rPr lang="en-US" sz="700" dirty="0" smtClean="0">
+              <a:rPr lang="en-US" sz="700" dirty="0">
                 <a:latin typeface="Stone Serif" pitchFamily="2" charset="0"/>
               </a:rPr>
             </a:br>
             <a:r>
-              <a:rPr lang="en-US" sz="700" dirty="0" smtClean="0">
+              <a:rPr lang="en-US" sz="700" dirty="0">
                 <a:latin typeface="Stone Serif" pitchFamily="2" charset="0"/>
               </a:rPr>
               <a:t>- treat AI results as ground truth. AI has biases which need an interdisciplinary team to identify and </a:t>
             </a:r>
             <a:r>
-              <a:rPr lang="en-US" sz="700" dirty="0" err="1" smtClean="0">
+              <a:rPr lang="en-US" sz="700" dirty="0" err="1">
                 <a:latin typeface="Stone Serif" pitchFamily="2" charset="0"/>
               </a:rPr>
               <a:t>debias</a:t>
             </a:r>
             <a:r>
-              <a:rPr lang="en-US" sz="700" dirty="0" smtClean="0">
+              <a:rPr lang="en-US" sz="700">
                 <a:latin typeface="Stone Serif" pitchFamily="2" charset="0"/>
               </a:rPr>
               <a:t>.</a:t>

</xml_diff>

<commit_message>
added card on platforms and updated segeco name to implid
</commit_message>
<xml_diff>
--- a/docs/content/en/cards-en.pptx
+++ b/docs/content/en/cards-en.pptx
@@ -5,10 +5,10 @@
     <p:sldMasterId id="2147483684" r:id="rId1"/>
   </p:sldMasterIdLst>
   <p:notesMasterIdLst>
-    <p:notesMasterId r:id="rId13"/>
+    <p:notesMasterId r:id="rId14"/>
   </p:notesMasterIdLst>
   <p:handoutMasterIdLst>
-    <p:handoutMasterId r:id="rId14"/>
+    <p:handoutMasterId r:id="rId15"/>
   </p:handoutMasterIdLst>
   <p:sldIdLst>
     <p:sldId id="256" r:id="rId2"/>
@@ -22,6 +22,7 @@
     <p:sldId id="264" r:id="rId10"/>
     <p:sldId id="265" r:id="rId11"/>
     <p:sldId id="269" r:id="rId12"/>
+    <p:sldId id="270" r:id="rId13"/>
   </p:sldIdLst>
   <p:sldSz cx="7559675" cy="5381625"/>
   <p:notesSz cx="9144000" cy="6858000"/>
@@ -121,6 +122,26 @@
     </a:lvl9pPr>
   </p:defaultTextStyle>
   <p:extLst>
+    <p:ext uri="{521415D9-36F7-43E2-AB2F-B90AF26B5E84}">
+      <p14:sectionLst xmlns:p14="http://schemas.microsoft.com/office/powerpoint/2010/main">
+        <p14:section name="Section par défaut" id="{B628272D-873C-421F-A34C-8131384487BB}">
+          <p14:sldIdLst>
+            <p14:sldId id="256"/>
+            <p14:sldId id="258"/>
+            <p14:sldId id="259"/>
+            <p14:sldId id="260"/>
+            <p14:sldId id="261"/>
+            <p14:sldId id="262"/>
+            <p14:sldId id="263"/>
+            <p14:sldId id="268"/>
+            <p14:sldId id="264"/>
+            <p14:sldId id="265"/>
+            <p14:sldId id="269"/>
+            <p14:sldId id="270"/>
+          </p14:sldIdLst>
+        </p14:section>
+      </p14:sectionLst>
+    </p:ext>
     <p:ext uri="{EFAFB233-063F-42B5-8137-9DF3F51BA10A}">
       <p15:sldGuideLst xmlns:p15="http://schemas.microsoft.com/office/powerpoint/2012/main"/>
     </p:ext>
@@ -210,7 +231,7 @@
           <a:p>
             <a:fld id="{D121557B-95DC-4F9D-80D7-494E711A263C}" type="datetimeFigureOut">
               <a:rPr lang="fr-FR" smtClean="0"/>
-              <a:t>16/05/2019</a:t>
+              <a:t>12/06/2019</a:t>
             </a:fld>
             <a:endParaRPr lang="fr-FR"/>
           </a:p>
@@ -376,7 +397,7 @@
           <a:p>
             <a:fld id="{34B0D5AD-2B20-4FC5-9805-AA792A2BEE79}" type="datetimeFigureOut">
               <a:rPr lang="fr-FR" smtClean="0"/>
-              <a:t>16/05/2019</a:t>
+              <a:t>12/06/2019</a:t>
             </a:fld>
             <a:endParaRPr lang="fr-FR"/>
           </a:p>
@@ -837,7 +858,7 @@
           <a:p>
             <a:fld id="{654FF092-CFE9-4329-97B3-D872B1066925}" type="datetimeFigureOut">
               <a:rPr lang="fr-FR" smtClean="0"/>
-              <a:t>16/05/2019</a:t>
+              <a:t>12/06/2019</a:t>
             </a:fld>
             <a:endParaRPr lang="fr-FR"/>
           </a:p>
@@ -1007,7 +1028,7 @@
           <a:p>
             <a:fld id="{654FF092-CFE9-4329-97B3-D872B1066925}" type="datetimeFigureOut">
               <a:rPr lang="fr-FR" smtClean="0"/>
-              <a:t>16/05/2019</a:t>
+              <a:t>12/06/2019</a:t>
             </a:fld>
             <a:endParaRPr lang="fr-FR"/>
           </a:p>
@@ -1187,7 +1208,7 @@
           <a:p>
             <a:fld id="{654FF092-CFE9-4329-97B3-D872B1066925}" type="datetimeFigureOut">
               <a:rPr lang="fr-FR" smtClean="0"/>
-              <a:t>16/05/2019</a:t>
+              <a:t>12/06/2019</a:t>
             </a:fld>
             <a:endParaRPr lang="fr-FR"/>
           </a:p>
@@ -1357,7 +1378,7 @@
           <a:p>
             <a:fld id="{654FF092-CFE9-4329-97B3-D872B1066925}" type="datetimeFigureOut">
               <a:rPr lang="fr-FR" smtClean="0"/>
-              <a:t>16/05/2019</a:t>
+              <a:t>12/06/2019</a:t>
             </a:fld>
             <a:endParaRPr lang="fr-FR"/>
           </a:p>
@@ -1601,7 +1622,7 @@
           <a:p>
             <a:fld id="{654FF092-CFE9-4329-97B3-D872B1066925}" type="datetimeFigureOut">
               <a:rPr lang="fr-FR" smtClean="0"/>
-              <a:t>16/05/2019</a:t>
+              <a:t>12/06/2019</a:t>
             </a:fld>
             <a:endParaRPr lang="fr-FR"/>
           </a:p>
@@ -1833,7 +1854,7 @@
           <a:p>
             <a:fld id="{654FF092-CFE9-4329-97B3-D872B1066925}" type="datetimeFigureOut">
               <a:rPr lang="fr-FR" smtClean="0"/>
-              <a:t>16/05/2019</a:t>
+              <a:t>12/06/2019</a:t>
             </a:fld>
             <a:endParaRPr lang="fr-FR"/>
           </a:p>
@@ -2200,7 +2221,7 @@
           <a:p>
             <a:fld id="{654FF092-CFE9-4329-97B3-D872B1066925}" type="datetimeFigureOut">
               <a:rPr lang="fr-FR" smtClean="0"/>
-              <a:t>16/05/2019</a:t>
+              <a:t>12/06/2019</a:t>
             </a:fld>
             <a:endParaRPr lang="fr-FR"/>
           </a:p>
@@ -2318,7 +2339,7 @@
           <a:p>
             <a:fld id="{654FF092-CFE9-4329-97B3-D872B1066925}" type="datetimeFigureOut">
               <a:rPr lang="fr-FR" smtClean="0"/>
-              <a:t>16/05/2019</a:t>
+              <a:t>12/06/2019</a:t>
             </a:fld>
             <a:endParaRPr lang="fr-FR"/>
           </a:p>
@@ -2413,7 +2434,7 @@
           <a:p>
             <a:fld id="{654FF092-CFE9-4329-97B3-D872B1066925}" type="datetimeFigureOut">
               <a:rPr lang="fr-FR" smtClean="0"/>
-              <a:t>16/05/2019</a:t>
+              <a:t>12/06/2019</a:t>
             </a:fld>
             <a:endParaRPr lang="fr-FR"/>
           </a:p>
@@ -2690,7 +2711,7 @@
           <a:p>
             <a:fld id="{654FF092-CFE9-4329-97B3-D872B1066925}" type="datetimeFigureOut">
               <a:rPr lang="fr-FR" smtClean="0"/>
-              <a:t>16/05/2019</a:t>
+              <a:t>12/06/2019</a:t>
             </a:fld>
             <a:endParaRPr lang="fr-FR"/>
           </a:p>
@@ -2947,7 +2968,7 @@
           <a:p>
             <a:fld id="{654FF092-CFE9-4329-97B3-D872B1066925}" type="datetimeFigureOut">
               <a:rPr lang="fr-FR" smtClean="0"/>
-              <a:t>16/05/2019</a:t>
+              <a:t>12/06/2019</a:t>
             </a:fld>
             <a:endParaRPr lang="fr-FR"/>
           </a:p>
@@ -3160,7 +3181,7 @@
           <a:p>
             <a:fld id="{654FF092-CFE9-4329-97B3-D872B1066925}" type="datetimeFigureOut">
               <a:rPr lang="fr-FR" smtClean="0"/>
-              <a:t>16/05/2019</a:t>
+              <a:t>12/06/2019</a:t>
             </a:fld>
             <a:endParaRPr lang="fr-FR"/>
           </a:p>
@@ -11553,6 +11574,2967 @@
 </p:sld>
 </file>
 
+<file path=ppt/slides/slide12.xml><?xml version="1.0" encoding="utf-8"?>
+<p:sld xmlns:a="http://schemas.openxmlformats.org/drawingml/2006/main" xmlns:r="http://schemas.openxmlformats.org/officeDocument/2006/relationships" xmlns:p="http://schemas.openxmlformats.org/presentationml/2006/main">
+  <p:cSld>
+    <p:spTree>
+      <p:nvGrpSpPr>
+        <p:cNvPr id="1" name=""/>
+        <p:cNvGrpSpPr/>
+        <p:nvPr/>
+      </p:nvGrpSpPr>
+      <p:grpSpPr>
+        <a:xfrm>
+          <a:off x="0" y="0"/>
+          <a:ext cx="0" cy="0"/>
+          <a:chOff x="0" y="0"/>
+          <a:chExt cx="0" cy="0"/>
+        </a:xfrm>
+      </p:grpSpPr>
+      <p:sp>
+        <p:nvSpPr>
+          <p:cNvPr id="17" name="Sous-titre 2"/>
+          <p:cNvSpPr txBox="1">
+            <a:spLocks/>
+          </p:cNvSpPr>
+          <p:nvPr/>
+        </p:nvSpPr>
+        <p:spPr>
+          <a:xfrm>
+            <a:off x="5394252" y="3866025"/>
+            <a:ext cx="1920948" cy="372529"/>
+          </a:xfrm>
+          <a:prstGeom prst="rect">
+            <a:avLst/>
+          </a:prstGeom>
+          <a:ln>
+            <a:solidFill>
+              <a:schemeClr val="tx1"/>
+            </a:solidFill>
+            <a:prstDash val="dash"/>
+          </a:ln>
+        </p:spPr>
+        <p:txBody>
+          <a:bodyPr vert="horz" lIns="91440" tIns="45720" rIns="91440" bIns="45720" rtlCol="0">
+            <a:noAutofit/>
+          </a:bodyPr>
+          <a:lstStyle>
+            <a:lvl1pPr marL="0" indent="0" algn="ctr" defTabSz="717530" rtl="0" eaLnBrk="1" latinLnBrk="0" hangingPunct="1">
+              <a:lnSpc>
+                <a:spcPct val="90000"/>
+              </a:lnSpc>
+              <a:spcBef>
+                <a:spcPts val="785"/>
+              </a:spcBef>
+              <a:buFont typeface="Arial" panose="020B0604020202020204" pitchFamily="34" charset="0"/>
+              <a:buNone/>
+              <a:defRPr sz="1883" kern="1200">
+                <a:solidFill>
+                  <a:schemeClr val="tx1"/>
+                </a:solidFill>
+                <a:latin typeface="+mn-lt"/>
+                <a:ea typeface="+mn-ea"/>
+                <a:cs typeface="+mn-cs"/>
+              </a:defRPr>
+            </a:lvl1pPr>
+            <a:lvl2pPr marL="358765" indent="0" algn="ctr" defTabSz="717530" rtl="0" eaLnBrk="1" latinLnBrk="0" hangingPunct="1">
+              <a:lnSpc>
+                <a:spcPct val="90000"/>
+              </a:lnSpc>
+              <a:spcBef>
+                <a:spcPts val="392"/>
+              </a:spcBef>
+              <a:buFont typeface="Arial" panose="020B0604020202020204" pitchFamily="34" charset="0"/>
+              <a:buNone/>
+              <a:defRPr sz="1569" kern="1200">
+                <a:solidFill>
+                  <a:schemeClr val="tx1"/>
+                </a:solidFill>
+                <a:latin typeface="+mn-lt"/>
+                <a:ea typeface="+mn-ea"/>
+                <a:cs typeface="+mn-cs"/>
+              </a:defRPr>
+            </a:lvl2pPr>
+            <a:lvl3pPr marL="717530" indent="0" algn="ctr" defTabSz="717530" rtl="0" eaLnBrk="1" latinLnBrk="0" hangingPunct="1">
+              <a:lnSpc>
+                <a:spcPct val="90000"/>
+              </a:lnSpc>
+              <a:spcBef>
+                <a:spcPts val="392"/>
+              </a:spcBef>
+              <a:buFont typeface="Arial" panose="020B0604020202020204" pitchFamily="34" charset="0"/>
+              <a:buNone/>
+              <a:defRPr sz="1412" kern="1200">
+                <a:solidFill>
+                  <a:schemeClr val="tx1"/>
+                </a:solidFill>
+                <a:latin typeface="+mn-lt"/>
+                <a:ea typeface="+mn-ea"/>
+                <a:cs typeface="+mn-cs"/>
+              </a:defRPr>
+            </a:lvl3pPr>
+            <a:lvl4pPr marL="1076295" indent="0" algn="ctr" defTabSz="717530" rtl="0" eaLnBrk="1" latinLnBrk="0" hangingPunct="1">
+              <a:lnSpc>
+                <a:spcPct val="90000"/>
+              </a:lnSpc>
+              <a:spcBef>
+                <a:spcPts val="392"/>
+              </a:spcBef>
+              <a:buFont typeface="Arial" panose="020B0604020202020204" pitchFamily="34" charset="0"/>
+              <a:buNone/>
+              <a:defRPr sz="1256" kern="1200">
+                <a:solidFill>
+                  <a:schemeClr val="tx1"/>
+                </a:solidFill>
+                <a:latin typeface="+mn-lt"/>
+                <a:ea typeface="+mn-ea"/>
+                <a:cs typeface="+mn-cs"/>
+              </a:defRPr>
+            </a:lvl4pPr>
+            <a:lvl5pPr marL="1435059" indent="0" algn="ctr" defTabSz="717530" rtl="0" eaLnBrk="1" latinLnBrk="0" hangingPunct="1">
+              <a:lnSpc>
+                <a:spcPct val="90000"/>
+              </a:lnSpc>
+              <a:spcBef>
+                <a:spcPts val="392"/>
+              </a:spcBef>
+              <a:buFont typeface="Arial" panose="020B0604020202020204" pitchFamily="34" charset="0"/>
+              <a:buNone/>
+              <a:defRPr sz="1256" kern="1200">
+                <a:solidFill>
+                  <a:schemeClr val="tx1"/>
+                </a:solidFill>
+                <a:latin typeface="+mn-lt"/>
+                <a:ea typeface="+mn-ea"/>
+                <a:cs typeface="+mn-cs"/>
+              </a:defRPr>
+            </a:lvl5pPr>
+            <a:lvl6pPr marL="1793824" indent="0" algn="ctr" defTabSz="717530" rtl="0" eaLnBrk="1" latinLnBrk="0" hangingPunct="1">
+              <a:lnSpc>
+                <a:spcPct val="90000"/>
+              </a:lnSpc>
+              <a:spcBef>
+                <a:spcPts val="392"/>
+              </a:spcBef>
+              <a:buFont typeface="Arial" panose="020B0604020202020204" pitchFamily="34" charset="0"/>
+              <a:buNone/>
+              <a:defRPr sz="1256" kern="1200">
+                <a:solidFill>
+                  <a:schemeClr val="tx1"/>
+                </a:solidFill>
+                <a:latin typeface="+mn-lt"/>
+                <a:ea typeface="+mn-ea"/>
+                <a:cs typeface="+mn-cs"/>
+              </a:defRPr>
+            </a:lvl6pPr>
+            <a:lvl7pPr marL="2152589" indent="0" algn="ctr" defTabSz="717530" rtl="0" eaLnBrk="1" latinLnBrk="0" hangingPunct="1">
+              <a:lnSpc>
+                <a:spcPct val="90000"/>
+              </a:lnSpc>
+              <a:spcBef>
+                <a:spcPts val="392"/>
+              </a:spcBef>
+              <a:buFont typeface="Arial" panose="020B0604020202020204" pitchFamily="34" charset="0"/>
+              <a:buNone/>
+              <a:defRPr sz="1256" kern="1200">
+                <a:solidFill>
+                  <a:schemeClr val="tx1"/>
+                </a:solidFill>
+                <a:latin typeface="+mn-lt"/>
+                <a:ea typeface="+mn-ea"/>
+                <a:cs typeface="+mn-cs"/>
+              </a:defRPr>
+            </a:lvl7pPr>
+            <a:lvl8pPr marL="2511354" indent="0" algn="ctr" defTabSz="717530" rtl="0" eaLnBrk="1" latinLnBrk="0" hangingPunct="1">
+              <a:lnSpc>
+                <a:spcPct val="90000"/>
+              </a:lnSpc>
+              <a:spcBef>
+                <a:spcPts val="392"/>
+              </a:spcBef>
+              <a:buFont typeface="Arial" panose="020B0604020202020204" pitchFamily="34" charset="0"/>
+              <a:buNone/>
+              <a:defRPr sz="1256" kern="1200">
+                <a:solidFill>
+                  <a:schemeClr val="tx1"/>
+                </a:solidFill>
+                <a:latin typeface="+mn-lt"/>
+                <a:ea typeface="+mn-ea"/>
+                <a:cs typeface="+mn-cs"/>
+              </a:defRPr>
+            </a:lvl8pPr>
+            <a:lvl9pPr marL="2870119" indent="0" algn="ctr" defTabSz="717530" rtl="0" eaLnBrk="1" latinLnBrk="0" hangingPunct="1">
+              <a:lnSpc>
+                <a:spcPct val="90000"/>
+              </a:lnSpc>
+              <a:spcBef>
+                <a:spcPts val="392"/>
+              </a:spcBef>
+              <a:buFont typeface="Arial" panose="020B0604020202020204" pitchFamily="34" charset="0"/>
+              <a:buNone/>
+              <a:defRPr sz="1256" kern="1200">
+                <a:solidFill>
+                  <a:schemeClr val="tx1"/>
+                </a:solidFill>
+                <a:latin typeface="+mn-lt"/>
+                <a:ea typeface="+mn-ea"/>
+                <a:cs typeface="+mn-cs"/>
+              </a:defRPr>
+            </a:lvl9pPr>
+          </a:lstStyle>
+          <a:p>
+            <a:pPr algn="l">
+              <a:lnSpc>
+                <a:spcPct val="135000"/>
+              </a:lnSpc>
+            </a:pPr>
+            <a:r>
+              <a:rPr lang="fr-FR" sz="800" dirty="0" smtClean="0">
+                <a:latin typeface="Stone Serif" pitchFamily="2" charset="0"/>
+              </a:rPr>
+              <a:t>Platform Design </a:t>
+            </a:r>
+            <a:r>
+              <a:rPr lang="fr-FR" sz="800" dirty="0" err="1" smtClean="0">
+                <a:latin typeface="Stone Serif" pitchFamily="2" charset="0"/>
+              </a:rPr>
+              <a:t>Toolkit</a:t>
+            </a:r>
+            <a:r>
+              <a:rPr lang="fr-FR" sz="800" dirty="0">
+                <a:latin typeface="Stone Serif" pitchFamily="2" charset="0"/>
+              </a:rPr>
+              <a:t>:</a:t>
+            </a:r>
+            <a:br>
+              <a:rPr lang="fr-FR" sz="800" dirty="0">
+                <a:latin typeface="Stone Serif" pitchFamily="2" charset="0"/>
+              </a:rPr>
+            </a:br>
+            <a:r>
+              <a:rPr lang="fr-FR" sz="800" dirty="0">
+                <a:latin typeface="Stone Serif" pitchFamily="2" charset="0"/>
+                <a:hlinkClick r:id="rId2"/>
+              </a:rPr>
+              <a:t>https://platformdesigntoolkit.com</a:t>
+            </a:r>
+            <a:r>
+              <a:rPr lang="fr-FR" sz="800" dirty="0" smtClean="0">
+                <a:latin typeface="Stone Serif" pitchFamily="2" charset="0"/>
+                <a:hlinkClick r:id="rId2"/>
+              </a:rPr>
+              <a:t>/</a:t>
+            </a:r>
+            <a:r>
+              <a:rPr lang="fr-FR" sz="800" dirty="0" smtClean="0">
+                <a:latin typeface="Stone Serif" pitchFamily="2" charset="0"/>
+              </a:rPr>
+              <a:t> </a:t>
+            </a:r>
+          </a:p>
+        </p:txBody>
+      </p:sp>
+      <p:sp>
+        <p:nvSpPr>
+          <p:cNvPr id="3" name="Sous-titre 2"/>
+          <p:cNvSpPr>
+            <a:spLocks noGrp="1"/>
+          </p:cNvSpPr>
+          <p:nvPr>
+            <p:ph type="subTitle" idx="1"/>
+          </p:nvPr>
+        </p:nvSpPr>
+        <p:spPr>
+          <a:xfrm>
+            <a:off x="4090260" y="1213356"/>
+            <a:ext cx="3224941" cy="2323744"/>
+          </a:xfrm>
+          <a:ln>
+            <a:solidFill>
+              <a:schemeClr val="tx1"/>
+            </a:solidFill>
+            <a:prstDash val="dash"/>
+          </a:ln>
+        </p:spPr>
+        <p:txBody>
+          <a:bodyPr>
+            <a:normAutofit fontScale="92500" lnSpcReduction="10000"/>
+          </a:bodyPr>
+          <a:lstStyle/>
+          <a:p>
+            <a:pPr algn="just">
+              <a:lnSpc>
+                <a:spcPct val="145000"/>
+              </a:lnSpc>
+              <a:spcBef>
+                <a:spcPts val="0"/>
+              </a:spcBef>
+            </a:pPr>
+            <a:r>
+              <a:rPr lang="en-US" sz="800" dirty="0">
+                <a:latin typeface="Stone Serif" pitchFamily="2" charset="0"/>
+              </a:rPr>
+              <a:t>The </a:t>
+            </a:r>
+            <a:r>
+              <a:rPr lang="en-US" sz="800" dirty="0" smtClean="0">
+                <a:latin typeface="Stone Serif" pitchFamily="2" charset="0"/>
+              </a:rPr>
+              <a:t>key factor of success for a </a:t>
+            </a:r>
+            <a:r>
+              <a:rPr lang="en-US" sz="800" dirty="0">
+                <a:latin typeface="Stone Serif" pitchFamily="2" charset="0"/>
+              </a:rPr>
+              <a:t>platform is not the market fit between an in-house product and external buyers, but its ability to:</a:t>
+            </a:r>
+          </a:p>
+          <a:p>
+            <a:pPr algn="just">
+              <a:lnSpc>
+                <a:spcPct val="145000"/>
+              </a:lnSpc>
+              <a:spcBef>
+                <a:spcPts val="0"/>
+              </a:spcBef>
+            </a:pPr>
+            <a:endParaRPr lang="en-US" sz="800" dirty="0">
+              <a:latin typeface="Stone Serif" pitchFamily="2" charset="0"/>
+            </a:endParaRPr>
+          </a:p>
+          <a:p>
+            <a:pPr algn="just">
+              <a:lnSpc>
+                <a:spcPct val="145000"/>
+              </a:lnSpc>
+              <a:spcBef>
+                <a:spcPts val="0"/>
+              </a:spcBef>
+            </a:pPr>
+            <a:r>
+              <a:rPr lang="en-US" sz="800" dirty="0" smtClean="0">
+                <a:latin typeface="Stone Serif" pitchFamily="2" charset="0"/>
+              </a:rPr>
+              <a:t>- </a:t>
+            </a:r>
+            <a:r>
+              <a:rPr lang="en-US" sz="800" b="1" dirty="0" smtClean="0">
+                <a:latin typeface="Stone Serif" pitchFamily="2" charset="0"/>
+              </a:rPr>
+              <a:t>orchestrate </a:t>
+            </a:r>
+            <a:r>
+              <a:rPr lang="en-US" sz="800" b="1" dirty="0">
+                <a:latin typeface="Stone Serif" pitchFamily="2" charset="0"/>
+              </a:rPr>
+              <a:t>a useful, fluid and efficient coordination </a:t>
+            </a:r>
+            <a:r>
+              <a:rPr lang="en-US" sz="800" dirty="0">
+                <a:latin typeface="Stone Serif" pitchFamily="2" charset="0"/>
+              </a:rPr>
+              <a:t>between many and varied third parties. This requires intensive data collection on the platform's players and their </a:t>
+            </a:r>
+            <a:r>
+              <a:rPr lang="en-US" sz="800" dirty="0" smtClean="0">
+                <a:latin typeface="Stone Serif" pitchFamily="2" charset="0"/>
+              </a:rPr>
+              <a:t>behavior </a:t>
+            </a:r>
+            <a:r>
+              <a:rPr lang="en-US" sz="800" dirty="0">
+                <a:latin typeface="Stone Serif" pitchFamily="2" charset="0"/>
+              </a:rPr>
+              <a:t>(see </a:t>
+            </a:r>
+            <a:r>
+              <a:rPr lang="en-US" sz="800" b="1" i="1" dirty="0">
+                <a:solidFill>
+                  <a:srgbClr val="E80C72"/>
+                </a:solidFill>
+                <a:latin typeface="Stone Serif" pitchFamily="2" charset="0"/>
+              </a:rPr>
+              <a:t>big data </a:t>
+            </a:r>
+            <a:r>
+              <a:rPr lang="en-US" sz="800" dirty="0">
+                <a:latin typeface="Stone Serif" pitchFamily="2" charset="0"/>
+              </a:rPr>
+              <a:t>and </a:t>
+            </a:r>
+            <a:r>
+              <a:rPr lang="en-US" sz="800" b="1" i="1" dirty="0" err="1">
+                <a:solidFill>
+                  <a:srgbClr val="E80C72"/>
+                </a:solidFill>
+                <a:latin typeface="Stone Serif" pitchFamily="2" charset="0"/>
+              </a:rPr>
+              <a:t>IoT</a:t>
+            </a:r>
+            <a:r>
+              <a:rPr lang="en-US" sz="800" dirty="0">
+                <a:latin typeface="Stone Serif" pitchFamily="2" charset="0"/>
+              </a:rPr>
+              <a:t> </a:t>
+            </a:r>
+            <a:r>
+              <a:rPr lang="en-US" sz="800" dirty="0" smtClean="0">
+                <a:latin typeface="Stone Serif" pitchFamily="2" charset="0"/>
+              </a:rPr>
+              <a:t>memo cards), </a:t>
+            </a:r>
+            <a:r>
+              <a:rPr lang="en-US" sz="800" dirty="0">
+                <a:latin typeface="Stone Serif" pitchFamily="2" charset="0"/>
+              </a:rPr>
+              <a:t>automation and scalability of information exchanges (see </a:t>
+            </a:r>
+            <a:r>
+              <a:rPr lang="en-US" sz="800" b="1" i="1" dirty="0" smtClean="0">
+                <a:solidFill>
+                  <a:srgbClr val="E80C72"/>
+                </a:solidFill>
+                <a:latin typeface="Stone Serif" pitchFamily="2" charset="0"/>
+              </a:rPr>
+              <a:t>web API s</a:t>
+            </a:r>
+            <a:r>
+              <a:rPr lang="en-US" sz="800" dirty="0" smtClean="0">
+                <a:latin typeface="Stone Serif" pitchFamily="2" charset="0"/>
+              </a:rPr>
+              <a:t> and </a:t>
+            </a:r>
+            <a:r>
+              <a:rPr lang="en-US" sz="800" b="1" i="1" dirty="0">
+                <a:solidFill>
+                  <a:srgbClr val="E80C72"/>
+                </a:solidFill>
+                <a:latin typeface="Stone Serif" pitchFamily="2" charset="0"/>
+              </a:rPr>
+              <a:t>cloud</a:t>
+            </a:r>
+            <a:r>
+              <a:rPr lang="en-US" sz="800" dirty="0">
+                <a:latin typeface="Stone Serif" pitchFamily="2" charset="0"/>
+              </a:rPr>
+              <a:t> </a:t>
+            </a:r>
+            <a:r>
+              <a:rPr lang="en-US" sz="800" dirty="0" smtClean="0">
+                <a:latin typeface="Stone Serif" pitchFamily="2" charset="0"/>
+              </a:rPr>
+              <a:t>memo cards), </a:t>
+            </a:r>
+            <a:r>
+              <a:rPr lang="en-US" sz="800" dirty="0">
+                <a:latin typeface="Stone Serif" pitchFamily="2" charset="0"/>
+              </a:rPr>
+              <a:t>excellence </a:t>
+            </a:r>
+            <a:r>
+              <a:rPr lang="en-US" sz="800" dirty="0" smtClean="0">
+                <a:latin typeface="Stone Serif" pitchFamily="2" charset="0"/>
+              </a:rPr>
+              <a:t>of the interfacing devices and channels </a:t>
+            </a:r>
+            <a:r>
+              <a:rPr lang="en-US" sz="800" dirty="0">
+                <a:latin typeface="Stone Serif" pitchFamily="2" charset="0"/>
+              </a:rPr>
+              <a:t>(see </a:t>
+            </a:r>
+            <a:r>
+              <a:rPr lang="en-US" sz="800" dirty="0" smtClean="0">
+                <a:latin typeface="Stone Serif" pitchFamily="2" charset="0"/>
+              </a:rPr>
+              <a:t>memo cards on </a:t>
+            </a:r>
+            <a:r>
+              <a:rPr lang="en-US" sz="800" b="1" i="1" dirty="0">
+                <a:solidFill>
+                  <a:srgbClr val="E80C72"/>
+                </a:solidFill>
+                <a:latin typeface="Stone Serif" pitchFamily="2" charset="0"/>
+              </a:rPr>
+              <a:t>web APIs </a:t>
+            </a:r>
+            <a:r>
+              <a:rPr lang="en-US" sz="800" dirty="0" smtClean="0">
+                <a:latin typeface="Stone Serif" pitchFamily="2" charset="0"/>
+              </a:rPr>
+              <a:t>and </a:t>
+            </a:r>
+            <a:r>
+              <a:rPr lang="en-US" sz="800" b="1" i="1" dirty="0">
+                <a:solidFill>
+                  <a:srgbClr val="E80C72"/>
+                </a:solidFill>
+                <a:latin typeface="Stone Serif" pitchFamily="2" charset="0"/>
+              </a:rPr>
+              <a:t>data visualization</a:t>
+            </a:r>
+            <a:r>
+              <a:rPr lang="en-US" sz="800" dirty="0">
+                <a:latin typeface="Stone Serif" pitchFamily="2" charset="0"/>
+              </a:rPr>
+              <a:t>), and fine management </a:t>
+            </a:r>
+            <a:r>
+              <a:rPr lang="en-US" sz="800" dirty="0" smtClean="0">
+                <a:latin typeface="Stone Serif" pitchFamily="2" charset="0"/>
+              </a:rPr>
+              <a:t>/ governance of </a:t>
+            </a:r>
+            <a:r>
+              <a:rPr lang="en-US" sz="800" dirty="0">
+                <a:latin typeface="Stone Serif" pitchFamily="2" charset="0"/>
+              </a:rPr>
+              <a:t>the rights and duties associated with the data (see </a:t>
+            </a:r>
+            <a:r>
+              <a:rPr lang="en-US" sz="800" b="1" i="1" dirty="0">
+                <a:solidFill>
+                  <a:srgbClr val="E80C72"/>
+                </a:solidFill>
+                <a:latin typeface="Stone Serif" pitchFamily="2" charset="0"/>
+              </a:rPr>
+              <a:t>GDPR</a:t>
+            </a:r>
+            <a:r>
+              <a:rPr lang="en-US" sz="800" dirty="0" smtClean="0">
+                <a:latin typeface="Stone Serif" pitchFamily="2" charset="0"/>
+              </a:rPr>
+              <a:t> </a:t>
+            </a:r>
+            <a:r>
+              <a:rPr lang="en-US" sz="800" dirty="0">
+                <a:latin typeface="Stone Serif" pitchFamily="2" charset="0"/>
+              </a:rPr>
+              <a:t>and </a:t>
+            </a:r>
+            <a:r>
+              <a:rPr lang="en-US" sz="800" b="1" i="1" dirty="0" err="1">
+                <a:solidFill>
+                  <a:srgbClr val="E80C72"/>
+                </a:solidFill>
+                <a:latin typeface="Stone Serif" pitchFamily="2" charset="0"/>
+              </a:rPr>
+              <a:t>blockchain</a:t>
+            </a:r>
+            <a:r>
+              <a:rPr lang="en-US" sz="800" b="1" i="1" dirty="0">
+                <a:solidFill>
+                  <a:srgbClr val="E80C72"/>
+                </a:solidFill>
+                <a:latin typeface="Stone Serif" pitchFamily="2" charset="0"/>
+              </a:rPr>
+              <a:t> </a:t>
+            </a:r>
+            <a:r>
+              <a:rPr lang="en-US" sz="800" b="1" i="1" dirty="0" smtClean="0">
+                <a:solidFill>
+                  <a:srgbClr val="E80C72"/>
+                </a:solidFill>
+                <a:latin typeface="Stone Serif" pitchFamily="2" charset="0"/>
+              </a:rPr>
+              <a:t> </a:t>
+            </a:r>
+            <a:r>
+              <a:rPr lang="en-US" sz="800" dirty="0" smtClean="0">
+                <a:latin typeface="Stone Serif" pitchFamily="2" charset="0"/>
+              </a:rPr>
+              <a:t>memo </a:t>
+            </a:r>
+            <a:r>
+              <a:rPr lang="en-US" sz="800" dirty="0">
+                <a:latin typeface="Stone Serif" pitchFamily="2" charset="0"/>
+              </a:rPr>
+              <a:t>cards).</a:t>
+            </a:r>
+          </a:p>
+          <a:p>
+            <a:pPr algn="just">
+              <a:lnSpc>
+                <a:spcPct val="145000"/>
+              </a:lnSpc>
+              <a:spcBef>
+                <a:spcPts val="0"/>
+              </a:spcBef>
+            </a:pPr>
+            <a:endParaRPr lang="en-US" sz="800" dirty="0">
+              <a:latin typeface="Stone Serif" pitchFamily="2" charset="0"/>
+            </a:endParaRPr>
+          </a:p>
+          <a:p>
+            <a:pPr algn="just">
+              <a:lnSpc>
+                <a:spcPct val="145000"/>
+              </a:lnSpc>
+              <a:spcBef>
+                <a:spcPts val="0"/>
+              </a:spcBef>
+            </a:pPr>
+            <a:r>
+              <a:rPr lang="en-US" sz="800" dirty="0" smtClean="0">
+                <a:latin typeface="Stone Serif" pitchFamily="2" charset="0"/>
+              </a:rPr>
+              <a:t>- </a:t>
+            </a:r>
+            <a:r>
+              <a:rPr lang="en-US" sz="800" b="1" dirty="0" smtClean="0">
+                <a:latin typeface="Stone Serif" pitchFamily="2" charset="0"/>
+              </a:rPr>
+              <a:t>put learning </a:t>
+            </a:r>
+            <a:r>
+              <a:rPr lang="en-US" sz="800" b="1" dirty="0">
+                <a:latin typeface="Stone Serif" pitchFamily="2" charset="0"/>
+              </a:rPr>
+              <a:t>mechanisms in place </a:t>
+            </a:r>
+            <a:r>
+              <a:rPr lang="en-US" sz="800" dirty="0" smtClean="0">
+                <a:latin typeface="Stone Serif" pitchFamily="2" charset="0"/>
+              </a:rPr>
+              <a:t>that </a:t>
+            </a:r>
+            <a:r>
+              <a:rPr lang="en-US" sz="800" dirty="0">
+                <a:latin typeface="Stone Serif" pitchFamily="2" charset="0"/>
+              </a:rPr>
+              <a:t>increase the value that platform users gain over time. This is made possible by data analysis (see </a:t>
+            </a:r>
+            <a:r>
+              <a:rPr lang="en-US" sz="800" dirty="0" smtClean="0">
+                <a:latin typeface="Stone Serif" pitchFamily="2" charset="0"/>
+              </a:rPr>
+              <a:t>memo cards on </a:t>
+            </a:r>
+            <a:r>
+              <a:rPr lang="en-US" sz="800" b="1" i="1" dirty="0" smtClean="0">
+                <a:solidFill>
+                  <a:srgbClr val="E80C72"/>
+                </a:solidFill>
+                <a:latin typeface="Stone Serif" pitchFamily="2" charset="0"/>
+              </a:rPr>
+              <a:t>IA</a:t>
+            </a:r>
+            <a:r>
+              <a:rPr lang="en-US" sz="800" dirty="0" smtClean="0">
+                <a:latin typeface="Stone Serif" pitchFamily="2" charset="0"/>
+              </a:rPr>
+              <a:t>, </a:t>
+            </a:r>
+            <a:r>
+              <a:rPr lang="en-US" sz="800" b="1" i="1" dirty="0">
+                <a:solidFill>
+                  <a:srgbClr val="E80C72"/>
+                </a:solidFill>
+                <a:latin typeface="Stone Serif" pitchFamily="2" charset="0"/>
+              </a:rPr>
+              <a:t>machine learning</a:t>
+            </a:r>
+            <a:r>
+              <a:rPr lang="en-US" sz="800" dirty="0">
+                <a:latin typeface="Stone Serif" pitchFamily="2" charset="0"/>
+              </a:rPr>
+              <a:t>, </a:t>
+            </a:r>
+            <a:r>
+              <a:rPr lang="en-US" sz="800" b="1" i="1" dirty="0">
+                <a:solidFill>
+                  <a:srgbClr val="E80C72"/>
+                </a:solidFill>
+                <a:latin typeface="Stone Serif" pitchFamily="2" charset="0"/>
+              </a:rPr>
+              <a:t>graph mining</a:t>
+            </a:r>
+            <a:r>
+              <a:rPr lang="en-US" sz="800" dirty="0">
+                <a:latin typeface="Stone Serif" pitchFamily="2" charset="0"/>
+              </a:rPr>
+              <a:t>, </a:t>
+            </a:r>
+            <a:r>
+              <a:rPr lang="en-US" sz="800" b="1" i="1" dirty="0">
+                <a:solidFill>
+                  <a:srgbClr val="E80C72"/>
+                </a:solidFill>
+                <a:latin typeface="Stone Serif" pitchFamily="2" charset="0"/>
+              </a:rPr>
+              <a:t>text mining</a:t>
+            </a:r>
+            <a:r>
+              <a:rPr lang="en-US" sz="800" dirty="0">
+                <a:latin typeface="Stone Serif" pitchFamily="2" charset="0"/>
+              </a:rPr>
+              <a:t>).</a:t>
+            </a:r>
+            <a:endParaRPr lang="fr-FR" sz="800" dirty="0" smtClean="0">
+              <a:latin typeface="Stone Serif" pitchFamily="2" charset="0"/>
+            </a:endParaRPr>
+          </a:p>
+        </p:txBody>
+      </p:sp>
+      <p:sp>
+        <p:nvSpPr>
+          <p:cNvPr id="2" name="Titre 1"/>
+          <p:cNvSpPr>
+            <a:spLocks noGrp="1"/>
+          </p:cNvSpPr>
+          <p:nvPr>
+            <p:ph type="ctrTitle"/>
+          </p:nvPr>
+        </p:nvSpPr>
+        <p:spPr>
+          <a:xfrm>
+            <a:off x="432659" y="249842"/>
+            <a:ext cx="6896718" cy="592691"/>
+          </a:xfrm>
+          <a:solidFill>
+            <a:srgbClr val="E80C72"/>
+          </a:solidFill>
+          <a:ln>
+            <a:solidFill>
+              <a:schemeClr val="tx1">
+                <a:lumMod val="50000"/>
+                <a:lumOff val="50000"/>
+              </a:schemeClr>
+            </a:solidFill>
+          </a:ln>
+        </p:spPr>
+        <p:txBody>
+          <a:bodyPr>
+            <a:noAutofit/>
+          </a:bodyPr>
+          <a:lstStyle/>
+          <a:p>
+            <a:pPr>
+              <a:lnSpc>
+                <a:spcPct val="135000"/>
+              </a:lnSpc>
+            </a:pPr>
+            <a:r>
+              <a:rPr lang="fr-FR" sz="3200" dirty="0" err="1" smtClean="0">
+                <a:solidFill>
+                  <a:schemeClr val="bg1"/>
+                </a:solidFill>
+                <a:latin typeface="Stone Serif" pitchFamily="2" charset="0"/>
+              </a:rPr>
+              <a:t>Platforms</a:t>
+            </a:r>
+            <a:endParaRPr lang="fr-FR" sz="3200" dirty="0">
+              <a:solidFill>
+                <a:schemeClr val="bg1"/>
+              </a:solidFill>
+              <a:latin typeface="Stone Serif" pitchFamily="2" charset="0"/>
+            </a:endParaRPr>
+          </a:p>
+        </p:txBody>
+      </p:sp>
+      <p:sp>
+        <p:nvSpPr>
+          <p:cNvPr id="8" name="Sous-titre 2"/>
+          <p:cNvSpPr txBox="1">
+            <a:spLocks/>
+          </p:cNvSpPr>
+          <p:nvPr/>
+        </p:nvSpPr>
+        <p:spPr>
+          <a:xfrm>
+            <a:off x="432657" y="1248867"/>
+            <a:ext cx="3409241" cy="2288232"/>
+          </a:xfrm>
+          <a:prstGeom prst="rect">
+            <a:avLst/>
+          </a:prstGeom>
+          <a:ln>
+            <a:solidFill>
+              <a:schemeClr val="tx1"/>
+            </a:solidFill>
+            <a:prstDash val="dash"/>
+          </a:ln>
+        </p:spPr>
+        <p:txBody>
+          <a:bodyPr vert="horz" lIns="91440" tIns="45720" rIns="91440" bIns="45720" rtlCol="0">
+            <a:noAutofit/>
+          </a:bodyPr>
+          <a:lstStyle>
+            <a:lvl1pPr marL="0" indent="0" algn="ctr" defTabSz="717530" rtl="0" eaLnBrk="1" latinLnBrk="0" hangingPunct="1">
+              <a:lnSpc>
+                <a:spcPct val="90000"/>
+              </a:lnSpc>
+              <a:spcBef>
+                <a:spcPts val="785"/>
+              </a:spcBef>
+              <a:buFont typeface="Arial" panose="020B0604020202020204" pitchFamily="34" charset="0"/>
+              <a:buNone/>
+              <a:defRPr sz="1883" kern="1200">
+                <a:solidFill>
+                  <a:schemeClr val="tx1"/>
+                </a:solidFill>
+                <a:latin typeface="+mn-lt"/>
+                <a:ea typeface="+mn-ea"/>
+                <a:cs typeface="+mn-cs"/>
+              </a:defRPr>
+            </a:lvl1pPr>
+            <a:lvl2pPr marL="358765" indent="0" algn="ctr" defTabSz="717530" rtl="0" eaLnBrk="1" latinLnBrk="0" hangingPunct="1">
+              <a:lnSpc>
+                <a:spcPct val="90000"/>
+              </a:lnSpc>
+              <a:spcBef>
+                <a:spcPts val="392"/>
+              </a:spcBef>
+              <a:buFont typeface="Arial" panose="020B0604020202020204" pitchFamily="34" charset="0"/>
+              <a:buNone/>
+              <a:defRPr sz="1569" kern="1200">
+                <a:solidFill>
+                  <a:schemeClr val="tx1"/>
+                </a:solidFill>
+                <a:latin typeface="+mn-lt"/>
+                <a:ea typeface="+mn-ea"/>
+                <a:cs typeface="+mn-cs"/>
+              </a:defRPr>
+            </a:lvl2pPr>
+            <a:lvl3pPr marL="717530" indent="0" algn="ctr" defTabSz="717530" rtl="0" eaLnBrk="1" latinLnBrk="0" hangingPunct="1">
+              <a:lnSpc>
+                <a:spcPct val="90000"/>
+              </a:lnSpc>
+              <a:spcBef>
+                <a:spcPts val="392"/>
+              </a:spcBef>
+              <a:buFont typeface="Arial" panose="020B0604020202020204" pitchFamily="34" charset="0"/>
+              <a:buNone/>
+              <a:defRPr sz="1412" kern="1200">
+                <a:solidFill>
+                  <a:schemeClr val="tx1"/>
+                </a:solidFill>
+                <a:latin typeface="+mn-lt"/>
+                <a:ea typeface="+mn-ea"/>
+                <a:cs typeface="+mn-cs"/>
+              </a:defRPr>
+            </a:lvl3pPr>
+            <a:lvl4pPr marL="1076295" indent="0" algn="ctr" defTabSz="717530" rtl="0" eaLnBrk="1" latinLnBrk="0" hangingPunct="1">
+              <a:lnSpc>
+                <a:spcPct val="90000"/>
+              </a:lnSpc>
+              <a:spcBef>
+                <a:spcPts val="392"/>
+              </a:spcBef>
+              <a:buFont typeface="Arial" panose="020B0604020202020204" pitchFamily="34" charset="0"/>
+              <a:buNone/>
+              <a:defRPr sz="1256" kern="1200">
+                <a:solidFill>
+                  <a:schemeClr val="tx1"/>
+                </a:solidFill>
+                <a:latin typeface="+mn-lt"/>
+                <a:ea typeface="+mn-ea"/>
+                <a:cs typeface="+mn-cs"/>
+              </a:defRPr>
+            </a:lvl4pPr>
+            <a:lvl5pPr marL="1435059" indent="0" algn="ctr" defTabSz="717530" rtl="0" eaLnBrk="1" latinLnBrk="0" hangingPunct="1">
+              <a:lnSpc>
+                <a:spcPct val="90000"/>
+              </a:lnSpc>
+              <a:spcBef>
+                <a:spcPts val="392"/>
+              </a:spcBef>
+              <a:buFont typeface="Arial" panose="020B0604020202020204" pitchFamily="34" charset="0"/>
+              <a:buNone/>
+              <a:defRPr sz="1256" kern="1200">
+                <a:solidFill>
+                  <a:schemeClr val="tx1"/>
+                </a:solidFill>
+                <a:latin typeface="+mn-lt"/>
+                <a:ea typeface="+mn-ea"/>
+                <a:cs typeface="+mn-cs"/>
+              </a:defRPr>
+            </a:lvl5pPr>
+            <a:lvl6pPr marL="1793824" indent="0" algn="ctr" defTabSz="717530" rtl="0" eaLnBrk="1" latinLnBrk="0" hangingPunct="1">
+              <a:lnSpc>
+                <a:spcPct val="90000"/>
+              </a:lnSpc>
+              <a:spcBef>
+                <a:spcPts val="392"/>
+              </a:spcBef>
+              <a:buFont typeface="Arial" panose="020B0604020202020204" pitchFamily="34" charset="0"/>
+              <a:buNone/>
+              <a:defRPr sz="1256" kern="1200">
+                <a:solidFill>
+                  <a:schemeClr val="tx1"/>
+                </a:solidFill>
+                <a:latin typeface="+mn-lt"/>
+                <a:ea typeface="+mn-ea"/>
+                <a:cs typeface="+mn-cs"/>
+              </a:defRPr>
+            </a:lvl6pPr>
+            <a:lvl7pPr marL="2152589" indent="0" algn="ctr" defTabSz="717530" rtl="0" eaLnBrk="1" latinLnBrk="0" hangingPunct="1">
+              <a:lnSpc>
+                <a:spcPct val="90000"/>
+              </a:lnSpc>
+              <a:spcBef>
+                <a:spcPts val="392"/>
+              </a:spcBef>
+              <a:buFont typeface="Arial" panose="020B0604020202020204" pitchFamily="34" charset="0"/>
+              <a:buNone/>
+              <a:defRPr sz="1256" kern="1200">
+                <a:solidFill>
+                  <a:schemeClr val="tx1"/>
+                </a:solidFill>
+                <a:latin typeface="+mn-lt"/>
+                <a:ea typeface="+mn-ea"/>
+                <a:cs typeface="+mn-cs"/>
+              </a:defRPr>
+            </a:lvl7pPr>
+            <a:lvl8pPr marL="2511354" indent="0" algn="ctr" defTabSz="717530" rtl="0" eaLnBrk="1" latinLnBrk="0" hangingPunct="1">
+              <a:lnSpc>
+                <a:spcPct val="90000"/>
+              </a:lnSpc>
+              <a:spcBef>
+                <a:spcPts val="392"/>
+              </a:spcBef>
+              <a:buFont typeface="Arial" panose="020B0604020202020204" pitchFamily="34" charset="0"/>
+              <a:buNone/>
+              <a:defRPr sz="1256" kern="1200">
+                <a:solidFill>
+                  <a:schemeClr val="tx1"/>
+                </a:solidFill>
+                <a:latin typeface="+mn-lt"/>
+                <a:ea typeface="+mn-ea"/>
+                <a:cs typeface="+mn-cs"/>
+              </a:defRPr>
+            </a:lvl8pPr>
+            <a:lvl9pPr marL="2870119" indent="0" algn="ctr" defTabSz="717530" rtl="0" eaLnBrk="1" latinLnBrk="0" hangingPunct="1">
+              <a:lnSpc>
+                <a:spcPct val="90000"/>
+              </a:lnSpc>
+              <a:spcBef>
+                <a:spcPts val="392"/>
+              </a:spcBef>
+              <a:buFont typeface="Arial" panose="020B0604020202020204" pitchFamily="34" charset="0"/>
+              <a:buNone/>
+              <a:defRPr sz="1256" kern="1200">
+                <a:solidFill>
+                  <a:schemeClr val="tx1"/>
+                </a:solidFill>
+                <a:latin typeface="+mn-lt"/>
+                <a:ea typeface="+mn-ea"/>
+                <a:cs typeface="+mn-cs"/>
+              </a:defRPr>
+            </a:lvl9pPr>
+          </a:lstStyle>
+          <a:p>
+            <a:pPr algn="just">
+              <a:lnSpc>
+                <a:spcPct val="135000"/>
+              </a:lnSpc>
+              <a:spcBef>
+                <a:spcPts val="0"/>
+              </a:spcBef>
+            </a:pPr>
+            <a:r>
+              <a:rPr lang="en-US" sz="700" dirty="0">
+                <a:latin typeface="Stone Serif" pitchFamily="2" charset="0"/>
+              </a:rPr>
+              <a:t>A platform is a </a:t>
+            </a:r>
+            <a:r>
+              <a:rPr lang="en-US" sz="700" dirty="0" smtClean="0">
+                <a:latin typeface="Stone Serif" pitchFamily="2" charset="0"/>
+              </a:rPr>
+              <a:t>half-organization</a:t>
+            </a:r>
+            <a:r>
+              <a:rPr lang="en-US" sz="700" dirty="0">
+                <a:latin typeface="Stone Serif" pitchFamily="2" charset="0"/>
+              </a:rPr>
+              <a:t>, half-market structure that </a:t>
+            </a:r>
+            <a:r>
+              <a:rPr lang="en-US" sz="700" dirty="0" smtClean="0">
+                <a:latin typeface="Stone Serif" pitchFamily="2" charset="0"/>
+              </a:rPr>
+              <a:t>coordinates </a:t>
+            </a:r>
+            <a:r>
+              <a:rPr lang="en-US" sz="700" dirty="0">
+                <a:latin typeface="Stone Serif" pitchFamily="2" charset="0"/>
+              </a:rPr>
+              <a:t>and stimulates transactions between producers and consumers of goods and </a:t>
+            </a:r>
+            <a:r>
+              <a:rPr lang="en-US" sz="700" dirty="0" smtClean="0">
+                <a:latin typeface="Stone Serif" pitchFamily="2" charset="0"/>
+              </a:rPr>
+              <a:t>services. </a:t>
+            </a:r>
+            <a:r>
+              <a:rPr lang="en-US" sz="700" dirty="0">
+                <a:latin typeface="Stone Serif" pitchFamily="2" charset="0"/>
+              </a:rPr>
+              <a:t>The platform is set up by one or more organizations that take advantage of the value created.</a:t>
+            </a:r>
+          </a:p>
+          <a:p>
+            <a:pPr algn="just">
+              <a:lnSpc>
+                <a:spcPct val="135000"/>
+              </a:lnSpc>
+              <a:spcBef>
+                <a:spcPts val="0"/>
+              </a:spcBef>
+            </a:pPr>
+            <a:endParaRPr lang="en-US" sz="700" dirty="0">
+              <a:latin typeface="Stone Serif" pitchFamily="2" charset="0"/>
+            </a:endParaRPr>
+          </a:p>
+          <a:p>
+            <a:pPr algn="just">
+              <a:lnSpc>
+                <a:spcPct val="135000"/>
+              </a:lnSpc>
+              <a:spcBef>
+                <a:spcPts val="0"/>
+              </a:spcBef>
+            </a:pPr>
+            <a:r>
+              <a:rPr lang="en-US" sz="700" b="1" dirty="0">
+                <a:latin typeface="Stone Serif" pitchFamily="2" charset="0"/>
+              </a:rPr>
+              <a:t>Platforms </a:t>
+            </a:r>
+            <a:r>
+              <a:rPr lang="en-US" sz="700" b="1" dirty="0" smtClean="0">
+                <a:latin typeface="Stone Serif" pitchFamily="2" charset="0"/>
+              </a:rPr>
+              <a:t>look like </a:t>
+            </a:r>
+            <a:r>
+              <a:rPr lang="en-US" sz="700" b="1" dirty="0">
+                <a:latin typeface="Stone Serif" pitchFamily="2" charset="0"/>
+              </a:rPr>
+              <a:t>organizations </a:t>
+            </a:r>
+            <a:r>
+              <a:rPr lang="en-US" sz="700" dirty="0">
+                <a:latin typeface="Stone Serif" pitchFamily="2" charset="0"/>
+              </a:rPr>
+              <a:t>in that they are most often companies or public bodies that create them. But unlike organizations, resources, </a:t>
+            </a:r>
+            <a:r>
+              <a:rPr lang="en-US" sz="700" dirty="0" smtClean="0">
+                <a:latin typeface="Stone Serif" pitchFamily="2" charset="0"/>
+              </a:rPr>
+              <a:t>activities </a:t>
+            </a:r>
+            <a:r>
+              <a:rPr lang="en-US" sz="700" dirty="0">
+                <a:latin typeface="Stone Serif" pitchFamily="2" charset="0"/>
+              </a:rPr>
+              <a:t>and value are </a:t>
+            </a:r>
+            <a:r>
+              <a:rPr lang="en-US" sz="700" dirty="0" smtClean="0">
+                <a:latin typeface="Stone Serif" pitchFamily="2" charset="0"/>
+              </a:rPr>
+              <a:t>developed </a:t>
+            </a:r>
+            <a:r>
+              <a:rPr lang="en-US" sz="700" dirty="0">
+                <a:latin typeface="Stone Serif" pitchFamily="2" charset="0"/>
+              </a:rPr>
+              <a:t>by producers and consumers </a:t>
+            </a:r>
+            <a:r>
+              <a:rPr lang="en-US" sz="700" dirty="0" smtClean="0">
+                <a:latin typeface="Stone Serif" pitchFamily="2" charset="0"/>
+              </a:rPr>
+              <a:t>situated outside </a:t>
+            </a:r>
+            <a:r>
+              <a:rPr lang="en-US" sz="700" dirty="0">
+                <a:latin typeface="Stone Serif" pitchFamily="2" charset="0"/>
+              </a:rPr>
+              <a:t>the organization.</a:t>
+            </a:r>
+          </a:p>
+          <a:p>
+            <a:pPr algn="just">
+              <a:lnSpc>
+                <a:spcPct val="135000"/>
+              </a:lnSpc>
+              <a:spcBef>
+                <a:spcPts val="0"/>
+              </a:spcBef>
+            </a:pPr>
+            <a:endParaRPr lang="en-US" sz="700" dirty="0" smtClean="0">
+              <a:latin typeface="Stone Serif" pitchFamily="2" charset="0"/>
+            </a:endParaRPr>
+          </a:p>
+          <a:p>
+            <a:pPr algn="just">
+              <a:lnSpc>
+                <a:spcPct val="135000"/>
+              </a:lnSpc>
+              <a:spcBef>
+                <a:spcPts val="0"/>
+              </a:spcBef>
+            </a:pPr>
+            <a:r>
+              <a:rPr lang="en-US" sz="700" b="1" dirty="0" smtClean="0">
+                <a:latin typeface="Stone Serif" pitchFamily="2" charset="0"/>
+              </a:rPr>
+              <a:t>Platforms </a:t>
+            </a:r>
+            <a:r>
+              <a:rPr lang="en-US" sz="700" b="1" dirty="0">
+                <a:latin typeface="Stone Serif" pitchFamily="2" charset="0"/>
+              </a:rPr>
+              <a:t>look like markets </a:t>
+            </a:r>
+            <a:r>
+              <a:rPr lang="en-US" sz="700" dirty="0">
+                <a:latin typeface="Stone Serif" pitchFamily="2" charset="0"/>
+              </a:rPr>
+              <a:t>to the extent that value is created by independent agents who carry out "atomic" transactions (trade, services or </a:t>
+            </a:r>
+            <a:r>
+              <a:rPr lang="en-US" sz="700" dirty="0" smtClean="0">
+                <a:latin typeface="Stone Serif" pitchFamily="2" charset="0"/>
+              </a:rPr>
+              <a:t>sales on a piecework basis). </a:t>
+            </a:r>
+            <a:r>
+              <a:rPr lang="en-US" sz="700" dirty="0">
+                <a:latin typeface="Stone Serif" pitchFamily="2" charset="0"/>
+              </a:rPr>
+              <a:t>But unlike markets, these transactions are organized and </a:t>
+            </a:r>
+            <a:r>
+              <a:rPr lang="en-US" sz="700" dirty="0" smtClean="0">
+                <a:latin typeface="Stone Serif" pitchFamily="2" charset="0"/>
+              </a:rPr>
+              <a:t>strictly controlled by </a:t>
+            </a:r>
+            <a:r>
+              <a:rPr lang="en-US" sz="700" dirty="0">
+                <a:latin typeface="Stone Serif" pitchFamily="2" charset="0"/>
+              </a:rPr>
+              <a:t>an organization - which in a way plays the role of a "private market place</a:t>
+            </a:r>
+            <a:r>
+              <a:rPr lang="en-US" sz="700" dirty="0" smtClean="0">
+                <a:latin typeface="Stone Serif" pitchFamily="2" charset="0"/>
+              </a:rPr>
+              <a:t>".</a:t>
+            </a:r>
+            <a:endParaRPr lang="fr-FR" sz="700" dirty="0" smtClean="0">
+              <a:latin typeface="Stone Serif" pitchFamily="2" charset="0"/>
+            </a:endParaRPr>
+          </a:p>
+        </p:txBody>
+      </p:sp>
+      <p:sp>
+        <p:nvSpPr>
+          <p:cNvPr id="5" name="ZoneTexte 4"/>
+          <p:cNvSpPr txBox="1"/>
+          <p:nvPr/>
+        </p:nvSpPr>
+        <p:spPr>
+          <a:xfrm>
+            <a:off x="432658" y="957446"/>
+            <a:ext cx="3409240" cy="320857"/>
+          </a:xfrm>
+          <a:prstGeom prst="rect">
+            <a:avLst/>
+          </a:prstGeom>
+          <a:solidFill>
+            <a:srgbClr val="FFBDF5"/>
+          </a:solidFill>
+        </p:spPr>
+        <p:txBody>
+          <a:bodyPr wrap="square" rtlCol="0">
+            <a:spAutoFit/>
+          </a:bodyPr>
+          <a:lstStyle/>
+          <a:p>
+            <a:pPr>
+              <a:lnSpc>
+                <a:spcPct val="135000"/>
+              </a:lnSpc>
+            </a:pPr>
+            <a:r>
+              <a:rPr lang="fr-FR" sz="1100" dirty="0" err="1" smtClean="0">
+                <a:latin typeface="Stone Serif" pitchFamily="2" charset="0"/>
+              </a:rPr>
+              <a:t>What</a:t>
+            </a:r>
+            <a:r>
+              <a:rPr lang="fr-FR" sz="1100" dirty="0" smtClean="0">
+                <a:latin typeface="Stone Serif" pitchFamily="2" charset="0"/>
+              </a:rPr>
+              <a:t> </a:t>
+            </a:r>
+            <a:r>
+              <a:rPr lang="fr-FR" sz="1100" dirty="0" err="1" smtClean="0">
+                <a:latin typeface="Stone Serif" pitchFamily="2" charset="0"/>
+              </a:rPr>
+              <a:t>is</a:t>
+            </a:r>
+            <a:r>
+              <a:rPr lang="fr-FR" sz="1100" dirty="0" smtClean="0">
+                <a:latin typeface="Stone Serif" pitchFamily="2" charset="0"/>
+              </a:rPr>
+              <a:t> </a:t>
+            </a:r>
+            <a:r>
+              <a:rPr lang="fr-FR" sz="1100" dirty="0" err="1" smtClean="0">
+                <a:latin typeface="Stone Serif" pitchFamily="2" charset="0"/>
+              </a:rPr>
+              <a:t>it</a:t>
+            </a:r>
+            <a:r>
+              <a:rPr lang="fr-FR" sz="1100" dirty="0" smtClean="0">
+                <a:latin typeface="Stone Serif" pitchFamily="2" charset="0"/>
+              </a:rPr>
+              <a:t>?</a:t>
+            </a:r>
+            <a:endParaRPr lang="fr-FR" sz="1100" dirty="0">
+              <a:latin typeface="Stone Serif" pitchFamily="2" charset="0"/>
+            </a:endParaRPr>
+          </a:p>
+        </p:txBody>
+      </p:sp>
+      <p:sp>
+        <p:nvSpPr>
+          <p:cNvPr id="9" name="ZoneTexte 8"/>
+          <p:cNvSpPr txBox="1"/>
+          <p:nvPr/>
+        </p:nvSpPr>
+        <p:spPr>
+          <a:xfrm>
+            <a:off x="4090260" y="957446"/>
+            <a:ext cx="3239116" cy="280270"/>
+          </a:xfrm>
+          <a:prstGeom prst="rect">
+            <a:avLst/>
+          </a:prstGeom>
+          <a:solidFill>
+            <a:srgbClr val="FFBDF5"/>
+          </a:solidFill>
+        </p:spPr>
+        <p:txBody>
+          <a:bodyPr wrap="square" rtlCol="0">
+            <a:spAutoFit/>
+          </a:bodyPr>
+          <a:lstStyle/>
+          <a:p>
+            <a:pPr>
+              <a:lnSpc>
+                <a:spcPct val="135000"/>
+              </a:lnSpc>
+            </a:pPr>
+            <a:r>
+              <a:rPr lang="en-US" sz="1000" dirty="0" smtClean="0">
+                <a:latin typeface="Stone Serif" pitchFamily="2" charset="0"/>
+              </a:rPr>
+              <a:t>“</a:t>
+            </a:r>
+            <a:r>
+              <a:rPr lang="en-US" sz="1000" dirty="0" err="1" smtClean="0">
+                <a:latin typeface="Stone Serif" pitchFamily="2" charset="0"/>
+              </a:rPr>
+              <a:t>Dataification</a:t>
+            </a:r>
+            <a:r>
+              <a:rPr lang="en-US" sz="1000" dirty="0" smtClean="0">
+                <a:latin typeface="Stone Serif" pitchFamily="2" charset="0"/>
+              </a:rPr>
+              <a:t>”, key factor of success for platforms</a:t>
+            </a:r>
+            <a:endParaRPr lang="en-US" sz="1000" dirty="0">
+              <a:latin typeface="Stone Serif" pitchFamily="2" charset="0"/>
+            </a:endParaRPr>
+          </a:p>
+        </p:txBody>
+      </p:sp>
+      <p:pic>
+        <p:nvPicPr>
+          <p:cNvPr id="28" name="Image 27"/>
+          <p:cNvPicPr>
+            <a:picLocks noChangeAspect="1"/>
+          </p:cNvPicPr>
+          <p:nvPr/>
+        </p:nvPicPr>
+        <p:blipFill>
+          <a:blip r:embed="rId3" cstate="print">
+            <a:extLst>
+              <a:ext uri="{28A0092B-C50C-407E-A947-70E740481C1C}">
+                <a14:useLocalDpi xmlns:a14="http://schemas.microsoft.com/office/drawing/2010/main" val="0"/>
+              </a:ext>
+            </a:extLst>
+          </a:blip>
+          <a:stretch>
+            <a:fillRect/>
+          </a:stretch>
+        </p:blipFill>
+        <p:spPr>
+          <a:xfrm rot="16200000">
+            <a:off x="-120915" y="4769262"/>
+            <a:ext cx="672857" cy="278333"/>
+          </a:xfrm>
+          <a:prstGeom prst="rect">
+            <a:avLst/>
+          </a:prstGeom>
+        </p:spPr>
+      </p:pic>
+      <p:sp>
+        <p:nvSpPr>
+          <p:cNvPr id="29" name="ZoneTexte 28"/>
+          <p:cNvSpPr txBox="1"/>
+          <p:nvPr/>
+        </p:nvSpPr>
+        <p:spPr>
+          <a:xfrm rot="16200000">
+            <a:off x="-881993" y="3351266"/>
+            <a:ext cx="2340098" cy="230832"/>
+          </a:xfrm>
+          <a:prstGeom prst="rect">
+            <a:avLst/>
+          </a:prstGeom>
+          <a:noFill/>
+          <a:ln>
+            <a:noFill/>
+          </a:ln>
+        </p:spPr>
+        <p:txBody>
+          <a:bodyPr wrap="square" rtlCol="0">
+            <a:spAutoFit/>
+          </a:bodyPr>
+          <a:lstStyle/>
+          <a:p>
+            <a:r>
+              <a:rPr lang="fr-FR" sz="700" dirty="0" smtClean="0"/>
+              <a:t>Pour aller plus </a:t>
+            </a:r>
+            <a:r>
+              <a:rPr lang="fr-FR" sz="700" dirty="0"/>
+              <a:t>loin : </a:t>
+            </a:r>
+            <a:r>
+              <a:rPr lang="fr-FR" sz="700" dirty="0">
+                <a:hlinkClick r:id="rId4"/>
+              </a:rPr>
+              <a:t>https://</a:t>
+            </a:r>
+            <a:r>
+              <a:rPr lang="fr-FR" sz="900" dirty="0" smtClean="0">
+                <a:hlinkClick r:id="rId4"/>
+              </a:rPr>
+              <a:t>emlyon.github.io/mk99</a:t>
+            </a:r>
+            <a:r>
+              <a:rPr lang="fr-FR" sz="700" dirty="0" smtClean="0"/>
+              <a:t>  </a:t>
+            </a:r>
+            <a:endParaRPr lang="fr-FR" sz="700" dirty="0"/>
+          </a:p>
+        </p:txBody>
+      </p:sp>
+      <p:sp>
+        <p:nvSpPr>
+          <p:cNvPr id="32" name="ZoneTexte 31"/>
+          <p:cNvSpPr txBox="1"/>
+          <p:nvPr/>
+        </p:nvSpPr>
+        <p:spPr>
+          <a:xfrm>
+            <a:off x="113682" y="28960"/>
+            <a:ext cx="934068" cy="300082"/>
+          </a:xfrm>
+          <a:prstGeom prst="rect">
+            <a:avLst/>
+          </a:prstGeom>
+          <a:solidFill>
+            <a:srgbClr val="FFBDF5"/>
+          </a:solidFill>
+        </p:spPr>
+        <p:txBody>
+          <a:bodyPr wrap="square" rtlCol="0">
+            <a:spAutoFit/>
+          </a:bodyPr>
+          <a:lstStyle/>
+          <a:p>
+            <a:pPr>
+              <a:lnSpc>
+                <a:spcPct val="135000"/>
+              </a:lnSpc>
+            </a:pPr>
+            <a:r>
+              <a:rPr lang="fr-FR" sz="1000" dirty="0" err="1" smtClean="0">
+                <a:latin typeface="Stone Serif" pitchFamily="2" charset="0"/>
+              </a:rPr>
+              <a:t>Biz</a:t>
+            </a:r>
+            <a:r>
+              <a:rPr lang="fr-FR" sz="1000" dirty="0" smtClean="0">
+                <a:latin typeface="Stone Serif" pitchFamily="2" charset="0"/>
+              </a:rPr>
+              <a:t> </a:t>
+            </a:r>
+            <a:r>
+              <a:rPr lang="fr-FR" sz="1000" dirty="0" err="1" smtClean="0">
+                <a:latin typeface="Stone Serif" pitchFamily="2" charset="0"/>
+              </a:rPr>
+              <a:t>models</a:t>
+            </a:r>
+            <a:endParaRPr lang="fr-FR" sz="1000" dirty="0">
+              <a:latin typeface="Stone Serif" pitchFamily="2" charset="0"/>
+            </a:endParaRPr>
+          </a:p>
+        </p:txBody>
+      </p:sp>
+      <p:sp>
+        <p:nvSpPr>
+          <p:cNvPr id="20" name="Sous-titre 2"/>
+          <p:cNvSpPr txBox="1">
+            <a:spLocks/>
+          </p:cNvSpPr>
+          <p:nvPr/>
+        </p:nvSpPr>
+        <p:spPr>
+          <a:xfrm>
+            <a:off x="5337544" y="4602365"/>
+            <a:ext cx="1977656" cy="706826"/>
+          </a:xfrm>
+          <a:prstGeom prst="rect">
+            <a:avLst/>
+          </a:prstGeom>
+          <a:ln>
+            <a:solidFill>
+              <a:schemeClr val="tx1"/>
+            </a:solidFill>
+            <a:prstDash val="dash"/>
+          </a:ln>
+        </p:spPr>
+        <p:txBody>
+          <a:bodyPr vert="horz" lIns="91440" tIns="45720" rIns="91440" bIns="45720" rtlCol="0">
+            <a:normAutofit/>
+          </a:bodyPr>
+          <a:lstStyle>
+            <a:lvl1pPr marL="0" indent="0" algn="ctr" defTabSz="717530" rtl="0" eaLnBrk="1" latinLnBrk="0" hangingPunct="1">
+              <a:lnSpc>
+                <a:spcPct val="90000"/>
+              </a:lnSpc>
+              <a:spcBef>
+                <a:spcPts val="785"/>
+              </a:spcBef>
+              <a:buFont typeface="Arial" panose="020B0604020202020204" pitchFamily="34" charset="0"/>
+              <a:buNone/>
+              <a:defRPr sz="1883" kern="1200">
+                <a:solidFill>
+                  <a:schemeClr val="tx1"/>
+                </a:solidFill>
+                <a:latin typeface="+mn-lt"/>
+                <a:ea typeface="+mn-ea"/>
+                <a:cs typeface="+mn-cs"/>
+              </a:defRPr>
+            </a:lvl1pPr>
+            <a:lvl2pPr marL="358765" indent="0" algn="ctr" defTabSz="717530" rtl="0" eaLnBrk="1" latinLnBrk="0" hangingPunct="1">
+              <a:lnSpc>
+                <a:spcPct val="90000"/>
+              </a:lnSpc>
+              <a:spcBef>
+                <a:spcPts val="392"/>
+              </a:spcBef>
+              <a:buFont typeface="Arial" panose="020B0604020202020204" pitchFamily="34" charset="0"/>
+              <a:buNone/>
+              <a:defRPr sz="1569" kern="1200">
+                <a:solidFill>
+                  <a:schemeClr val="tx1"/>
+                </a:solidFill>
+                <a:latin typeface="+mn-lt"/>
+                <a:ea typeface="+mn-ea"/>
+                <a:cs typeface="+mn-cs"/>
+              </a:defRPr>
+            </a:lvl2pPr>
+            <a:lvl3pPr marL="717530" indent="0" algn="ctr" defTabSz="717530" rtl="0" eaLnBrk="1" latinLnBrk="0" hangingPunct="1">
+              <a:lnSpc>
+                <a:spcPct val="90000"/>
+              </a:lnSpc>
+              <a:spcBef>
+                <a:spcPts val="392"/>
+              </a:spcBef>
+              <a:buFont typeface="Arial" panose="020B0604020202020204" pitchFamily="34" charset="0"/>
+              <a:buNone/>
+              <a:defRPr sz="1412" kern="1200">
+                <a:solidFill>
+                  <a:schemeClr val="tx1"/>
+                </a:solidFill>
+                <a:latin typeface="+mn-lt"/>
+                <a:ea typeface="+mn-ea"/>
+                <a:cs typeface="+mn-cs"/>
+              </a:defRPr>
+            </a:lvl3pPr>
+            <a:lvl4pPr marL="1076295" indent="0" algn="ctr" defTabSz="717530" rtl="0" eaLnBrk="1" latinLnBrk="0" hangingPunct="1">
+              <a:lnSpc>
+                <a:spcPct val="90000"/>
+              </a:lnSpc>
+              <a:spcBef>
+                <a:spcPts val="392"/>
+              </a:spcBef>
+              <a:buFont typeface="Arial" panose="020B0604020202020204" pitchFamily="34" charset="0"/>
+              <a:buNone/>
+              <a:defRPr sz="1256" kern="1200">
+                <a:solidFill>
+                  <a:schemeClr val="tx1"/>
+                </a:solidFill>
+                <a:latin typeface="+mn-lt"/>
+                <a:ea typeface="+mn-ea"/>
+                <a:cs typeface="+mn-cs"/>
+              </a:defRPr>
+            </a:lvl4pPr>
+            <a:lvl5pPr marL="1435059" indent="0" algn="ctr" defTabSz="717530" rtl="0" eaLnBrk="1" latinLnBrk="0" hangingPunct="1">
+              <a:lnSpc>
+                <a:spcPct val="90000"/>
+              </a:lnSpc>
+              <a:spcBef>
+                <a:spcPts val="392"/>
+              </a:spcBef>
+              <a:buFont typeface="Arial" panose="020B0604020202020204" pitchFamily="34" charset="0"/>
+              <a:buNone/>
+              <a:defRPr sz="1256" kern="1200">
+                <a:solidFill>
+                  <a:schemeClr val="tx1"/>
+                </a:solidFill>
+                <a:latin typeface="+mn-lt"/>
+                <a:ea typeface="+mn-ea"/>
+                <a:cs typeface="+mn-cs"/>
+              </a:defRPr>
+            </a:lvl5pPr>
+            <a:lvl6pPr marL="1793824" indent="0" algn="ctr" defTabSz="717530" rtl="0" eaLnBrk="1" latinLnBrk="0" hangingPunct="1">
+              <a:lnSpc>
+                <a:spcPct val="90000"/>
+              </a:lnSpc>
+              <a:spcBef>
+                <a:spcPts val="392"/>
+              </a:spcBef>
+              <a:buFont typeface="Arial" panose="020B0604020202020204" pitchFamily="34" charset="0"/>
+              <a:buNone/>
+              <a:defRPr sz="1256" kern="1200">
+                <a:solidFill>
+                  <a:schemeClr val="tx1"/>
+                </a:solidFill>
+                <a:latin typeface="+mn-lt"/>
+                <a:ea typeface="+mn-ea"/>
+                <a:cs typeface="+mn-cs"/>
+              </a:defRPr>
+            </a:lvl6pPr>
+            <a:lvl7pPr marL="2152589" indent="0" algn="ctr" defTabSz="717530" rtl="0" eaLnBrk="1" latinLnBrk="0" hangingPunct="1">
+              <a:lnSpc>
+                <a:spcPct val="90000"/>
+              </a:lnSpc>
+              <a:spcBef>
+                <a:spcPts val="392"/>
+              </a:spcBef>
+              <a:buFont typeface="Arial" panose="020B0604020202020204" pitchFamily="34" charset="0"/>
+              <a:buNone/>
+              <a:defRPr sz="1256" kern="1200">
+                <a:solidFill>
+                  <a:schemeClr val="tx1"/>
+                </a:solidFill>
+                <a:latin typeface="+mn-lt"/>
+                <a:ea typeface="+mn-ea"/>
+                <a:cs typeface="+mn-cs"/>
+              </a:defRPr>
+            </a:lvl7pPr>
+            <a:lvl8pPr marL="2511354" indent="0" algn="ctr" defTabSz="717530" rtl="0" eaLnBrk="1" latinLnBrk="0" hangingPunct="1">
+              <a:lnSpc>
+                <a:spcPct val="90000"/>
+              </a:lnSpc>
+              <a:spcBef>
+                <a:spcPts val="392"/>
+              </a:spcBef>
+              <a:buFont typeface="Arial" panose="020B0604020202020204" pitchFamily="34" charset="0"/>
+              <a:buNone/>
+              <a:defRPr sz="1256" kern="1200">
+                <a:solidFill>
+                  <a:schemeClr val="tx1"/>
+                </a:solidFill>
+                <a:latin typeface="+mn-lt"/>
+                <a:ea typeface="+mn-ea"/>
+                <a:cs typeface="+mn-cs"/>
+              </a:defRPr>
+            </a:lvl8pPr>
+            <a:lvl9pPr marL="2870119" indent="0" algn="ctr" defTabSz="717530" rtl="0" eaLnBrk="1" latinLnBrk="0" hangingPunct="1">
+              <a:lnSpc>
+                <a:spcPct val="90000"/>
+              </a:lnSpc>
+              <a:spcBef>
+                <a:spcPts val="392"/>
+              </a:spcBef>
+              <a:buFont typeface="Arial" panose="020B0604020202020204" pitchFamily="34" charset="0"/>
+              <a:buNone/>
+              <a:defRPr sz="1256" kern="1200">
+                <a:solidFill>
+                  <a:schemeClr val="tx1"/>
+                </a:solidFill>
+                <a:latin typeface="+mn-lt"/>
+                <a:ea typeface="+mn-ea"/>
+                <a:cs typeface="+mn-cs"/>
+              </a:defRPr>
+            </a:lvl9pPr>
+          </a:lstStyle>
+          <a:p>
+            <a:pPr algn="l">
+              <a:lnSpc>
+                <a:spcPct val="135000"/>
+              </a:lnSpc>
+            </a:pPr>
+            <a:r>
+              <a:rPr lang="fr-FR" sz="700" dirty="0" smtClean="0">
+                <a:latin typeface="Stone Serif" pitchFamily="2" charset="0"/>
+              </a:rPr>
+              <a:t>« </a:t>
+            </a:r>
+            <a:r>
+              <a:rPr lang="fr-FR" sz="700" dirty="0" err="1" smtClean="0">
+                <a:latin typeface="Stone Serif" pitchFamily="2" charset="0"/>
+              </a:rPr>
+              <a:t>Matching</a:t>
+            </a:r>
+            <a:r>
+              <a:rPr lang="fr-FR" sz="700" dirty="0" smtClean="0">
+                <a:latin typeface="Stone Serif" pitchFamily="2" charset="0"/>
+              </a:rPr>
+              <a:t> » </a:t>
+            </a:r>
+            <a:r>
+              <a:rPr lang="fr-FR" sz="700" dirty="0" err="1" smtClean="0">
+                <a:latin typeface="Stone Serif" pitchFamily="2" charset="0"/>
+              </a:rPr>
+              <a:t>platforms</a:t>
+            </a:r>
+            <a:r>
+              <a:rPr lang="fr-FR" sz="700" dirty="0" smtClean="0">
+                <a:latin typeface="Stone Serif" pitchFamily="2" charset="0"/>
+              </a:rPr>
+              <a:t>:  </a:t>
+            </a:r>
+            <a:r>
+              <a:rPr lang="fr-FR" sz="700" b="1" dirty="0">
+                <a:latin typeface="Stone Serif" pitchFamily="2" charset="0"/>
+              </a:rPr>
+              <a:t>Facebook, </a:t>
+            </a:r>
+            <a:r>
+              <a:rPr lang="fr-FR" sz="700" b="1" dirty="0" err="1">
+                <a:latin typeface="Stone Serif" pitchFamily="2" charset="0"/>
+              </a:rPr>
+              <a:t>Airbnb</a:t>
+            </a:r>
+            <a:r>
+              <a:rPr lang="fr-FR" sz="700" b="1" dirty="0">
+                <a:latin typeface="Stone Serif" pitchFamily="2" charset="0"/>
+              </a:rPr>
+              <a:t>, </a:t>
+            </a:r>
+            <a:r>
+              <a:rPr lang="fr-FR" sz="700" b="1" dirty="0" err="1">
+                <a:latin typeface="Stone Serif" pitchFamily="2" charset="0"/>
+              </a:rPr>
+              <a:t>Uber</a:t>
+            </a:r>
+            <a:r>
+              <a:rPr lang="fr-FR" sz="700" b="1" dirty="0">
+                <a:latin typeface="Stone Serif" pitchFamily="2" charset="0"/>
+              </a:rPr>
+              <a:t>, </a:t>
+            </a:r>
+            <a:r>
+              <a:rPr lang="fr-FR" sz="700" b="1" dirty="0" err="1">
+                <a:latin typeface="Stone Serif" pitchFamily="2" charset="0"/>
+              </a:rPr>
+              <a:t>Blablacar</a:t>
+            </a:r>
+            <a:r>
+              <a:rPr lang="fr-FR" sz="700" b="1" dirty="0">
+                <a:latin typeface="Stone Serif" pitchFamily="2" charset="0"/>
+              </a:rPr>
+              <a:t>, </a:t>
+            </a:r>
+            <a:r>
+              <a:rPr lang="fr-FR" sz="700" b="1" dirty="0" err="1">
+                <a:latin typeface="Stone Serif" pitchFamily="2" charset="0"/>
+              </a:rPr>
+              <a:t>LeBonCoin</a:t>
+            </a:r>
+            <a:r>
+              <a:rPr lang="fr-FR" sz="700" b="1" dirty="0">
+                <a:latin typeface="Stone Serif" pitchFamily="2" charset="0"/>
+              </a:rPr>
+              <a:t> </a:t>
+            </a:r>
+            <a:r>
+              <a:rPr lang="fr-FR" sz="700" b="1" dirty="0" smtClean="0">
+                <a:latin typeface="Stone Serif" pitchFamily="2" charset="0"/>
+              </a:rPr>
+              <a:t>… </a:t>
+            </a:r>
+            <a:r>
+              <a:rPr lang="fr-FR" sz="700" dirty="0" err="1" smtClean="0">
+                <a:latin typeface="Stone Serif" pitchFamily="2" charset="0"/>
+              </a:rPr>
+              <a:t>provide</a:t>
+            </a:r>
+            <a:r>
+              <a:rPr lang="fr-FR" sz="700" dirty="0" smtClean="0">
+                <a:latin typeface="Stone Serif" pitchFamily="2" charset="0"/>
+              </a:rPr>
+              <a:t> a data-</a:t>
+            </a:r>
+            <a:r>
+              <a:rPr lang="fr-FR" sz="700" dirty="0" err="1" smtClean="0">
+                <a:latin typeface="Stone Serif" pitchFamily="2" charset="0"/>
+              </a:rPr>
+              <a:t>driven</a:t>
+            </a:r>
+            <a:r>
+              <a:rPr lang="fr-FR" sz="700" dirty="0" smtClean="0">
+                <a:latin typeface="Stone Serif" pitchFamily="2" charset="0"/>
+              </a:rPr>
+              <a:t> digital infrastructure </a:t>
+            </a:r>
+            <a:r>
+              <a:rPr lang="fr-FR" sz="700" dirty="0" err="1" smtClean="0">
+                <a:latin typeface="Stone Serif" pitchFamily="2" charset="0"/>
+              </a:rPr>
+              <a:t>enabing</a:t>
+            </a:r>
+            <a:r>
+              <a:rPr lang="fr-FR" sz="700" dirty="0" smtClean="0">
+                <a:latin typeface="Stone Serif" pitchFamily="2" charset="0"/>
+              </a:rPr>
+              <a:t> </a:t>
+            </a:r>
+            <a:r>
+              <a:rPr lang="fr-FR" sz="700" dirty="0" err="1" smtClean="0">
+                <a:latin typeface="Stone Serif" pitchFamily="2" charset="0"/>
+              </a:rPr>
+              <a:t>users</a:t>
+            </a:r>
+            <a:r>
+              <a:rPr lang="fr-FR" sz="700" dirty="0" smtClean="0">
+                <a:latin typeface="Stone Serif" pitchFamily="2" charset="0"/>
+              </a:rPr>
+              <a:t> to </a:t>
+            </a:r>
+            <a:r>
+              <a:rPr lang="fr-FR" sz="700" dirty="0" err="1" smtClean="0">
+                <a:latin typeface="Stone Serif" pitchFamily="2" charset="0"/>
+              </a:rPr>
+              <a:t>buy</a:t>
+            </a:r>
+            <a:r>
+              <a:rPr lang="fr-FR" sz="700" dirty="0" smtClean="0">
+                <a:latin typeface="Stone Serif" pitchFamily="2" charset="0"/>
+              </a:rPr>
+              <a:t>, exchange or </a:t>
+            </a:r>
+            <a:r>
+              <a:rPr lang="fr-FR" sz="700" dirty="0" err="1" smtClean="0">
+                <a:latin typeface="Stone Serif" pitchFamily="2" charset="0"/>
+              </a:rPr>
+              <a:t>communicate</a:t>
+            </a:r>
+            <a:r>
+              <a:rPr lang="fr-FR" sz="700" dirty="0" smtClean="0">
+                <a:latin typeface="Stone Serif" pitchFamily="2" charset="0"/>
+              </a:rPr>
+              <a:t>.</a:t>
+            </a:r>
+            <a:endParaRPr lang="fr-FR" sz="700" dirty="0">
+              <a:latin typeface="Stone Serif" pitchFamily="2" charset="0"/>
+            </a:endParaRPr>
+          </a:p>
+        </p:txBody>
+      </p:sp>
+      <p:sp>
+        <p:nvSpPr>
+          <p:cNvPr id="21" name="Sous-titre 2"/>
+          <p:cNvSpPr txBox="1">
+            <a:spLocks/>
+          </p:cNvSpPr>
+          <p:nvPr/>
+        </p:nvSpPr>
+        <p:spPr>
+          <a:xfrm>
+            <a:off x="2814085" y="4604737"/>
+            <a:ext cx="2445772" cy="704454"/>
+          </a:xfrm>
+          <a:prstGeom prst="rect">
+            <a:avLst/>
+          </a:prstGeom>
+          <a:ln>
+            <a:solidFill>
+              <a:schemeClr val="tx1"/>
+            </a:solidFill>
+            <a:prstDash val="dash"/>
+          </a:ln>
+        </p:spPr>
+        <p:txBody>
+          <a:bodyPr vert="horz" lIns="91440" tIns="45720" rIns="91440" bIns="45720" rtlCol="0">
+            <a:noAutofit/>
+          </a:bodyPr>
+          <a:lstStyle>
+            <a:lvl1pPr marL="0" indent="0" algn="ctr" defTabSz="717530" rtl="0" eaLnBrk="1" latinLnBrk="0" hangingPunct="1">
+              <a:lnSpc>
+                <a:spcPct val="90000"/>
+              </a:lnSpc>
+              <a:spcBef>
+                <a:spcPts val="785"/>
+              </a:spcBef>
+              <a:buFont typeface="Arial" panose="020B0604020202020204" pitchFamily="34" charset="0"/>
+              <a:buNone/>
+              <a:defRPr sz="1883" kern="1200">
+                <a:solidFill>
+                  <a:schemeClr val="tx1"/>
+                </a:solidFill>
+                <a:latin typeface="+mn-lt"/>
+                <a:ea typeface="+mn-ea"/>
+                <a:cs typeface="+mn-cs"/>
+              </a:defRPr>
+            </a:lvl1pPr>
+            <a:lvl2pPr marL="358765" indent="0" algn="ctr" defTabSz="717530" rtl="0" eaLnBrk="1" latinLnBrk="0" hangingPunct="1">
+              <a:lnSpc>
+                <a:spcPct val="90000"/>
+              </a:lnSpc>
+              <a:spcBef>
+                <a:spcPts val="392"/>
+              </a:spcBef>
+              <a:buFont typeface="Arial" panose="020B0604020202020204" pitchFamily="34" charset="0"/>
+              <a:buNone/>
+              <a:defRPr sz="1569" kern="1200">
+                <a:solidFill>
+                  <a:schemeClr val="tx1"/>
+                </a:solidFill>
+                <a:latin typeface="+mn-lt"/>
+                <a:ea typeface="+mn-ea"/>
+                <a:cs typeface="+mn-cs"/>
+              </a:defRPr>
+            </a:lvl2pPr>
+            <a:lvl3pPr marL="717530" indent="0" algn="ctr" defTabSz="717530" rtl="0" eaLnBrk="1" latinLnBrk="0" hangingPunct="1">
+              <a:lnSpc>
+                <a:spcPct val="90000"/>
+              </a:lnSpc>
+              <a:spcBef>
+                <a:spcPts val="392"/>
+              </a:spcBef>
+              <a:buFont typeface="Arial" panose="020B0604020202020204" pitchFamily="34" charset="0"/>
+              <a:buNone/>
+              <a:defRPr sz="1412" kern="1200">
+                <a:solidFill>
+                  <a:schemeClr val="tx1"/>
+                </a:solidFill>
+                <a:latin typeface="+mn-lt"/>
+                <a:ea typeface="+mn-ea"/>
+                <a:cs typeface="+mn-cs"/>
+              </a:defRPr>
+            </a:lvl3pPr>
+            <a:lvl4pPr marL="1076295" indent="0" algn="ctr" defTabSz="717530" rtl="0" eaLnBrk="1" latinLnBrk="0" hangingPunct="1">
+              <a:lnSpc>
+                <a:spcPct val="90000"/>
+              </a:lnSpc>
+              <a:spcBef>
+                <a:spcPts val="392"/>
+              </a:spcBef>
+              <a:buFont typeface="Arial" panose="020B0604020202020204" pitchFamily="34" charset="0"/>
+              <a:buNone/>
+              <a:defRPr sz="1256" kern="1200">
+                <a:solidFill>
+                  <a:schemeClr val="tx1"/>
+                </a:solidFill>
+                <a:latin typeface="+mn-lt"/>
+                <a:ea typeface="+mn-ea"/>
+                <a:cs typeface="+mn-cs"/>
+              </a:defRPr>
+            </a:lvl4pPr>
+            <a:lvl5pPr marL="1435059" indent="0" algn="ctr" defTabSz="717530" rtl="0" eaLnBrk="1" latinLnBrk="0" hangingPunct="1">
+              <a:lnSpc>
+                <a:spcPct val="90000"/>
+              </a:lnSpc>
+              <a:spcBef>
+                <a:spcPts val="392"/>
+              </a:spcBef>
+              <a:buFont typeface="Arial" panose="020B0604020202020204" pitchFamily="34" charset="0"/>
+              <a:buNone/>
+              <a:defRPr sz="1256" kern="1200">
+                <a:solidFill>
+                  <a:schemeClr val="tx1"/>
+                </a:solidFill>
+                <a:latin typeface="+mn-lt"/>
+                <a:ea typeface="+mn-ea"/>
+                <a:cs typeface="+mn-cs"/>
+              </a:defRPr>
+            </a:lvl5pPr>
+            <a:lvl6pPr marL="1793824" indent="0" algn="ctr" defTabSz="717530" rtl="0" eaLnBrk="1" latinLnBrk="0" hangingPunct="1">
+              <a:lnSpc>
+                <a:spcPct val="90000"/>
+              </a:lnSpc>
+              <a:spcBef>
+                <a:spcPts val="392"/>
+              </a:spcBef>
+              <a:buFont typeface="Arial" panose="020B0604020202020204" pitchFamily="34" charset="0"/>
+              <a:buNone/>
+              <a:defRPr sz="1256" kern="1200">
+                <a:solidFill>
+                  <a:schemeClr val="tx1"/>
+                </a:solidFill>
+                <a:latin typeface="+mn-lt"/>
+                <a:ea typeface="+mn-ea"/>
+                <a:cs typeface="+mn-cs"/>
+              </a:defRPr>
+            </a:lvl6pPr>
+            <a:lvl7pPr marL="2152589" indent="0" algn="ctr" defTabSz="717530" rtl="0" eaLnBrk="1" latinLnBrk="0" hangingPunct="1">
+              <a:lnSpc>
+                <a:spcPct val="90000"/>
+              </a:lnSpc>
+              <a:spcBef>
+                <a:spcPts val="392"/>
+              </a:spcBef>
+              <a:buFont typeface="Arial" panose="020B0604020202020204" pitchFamily="34" charset="0"/>
+              <a:buNone/>
+              <a:defRPr sz="1256" kern="1200">
+                <a:solidFill>
+                  <a:schemeClr val="tx1"/>
+                </a:solidFill>
+                <a:latin typeface="+mn-lt"/>
+                <a:ea typeface="+mn-ea"/>
+                <a:cs typeface="+mn-cs"/>
+              </a:defRPr>
+            </a:lvl7pPr>
+            <a:lvl8pPr marL="2511354" indent="0" algn="ctr" defTabSz="717530" rtl="0" eaLnBrk="1" latinLnBrk="0" hangingPunct="1">
+              <a:lnSpc>
+                <a:spcPct val="90000"/>
+              </a:lnSpc>
+              <a:spcBef>
+                <a:spcPts val="392"/>
+              </a:spcBef>
+              <a:buFont typeface="Arial" panose="020B0604020202020204" pitchFamily="34" charset="0"/>
+              <a:buNone/>
+              <a:defRPr sz="1256" kern="1200">
+                <a:solidFill>
+                  <a:schemeClr val="tx1"/>
+                </a:solidFill>
+                <a:latin typeface="+mn-lt"/>
+                <a:ea typeface="+mn-ea"/>
+                <a:cs typeface="+mn-cs"/>
+              </a:defRPr>
+            </a:lvl8pPr>
+            <a:lvl9pPr marL="2870119" indent="0" algn="ctr" defTabSz="717530" rtl="0" eaLnBrk="1" latinLnBrk="0" hangingPunct="1">
+              <a:lnSpc>
+                <a:spcPct val="90000"/>
+              </a:lnSpc>
+              <a:spcBef>
+                <a:spcPts val="392"/>
+              </a:spcBef>
+              <a:buFont typeface="Arial" panose="020B0604020202020204" pitchFamily="34" charset="0"/>
+              <a:buNone/>
+              <a:defRPr sz="1256" kern="1200">
+                <a:solidFill>
+                  <a:schemeClr val="tx1"/>
+                </a:solidFill>
+                <a:latin typeface="+mn-lt"/>
+                <a:ea typeface="+mn-ea"/>
+                <a:cs typeface="+mn-cs"/>
+              </a:defRPr>
+            </a:lvl9pPr>
+          </a:lstStyle>
+          <a:p>
+            <a:pPr algn="l">
+              <a:lnSpc>
+                <a:spcPct val="135000"/>
+              </a:lnSpc>
+            </a:pPr>
+            <a:r>
+              <a:rPr lang="fr-FR" sz="700" dirty="0" smtClean="0">
+                <a:latin typeface="Stone Serif" pitchFamily="2" charset="0"/>
+              </a:rPr>
+              <a:t>« Distribution » </a:t>
+            </a:r>
+            <a:r>
+              <a:rPr lang="fr-FR" sz="700" dirty="0" err="1" smtClean="0">
+                <a:latin typeface="Stone Serif" pitchFamily="2" charset="0"/>
+              </a:rPr>
+              <a:t>platforms</a:t>
+            </a:r>
+            <a:r>
+              <a:rPr lang="fr-FR" sz="700" dirty="0" smtClean="0">
+                <a:latin typeface="Stone Serif" pitchFamily="2" charset="0"/>
+              </a:rPr>
+              <a:t>:  </a:t>
+            </a:r>
+            <a:r>
+              <a:rPr lang="fr-FR" sz="700" b="1" dirty="0" err="1">
+                <a:latin typeface="Stone Serif" pitchFamily="2" charset="0"/>
+              </a:rPr>
+              <a:t>Spotify</a:t>
+            </a:r>
+            <a:r>
+              <a:rPr lang="fr-FR" sz="700" b="1" dirty="0">
+                <a:latin typeface="Stone Serif" pitchFamily="2" charset="0"/>
+              </a:rPr>
+              <a:t>, </a:t>
+            </a:r>
+            <a:r>
+              <a:rPr lang="fr-FR" sz="700" b="1" dirty="0" err="1">
+                <a:latin typeface="Stone Serif" pitchFamily="2" charset="0"/>
+              </a:rPr>
+              <a:t>Netflix</a:t>
+            </a:r>
+            <a:r>
+              <a:rPr lang="fr-FR" sz="700" b="1" dirty="0">
+                <a:latin typeface="Stone Serif" pitchFamily="2" charset="0"/>
+              </a:rPr>
+              <a:t>, </a:t>
+            </a:r>
+            <a:r>
+              <a:rPr lang="fr-FR" sz="700" b="1" dirty="0" smtClean="0">
+                <a:latin typeface="Stone Serif" pitchFamily="2" charset="0"/>
+              </a:rPr>
+              <a:t>Amazon</a:t>
+            </a:r>
+            <a:r>
+              <a:rPr lang="fr-FR" sz="700" b="1" dirty="0">
+                <a:latin typeface="Stone Serif" pitchFamily="2" charset="0"/>
+              </a:rPr>
+              <a:t>, booking.com, </a:t>
+            </a:r>
+            <a:r>
+              <a:rPr lang="fr-FR" sz="700" b="1" dirty="0" err="1">
+                <a:latin typeface="Stone Serif" pitchFamily="2" charset="0"/>
+              </a:rPr>
+              <a:t>Uber</a:t>
+            </a:r>
+            <a:r>
+              <a:rPr lang="fr-FR" sz="700" b="1" dirty="0">
+                <a:latin typeface="Stone Serif" pitchFamily="2" charset="0"/>
+              </a:rPr>
+              <a:t> </a:t>
+            </a:r>
+            <a:r>
+              <a:rPr lang="fr-FR" sz="700" b="1" dirty="0" err="1" smtClean="0">
+                <a:latin typeface="Stone Serif" pitchFamily="2" charset="0"/>
+              </a:rPr>
+              <a:t>Eats</a:t>
+            </a:r>
+            <a:r>
+              <a:rPr lang="fr-FR" sz="700" b="1" dirty="0" smtClean="0">
+                <a:latin typeface="Stone Serif" pitchFamily="2" charset="0"/>
+              </a:rPr>
+              <a:t> … </a:t>
+            </a:r>
+            <a:r>
+              <a:rPr lang="fr-FR" sz="700" dirty="0" err="1" smtClean="0">
+                <a:latin typeface="Stone Serif" pitchFamily="2" charset="0"/>
+              </a:rPr>
+              <a:t>coordinate</a:t>
+            </a:r>
+            <a:r>
+              <a:rPr lang="fr-FR" sz="700" dirty="0" smtClean="0">
+                <a:latin typeface="Stone Serif" pitchFamily="2" charset="0"/>
+              </a:rPr>
+              <a:t> </a:t>
+            </a:r>
+            <a:r>
+              <a:rPr lang="fr-FR" sz="700" dirty="0" err="1" smtClean="0">
+                <a:latin typeface="Stone Serif" pitchFamily="2" charset="0"/>
+              </a:rPr>
+              <a:t>suppliers</a:t>
+            </a:r>
+            <a:r>
+              <a:rPr lang="fr-FR" sz="700" dirty="0" smtClean="0">
+                <a:latin typeface="Stone Serif" pitchFamily="2" charset="0"/>
+              </a:rPr>
+              <a:t> </a:t>
+            </a:r>
+            <a:r>
+              <a:rPr lang="fr-FR" sz="700" dirty="0" err="1" smtClean="0">
+                <a:latin typeface="Stone Serif" pitchFamily="2" charset="0"/>
+              </a:rPr>
+              <a:t>with</a:t>
+            </a:r>
+            <a:r>
+              <a:rPr lang="fr-FR" sz="700" dirty="0" smtClean="0">
+                <a:latin typeface="Stone Serif" pitchFamily="2" charset="0"/>
+              </a:rPr>
+              <a:t> </a:t>
+            </a:r>
+            <a:r>
+              <a:rPr lang="fr-FR" sz="700" dirty="0" err="1" smtClean="0">
+                <a:latin typeface="Stone Serif" pitchFamily="2" charset="0"/>
+              </a:rPr>
+              <a:t>customers</a:t>
+            </a:r>
+            <a:r>
+              <a:rPr lang="fr-FR" sz="700" dirty="0" smtClean="0">
+                <a:latin typeface="Stone Serif" pitchFamily="2" charset="0"/>
+              </a:rPr>
+              <a:t>, </a:t>
+            </a:r>
+            <a:r>
+              <a:rPr lang="fr-FR" sz="700" dirty="0" err="1" smtClean="0">
+                <a:latin typeface="Stone Serif" pitchFamily="2" charset="0"/>
+              </a:rPr>
+              <a:t>drawing</a:t>
+            </a:r>
+            <a:r>
+              <a:rPr lang="fr-FR" sz="700" dirty="0" smtClean="0">
+                <a:latin typeface="Stone Serif" pitchFamily="2" charset="0"/>
+              </a:rPr>
+              <a:t> </a:t>
+            </a:r>
+            <a:r>
+              <a:rPr lang="fr-FR" sz="700" dirty="0" err="1" smtClean="0">
+                <a:latin typeface="Stone Serif" pitchFamily="2" charset="0"/>
+              </a:rPr>
+              <a:t>their</a:t>
+            </a:r>
+            <a:r>
+              <a:rPr lang="fr-FR" sz="700" dirty="0" smtClean="0">
+                <a:latin typeface="Stone Serif" pitchFamily="2" charset="0"/>
+              </a:rPr>
+              <a:t> </a:t>
+            </a:r>
+            <a:r>
+              <a:rPr lang="fr-FR" sz="700" dirty="0" err="1" smtClean="0">
+                <a:latin typeface="Stone Serif" pitchFamily="2" charset="0"/>
+              </a:rPr>
+              <a:t>competitive</a:t>
+            </a:r>
+            <a:r>
+              <a:rPr lang="fr-FR" sz="700" dirty="0" smtClean="0">
+                <a:latin typeface="Stone Serif" pitchFamily="2" charset="0"/>
+              </a:rPr>
+              <a:t> </a:t>
+            </a:r>
+            <a:r>
+              <a:rPr lang="fr-FR" sz="700" dirty="0" err="1" smtClean="0">
+                <a:latin typeface="Stone Serif" pitchFamily="2" charset="0"/>
+              </a:rPr>
+              <a:t>advantage</a:t>
+            </a:r>
+            <a:r>
+              <a:rPr lang="fr-FR" sz="700" dirty="0" smtClean="0">
+                <a:latin typeface="Stone Serif" pitchFamily="2" charset="0"/>
+              </a:rPr>
+              <a:t> </a:t>
+            </a:r>
+            <a:r>
+              <a:rPr lang="fr-FR" sz="700" dirty="0" err="1" smtClean="0">
+                <a:latin typeface="Stone Serif" pitchFamily="2" charset="0"/>
+              </a:rPr>
+              <a:t>from</a:t>
+            </a:r>
+            <a:r>
+              <a:rPr lang="fr-FR" sz="700" dirty="0" smtClean="0">
+                <a:latin typeface="Stone Serif" pitchFamily="2" charset="0"/>
+              </a:rPr>
+              <a:t> </a:t>
+            </a:r>
+            <a:r>
+              <a:rPr lang="fr-FR" sz="700" dirty="0" err="1" smtClean="0">
+                <a:latin typeface="Stone Serif" pitchFamily="2" charset="0"/>
+              </a:rPr>
+              <a:t>flawless</a:t>
+            </a:r>
+            <a:r>
+              <a:rPr lang="fr-FR" sz="700" dirty="0" smtClean="0">
+                <a:latin typeface="Stone Serif" pitchFamily="2" charset="0"/>
+              </a:rPr>
+              <a:t> </a:t>
+            </a:r>
+            <a:r>
+              <a:rPr lang="fr-FR" sz="700" dirty="0" err="1" smtClean="0">
+                <a:latin typeface="Stone Serif" pitchFamily="2" charset="0"/>
+              </a:rPr>
+              <a:t>logitics</a:t>
+            </a:r>
+            <a:r>
+              <a:rPr lang="fr-FR" sz="700" dirty="0" smtClean="0">
+                <a:latin typeface="Stone Serif" pitchFamily="2" charset="0"/>
+              </a:rPr>
+              <a:t>, interfaces, and data-</a:t>
+            </a:r>
+            <a:r>
+              <a:rPr lang="fr-FR" sz="700" dirty="0" err="1" smtClean="0">
+                <a:latin typeface="Stone Serif" pitchFamily="2" charset="0"/>
+              </a:rPr>
+              <a:t>driven</a:t>
+            </a:r>
+            <a:r>
+              <a:rPr lang="fr-FR" sz="700" dirty="0" smtClean="0">
+                <a:latin typeface="Stone Serif" pitchFamily="2" charset="0"/>
+              </a:rPr>
+              <a:t> </a:t>
+            </a:r>
+            <a:r>
+              <a:rPr lang="fr-FR" sz="700" dirty="0" err="1" smtClean="0">
+                <a:latin typeface="Stone Serif" pitchFamily="2" charset="0"/>
+              </a:rPr>
+              <a:t>processes</a:t>
+            </a:r>
+            <a:endParaRPr lang="fr-FR" sz="700" b="1" dirty="0">
+              <a:latin typeface="Stone Serif" pitchFamily="2" charset="0"/>
+            </a:endParaRPr>
+          </a:p>
+        </p:txBody>
+      </p:sp>
+      <p:sp>
+        <p:nvSpPr>
+          <p:cNvPr id="22" name="Sous-titre 2"/>
+          <p:cNvSpPr txBox="1">
+            <a:spLocks/>
+          </p:cNvSpPr>
+          <p:nvPr/>
+        </p:nvSpPr>
+        <p:spPr>
+          <a:xfrm>
+            <a:off x="432369" y="4607440"/>
+            <a:ext cx="2303744" cy="701751"/>
+          </a:xfrm>
+          <a:prstGeom prst="rect">
+            <a:avLst/>
+          </a:prstGeom>
+          <a:ln>
+            <a:solidFill>
+              <a:schemeClr val="tx1"/>
+            </a:solidFill>
+            <a:prstDash val="dash"/>
+          </a:ln>
+        </p:spPr>
+        <p:txBody>
+          <a:bodyPr vert="horz" lIns="91440" tIns="45720" rIns="91440" bIns="45720" rtlCol="0">
+            <a:normAutofit/>
+          </a:bodyPr>
+          <a:lstStyle>
+            <a:lvl1pPr marL="0" indent="0" algn="ctr" defTabSz="717530" rtl="0" eaLnBrk="1" latinLnBrk="0" hangingPunct="1">
+              <a:lnSpc>
+                <a:spcPct val="90000"/>
+              </a:lnSpc>
+              <a:spcBef>
+                <a:spcPts val="785"/>
+              </a:spcBef>
+              <a:buFont typeface="Arial" panose="020B0604020202020204" pitchFamily="34" charset="0"/>
+              <a:buNone/>
+              <a:defRPr sz="1883" kern="1200">
+                <a:solidFill>
+                  <a:schemeClr val="tx1"/>
+                </a:solidFill>
+                <a:latin typeface="+mn-lt"/>
+                <a:ea typeface="+mn-ea"/>
+                <a:cs typeface="+mn-cs"/>
+              </a:defRPr>
+            </a:lvl1pPr>
+            <a:lvl2pPr marL="358765" indent="0" algn="ctr" defTabSz="717530" rtl="0" eaLnBrk="1" latinLnBrk="0" hangingPunct="1">
+              <a:lnSpc>
+                <a:spcPct val="90000"/>
+              </a:lnSpc>
+              <a:spcBef>
+                <a:spcPts val="392"/>
+              </a:spcBef>
+              <a:buFont typeface="Arial" panose="020B0604020202020204" pitchFamily="34" charset="0"/>
+              <a:buNone/>
+              <a:defRPr sz="1569" kern="1200">
+                <a:solidFill>
+                  <a:schemeClr val="tx1"/>
+                </a:solidFill>
+                <a:latin typeface="+mn-lt"/>
+                <a:ea typeface="+mn-ea"/>
+                <a:cs typeface="+mn-cs"/>
+              </a:defRPr>
+            </a:lvl2pPr>
+            <a:lvl3pPr marL="717530" indent="0" algn="ctr" defTabSz="717530" rtl="0" eaLnBrk="1" latinLnBrk="0" hangingPunct="1">
+              <a:lnSpc>
+                <a:spcPct val="90000"/>
+              </a:lnSpc>
+              <a:spcBef>
+                <a:spcPts val="392"/>
+              </a:spcBef>
+              <a:buFont typeface="Arial" panose="020B0604020202020204" pitchFamily="34" charset="0"/>
+              <a:buNone/>
+              <a:defRPr sz="1412" kern="1200">
+                <a:solidFill>
+                  <a:schemeClr val="tx1"/>
+                </a:solidFill>
+                <a:latin typeface="+mn-lt"/>
+                <a:ea typeface="+mn-ea"/>
+                <a:cs typeface="+mn-cs"/>
+              </a:defRPr>
+            </a:lvl3pPr>
+            <a:lvl4pPr marL="1076295" indent="0" algn="ctr" defTabSz="717530" rtl="0" eaLnBrk="1" latinLnBrk="0" hangingPunct="1">
+              <a:lnSpc>
+                <a:spcPct val="90000"/>
+              </a:lnSpc>
+              <a:spcBef>
+                <a:spcPts val="392"/>
+              </a:spcBef>
+              <a:buFont typeface="Arial" panose="020B0604020202020204" pitchFamily="34" charset="0"/>
+              <a:buNone/>
+              <a:defRPr sz="1256" kern="1200">
+                <a:solidFill>
+                  <a:schemeClr val="tx1"/>
+                </a:solidFill>
+                <a:latin typeface="+mn-lt"/>
+                <a:ea typeface="+mn-ea"/>
+                <a:cs typeface="+mn-cs"/>
+              </a:defRPr>
+            </a:lvl4pPr>
+            <a:lvl5pPr marL="1435059" indent="0" algn="ctr" defTabSz="717530" rtl="0" eaLnBrk="1" latinLnBrk="0" hangingPunct="1">
+              <a:lnSpc>
+                <a:spcPct val="90000"/>
+              </a:lnSpc>
+              <a:spcBef>
+                <a:spcPts val="392"/>
+              </a:spcBef>
+              <a:buFont typeface="Arial" panose="020B0604020202020204" pitchFamily="34" charset="0"/>
+              <a:buNone/>
+              <a:defRPr sz="1256" kern="1200">
+                <a:solidFill>
+                  <a:schemeClr val="tx1"/>
+                </a:solidFill>
+                <a:latin typeface="+mn-lt"/>
+                <a:ea typeface="+mn-ea"/>
+                <a:cs typeface="+mn-cs"/>
+              </a:defRPr>
+            </a:lvl5pPr>
+            <a:lvl6pPr marL="1793824" indent="0" algn="ctr" defTabSz="717530" rtl="0" eaLnBrk="1" latinLnBrk="0" hangingPunct="1">
+              <a:lnSpc>
+                <a:spcPct val="90000"/>
+              </a:lnSpc>
+              <a:spcBef>
+                <a:spcPts val="392"/>
+              </a:spcBef>
+              <a:buFont typeface="Arial" panose="020B0604020202020204" pitchFamily="34" charset="0"/>
+              <a:buNone/>
+              <a:defRPr sz="1256" kern="1200">
+                <a:solidFill>
+                  <a:schemeClr val="tx1"/>
+                </a:solidFill>
+                <a:latin typeface="+mn-lt"/>
+                <a:ea typeface="+mn-ea"/>
+                <a:cs typeface="+mn-cs"/>
+              </a:defRPr>
+            </a:lvl6pPr>
+            <a:lvl7pPr marL="2152589" indent="0" algn="ctr" defTabSz="717530" rtl="0" eaLnBrk="1" latinLnBrk="0" hangingPunct="1">
+              <a:lnSpc>
+                <a:spcPct val="90000"/>
+              </a:lnSpc>
+              <a:spcBef>
+                <a:spcPts val="392"/>
+              </a:spcBef>
+              <a:buFont typeface="Arial" panose="020B0604020202020204" pitchFamily="34" charset="0"/>
+              <a:buNone/>
+              <a:defRPr sz="1256" kern="1200">
+                <a:solidFill>
+                  <a:schemeClr val="tx1"/>
+                </a:solidFill>
+                <a:latin typeface="+mn-lt"/>
+                <a:ea typeface="+mn-ea"/>
+                <a:cs typeface="+mn-cs"/>
+              </a:defRPr>
+            </a:lvl7pPr>
+            <a:lvl8pPr marL="2511354" indent="0" algn="ctr" defTabSz="717530" rtl="0" eaLnBrk="1" latinLnBrk="0" hangingPunct="1">
+              <a:lnSpc>
+                <a:spcPct val="90000"/>
+              </a:lnSpc>
+              <a:spcBef>
+                <a:spcPts val="392"/>
+              </a:spcBef>
+              <a:buFont typeface="Arial" panose="020B0604020202020204" pitchFamily="34" charset="0"/>
+              <a:buNone/>
+              <a:defRPr sz="1256" kern="1200">
+                <a:solidFill>
+                  <a:schemeClr val="tx1"/>
+                </a:solidFill>
+                <a:latin typeface="+mn-lt"/>
+                <a:ea typeface="+mn-ea"/>
+                <a:cs typeface="+mn-cs"/>
+              </a:defRPr>
+            </a:lvl8pPr>
+            <a:lvl9pPr marL="2870119" indent="0" algn="ctr" defTabSz="717530" rtl="0" eaLnBrk="1" latinLnBrk="0" hangingPunct="1">
+              <a:lnSpc>
+                <a:spcPct val="90000"/>
+              </a:lnSpc>
+              <a:spcBef>
+                <a:spcPts val="392"/>
+              </a:spcBef>
+              <a:buFont typeface="Arial" panose="020B0604020202020204" pitchFamily="34" charset="0"/>
+              <a:buNone/>
+              <a:defRPr sz="1256" kern="1200">
+                <a:solidFill>
+                  <a:schemeClr val="tx1"/>
+                </a:solidFill>
+                <a:latin typeface="+mn-lt"/>
+                <a:ea typeface="+mn-ea"/>
+                <a:cs typeface="+mn-cs"/>
+              </a:defRPr>
+            </a:lvl9pPr>
+          </a:lstStyle>
+          <a:p>
+            <a:pPr algn="l">
+              <a:lnSpc>
+                <a:spcPct val="135000"/>
+              </a:lnSpc>
+            </a:pPr>
+            <a:r>
+              <a:rPr lang="en-US" sz="700" b="1" dirty="0" err="1">
+                <a:latin typeface="Stone Serif" pitchFamily="2" charset="0"/>
+              </a:rPr>
+              <a:t>Dawex</a:t>
+            </a:r>
+            <a:r>
+              <a:rPr lang="en-US" sz="700" dirty="0">
+                <a:latin typeface="Stone Serif" pitchFamily="2" charset="0"/>
+              </a:rPr>
+              <a:t> is developing a market platform for data, connecting </a:t>
+            </a:r>
+            <a:r>
+              <a:rPr lang="en-US" sz="700" dirty="0" smtClean="0">
+                <a:latin typeface="Stone Serif" pitchFamily="2" charset="0"/>
+              </a:rPr>
+              <a:t>data sellers </a:t>
+            </a:r>
+            <a:r>
+              <a:rPr lang="en-US" sz="700" dirty="0">
+                <a:latin typeface="Stone Serif" pitchFamily="2" charset="0"/>
+              </a:rPr>
+              <a:t>and data buyers. The added value that </a:t>
+            </a:r>
+            <a:r>
+              <a:rPr lang="en-US" sz="700" dirty="0" err="1">
+                <a:latin typeface="Stone Serif" pitchFamily="2" charset="0"/>
+              </a:rPr>
+              <a:t>Dawex</a:t>
+            </a:r>
+            <a:r>
+              <a:rPr lang="en-US" sz="700" dirty="0">
+                <a:latin typeface="Stone Serif" pitchFamily="2" charset="0"/>
+              </a:rPr>
+              <a:t> brings to the players is the total control of the transaction, on a sensitive asset.</a:t>
+            </a:r>
+            <a:endParaRPr lang="fr-FR" sz="700" dirty="0">
+              <a:latin typeface="Stone Serif" pitchFamily="2" charset="0"/>
+            </a:endParaRPr>
+          </a:p>
+        </p:txBody>
+      </p:sp>
+      <p:sp>
+        <p:nvSpPr>
+          <p:cNvPr id="25" name="ZoneTexte 24"/>
+          <p:cNvSpPr txBox="1"/>
+          <p:nvPr/>
+        </p:nvSpPr>
+        <p:spPr>
+          <a:xfrm>
+            <a:off x="432367" y="4303187"/>
+            <a:ext cx="6882833" cy="320857"/>
+          </a:xfrm>
+          <a:prstGeom prst="rect">
+            <a:avLst/>
+          </a:prstGeom>
+          <a:solidFill>
+            <a:srgbClr val="FFBDF5"/>
+          </a:solidFill>
+        </p:spPr>
+        <p:txBody>
+          <a:bodyPr wrap="square" rtlCol="0">
+            <a:spAutoFit/>
+          </a:bodyPr>
+          <a:lstStyle/>
+          <a:p>
+            <a:pPr>
+              <a:lnSpc>
+                <a:spcPct val="135000"/>
+              </a:lnSpc>
+            </a:pPr>
+            <a:r>
+              <a:rPr lang="fr-FR" sz="1100" dirty="0" err="1" smtClean="0">
+                <a:latin typeface="Stone Serif" pitchFamily="2" charset="0"/>
+              </a:rPr>
+              <a:t>Organizations</a:t>
+            </a:r>
+            <a:r>
+              <a:rPr lang="fr-FR" sz="1100" dirty="0" smtClean="0">
+                <a:latin typeface="Stone Serif" pitchFamily="2" charset="0"/>
+              </a:rPr>
+              <a:t> </a:t>
+            </a:r>
+            <a:r>
+              <a:rPr lang="fr-FR" sz="1100" dirty="0" err="1" smtClean="0">
+                <a:latin typeface="Stone Serif" pitchFamily="2" charset="0"/>
+              </a:rPr>
+              <a:t>that</a:t>
+            </a:r>
+            <a:r>
+              <a:rPr lang="fr-FR" sz="1100" dirty="0" smtClean="0">
+                <a:latin typeface="Stone Serif" pitchFamily="2" charset="0"/>
+              </a:rPr>
+              <a:t> </a:t>
+            </a:r>
+            <a:r>
+              <a:rPr lang="fr-FR" sz="1100" dirty="0" err="1" smtClean="0">
+                <a:latin typeface="Stone Serif" pitchFamily="2" charset="0"/>
+              </a:rPr>
+              <a:t>developed</a:t>
+            </a:r>
+            <a:r>
+              <a:rPr lang="fr-FR" sz="1100" dirty="0" smtClean="0">
+                <a:latin typeface="Stone Serif" pitchFamily="2" charset="0"/>
+              </a:rPr>
+              <a:t> </a:t>
+            </a:r>
+            <a:r>
+              <a:rPr lang="fr-FR" sz="1100" dirty="0" err="1" smtClean="0">
+                <a:latin typeface="Stone Serif" pitchFamily="2" charset="0"/>
+              </a:rPr>
+              <a:t>platforms</a:t>
+            </a:r>
+            <a:endParaRPr lang="fr-FR" sz="1100" dirty="0">
+              <a:latin typeface="Stone Serif" pitchFamily="2" charset="0"/>
+            </a:endParaRPr>
+          </a:p>
+        </p:txBody>
+      </p:sp>
+      <p:sp>
+        <p:nvSpPr>
+          <p:cNvPr id="26" name="Sous-titre 2"/>
+          <p:cNvSpPr txBox="1">
+            <a:spLocks/>
+          </p:cNvSpPr>
+          <p:nvPr/>
+        </p:nvSpPr>
+        <p:spPr>
+          <a:xfrm>
+            <a:off x="450972" y="3856165"/>
+            <a:ext cx="4883028" cy="382389"/>
+          </a:xfrm>
+          <a:prstGeom prst="rect">
+            <a:avLst/>
+          </a:prstGeom>
+          <a:ln>
+            <a:solidFill>
+              <a:schemeClr val="tx1"/>
+            </a:solidFill>
+            <a:prstDash val="dash"/>
+          </a:ln>
+        </p:spPr>
+        <p:txBody>
+          <a:bodyPr vert="horz" lIns="91440" tIns="45720" rIns="91440" bIns="45720" rtlCol="0">
+            <a:noAutofit/>
+          </a:bodyPr>
+          <a:lstStyle>
+            <a:lvl1pPr marL="0" indent="0" algn="ctr" defTabSz="717530" rtl="0" eaLnBrk="1" latinLnBrk="0" hangingPunct="1">
+              <a:lnSpc>
+                <a:spcPct val="90000"/>
+              </a:lnSpc>
+              <a:spcBef>
+                <a:spcPts val="785"/>
+              </a:spcBef>
+              <a:buFont typeface="Arial" panose="020B0604020202020204" pitchFamily="34" charset="0"/>
+              <a:buNone/>
+              <a:defRPr sz="1883" kern="1200">
+                <a:solidFill>
+                  <a:schemeClr val="tx1"/>
+                </a:solidFill>
+                <a:latin typeface="+mn-lt"/>
+                <a:ea typeface="+mn-ea"/>
+                <a:cs typeface="+mn-cs"/>
+              </a:defRPr>
+            </a:lvl1pPr>
+            <a:lvl2pPr marL="358765" indent="0" algn="ctr" defTabSz="717530" rtl="0" eaLnBrk="1" latinLnBrk="0" hangingPunct="1">
+              <a:lnSpc>
+                <a:spcPct val="90000"/>
+              </a:lnSpc>
+              <a:spcBef>
+                <a:spcPts val="392"/>
+              </a:spcBef>
+              <a:buFont typeface="Arial" panose="020B0604020202020204" pitchFamily="34" charset="0"/>
+              <a:buNone/>
+              <a:defRPr sz="1569" kern="1200">
+                <a:solidFill>
+                  <a:schemeClr val="tx1"/>
+                </a:solidFill>
+                <a:latin typeface="+mn-lt"/>
+                <a:ea typeface="+mn-ea"/>
+                <a:cs typeface="+mn-cs"/>
+              </a:defRPr>
+            </a:lvl2pPr>
+            <a:lvl3pPr marL="717530" indent="0" algn="ctr" defTabSz="717530" rtl="0" eaLnBrk="1" latinLnBrk="0" hangingPunct="1">
+              <a:lnSpc>
+                <a:spcPct val="90000"/>
+              </a:lnSpc>
+              <a:spcBef>
+                <a:spcPts val="392"/>
+              </a:spcBef>
+              <a:buFont typeface="Arial" panose="020B0604020202020204" pitchFamily="34" charset="0"/>
+              <a:buNone/>
+              <a:defRPr sz="1412" kern="1200">
+                <a:solidFill>
+                  <a:schemeClr val="tx1"/>
+                </a:solidFill>
+                <a:latin typeface="+mn-lt"/>
+                <a:ea typeface="+mn-ea"/>
+                <a:cs typeface="+mn-cs"/>
+              </a:defRPr>
+            </a:lvl3pPr>
+            <a:lvl4pPr marL="1076295" indent="0" algn="ctr" defTabSz="717530" rtl="0" eaLnBrk="1" latinLnBrk="0" hangingPunct="1">
+              <a:lnSpc>
+                <a:spcPct val="90000"/>
+              </a:lnSpc>
+              <a:spcBef>
+                <a:spcPts val="392"/>
+              </a:spcBef>
+              <a:buFont typeface="Arial" panose="020B0604020202020204" pitchFamily="34" charset="0"/>
+              <a:buNone/>
+              <a:defRPr sz="1256" kern="1200">
+                <a:solidFill>
+                  <a:schemeClr val="tx1"/>
+                </a:solidFill>
+                <a:latin typeface="+mn-lt"/>
+                <a:ea typeface="+mn-ea"/>
+                <a:cs typeface="+mn-cs"/>
+              </a:defRPr>
+            </a:lvl4pPr>
+            <a:lvl5pPr marL="1435059" indent="0" algn="ctr" defTabSz="717530" rtl="0" eaLnBrk="1" latinLnBrk="0" hangingPunct="1">
+              <a:lnSpc>
+                <a:spcPct val="90000"/>
+              </a:lnSpc>
+              <a:spcBef>
+                <a:spcPts val="392"/>
+              </a:spcBef>
+              <a:buFont typeface="Arial" panose="020B0604020202020204" pitchFamily="34" charset="0"/>
+              <a:buNone/>
+              <a:defRPr sz="1256" kern="1200">
+                <a:solidFill>
+                  <a:schemeClr val="tx1"/>
+                </a:solidFill>
+                <a:latin typeface="+mn-lt"/>
+                <a:ea typeface="+mn-ea"/>
+                <a:cs typeface="+mn-cs"/>
+              </a:defRPr>
+            </a:lvl5pPr>
+            <a:lvl6pPr marL="1793824" indent="0" algn="ctr" defTabSz="717530" rtl="0" eaLnBrk="1" latinLnBrk="0" hangingPunct="1">
+              <a:lnSpc>
+                <a:spcPct val="90000"/>
+              </a:lnSpc>
+              <a:spcBef>
+                <a:spcPts val="392"/>
+              </a:spcBef>
+              <a:buFont typeface="Arial" panose="020B0604020202020204" pitchFamily="34" charset="0"/>
+              <a:buNone/>
+              <a:defRPr sz="1256" kern="1200">
+                <a:solidFill>
+                  <a:schemeClr val="tx1"/>
+                </a:solidFill>
+                <a:latin typeface="+mn-lt"/>
+                <a:ea typeface="+mn-ea"/>
+                <a:cs typeface="+mn-cs"/>
+              </a:defRPr>
+            </a:lvl6pPr>
+            <a:lvl7pPr marL="2152589" indent="0" algn="ctr" defTabSz="717530" rtl="0" eaLnBrk="1" latinLnBrk="0" hangingPunct="1">
+              <a:lnSpc>
+                <a:spcPct val="90000"/>
+              </a:lnSpc>
+              <a:spcBef>
+                <a:spcPts val="392"/>
+              </a:spcBef>
+              <a:buFont typeface="Arial" panose="020B0604020202020204" pitchFamily="34" charset="0"/>
+              <a:buNone/>
+              <a:defRPr sz="1256" kern="1200">
+                <a:solidFill>
+                  <a:schemeClr val="tx1"/>
+                </a:solidFill>
+                <a:latin typeface="+mn-lt"/>
+                <a:ea typeface="+mn-ea"/>
+                <a:cs typeface="+mn-cs"/>
+              </a:defRPr>
+            </a:lvl7pPr>
+            <a:lvl8pPr marL="2511354" indent="0" algn="ctr" defTabSz="717530" rtl="0" eaLnBrk="1" latinLnBrk="0" hangingPunct="1">
+              <a:lnSpc>
+                <a:spcPct val="90000"/>
+              </a:lnSpc>
+              <a:spcBef>
+                <a:spcPts val="392"/>
+              </a:spcBef>
+              <a:buFont typeface="Arial" panose="020B0604020202020204" pitchFamily="34" charset="0"/>
+              <a:buNone/>
+              <a:defRPr sz="1256" kern="1200">
+                <a:solidFill>
+                  <a:schemeClr val="tx1"/>
+                </a:solidFill>
+                <a:latin typeface="+mn-lt"/>
+                <a:ea typeface="+mn-ea"/>
+                <a:cs typeface="+mn-cs"/>
+              </a:defRPr>
+            </a:lvl8pPr>
+            <a:lvl9pPr marL="2870119" indent="0" algn="ctr" defTabSz="717530" rtl="0" eaLnBrk="1" latinLnBrk="0" hangingPunct="1">
+              <a:lnSpc>
+                <a:spcPct val="90000"/>
+              </a:lnSpc>
+              <a:spcBef>
+                <a:spcPts val="392"/>
+              </a:spcBef>
+              <a:buFont typeface="Arial" panose="020B0604020202020204" pitchFamily="34" charset="0"/>
+              <a:buNone/>
+              <a:defRPr sz="1256" kern="1200">
+                <a:solidFill>
+                  <a:schemeClr val="tx1"/>
+                </a:solidFill>
+                <a:latin typeface="+mn-lt"/>
+                <a:ea typeface="+mn-ea"/>
+                <a:cs typeface="+mn-cs"/>
+              </a:defRPr>
+            </a:lvl9pPr>
+          </a:lstStyle>
+          <a:p>
+            <a:pPr algn="l">
+              <a:lnSpc>
+                <a:spcPct val="135000"/>
+              </a:lnSpc>
+            </a:pPr>
+            <a:r>
+              <a:rPr lang="da-DK" sz="800" dirty="0" smtClean="0">
+                <a:latin typeface="Stone Serif" pitchFamily="2" charset="0"/>
+              </a:rPr>
+              <a:t>Andrew Mcafee and Erik Brynjolfsson, </a:t>
+            </a:r>
+            <a:r>
+              <a:rPr lang="fr-FR" sz="800" i="1" dirty="0" smtClean="0">
+                <a:latin typeface="Stone Serif" pitchFamily="2" charset="0"/>
+              </a:rPr>
+              <a:t>Machine, </a:t>
+            </a:r>
+            <a:r>
+              <a:rPr lang="fr-FR" sz="800" i="1" dirty="0" err="1" smtClean="0">
+                <a:latin typeface="Stone Serif" pitchFamily="2" charset="0"/>
+              </a:rPr>
+              <a:t>platform</a:t>
+            </a:r>
+            <a:r>
+              <a:rPr lang="fr-FR" sz="800" i="1" dirty="0" smtClean="0">
+                <a:latin typeface="Stone Serif" pitchFamily="2" charset="0"/>
+              </a:rPr>
+              <a:t>, </a:t>
+            </a:r>
+            <a:r>
+              <a:rPr lang="fr-FR" sz="800" i="1" dirty="0" err="1" smtClean="0">
+                <a:latin typeface="Stone Serif" pitchFamily="2" charset="0"/>
+              </a:rPr>
+              <a:t>crowd</a:t>
+            </a:r>
+            <a:r>
+              <a:rPr lang="fr-FR" sz="800" dirty="0">
+                <a:latin typeface="Stone Serif" pitchFamily="2" charset="0"/>
+              </a:rPr>
+              <a:t>, W. W. </a:t>
+            </a:r>
+            <a:r>
+              <a:rPr lang="fr-FR" sz="800" dirty="0" smtClean="0">
+                <a:latin typeface="Stone Serif" pitchFamily="2" charset="0"/>
+              </a:rPr>
+              <a:t>Norton, 2017.</a:t>
+            </a:r>
+            <a:r>
+              <a:rPr lang="fr-FR" sz="800" i="1" dirty="0">
+                <a:latin typeface="Stone Serif" pitchFamily="2" charset="0"/>
+              </a:rPr>
+              <a:t/>
+            </a:r>
+            <a:br>
+              <a:rPr lang="fr-FR" sz="800" i="1" dirty="0">
+                <a:latin typeface="Stone Serif" pitchFamily="2" charset="0"/>
+              </a:rPr>
+            </a:br>
+            <a:r>
+              <a:rPr lang="fr-FR" sz="800" dirty="0" smtClean="0">
+                <a:latin typeface="Stone Serif" pitchFamily="2" charset="0"/>
+              </a:rPr>
+              <a:t>David S. Evans and Richard </a:t>
+            </a:r>
+            <a:r>
+              <a:rPr lang="fr-FR" sz="800" dirty="0" err="1" smtClean="0">
+                <a:latin typeface="Stone Serif" pitchFamily="2" charset="0"/>
+              </a:rPr>
+              <a:t>Schmalensee</a:t>
+            </a:r>
+            <a:r>
+              <a:rPr lang="fr-FR" sz="800" dirty="0" smtClean="0">
+                <a:latin typeface="Stone Serif" pitchFamily="2" charset="0"/>
+              </a:rPr>
+              <a:t>, </a:t>
+            </a:r>
+            <a:r>
+              <a:rPr lang="fr-FR" sz="800" i="1" dirty="0" err="1" smtClean="0">
+                <a:latin typeface="Stone Serif" pitchFamily="2" charset="0"/>
+              </a:rPr>
+              <a:t>Matchmakers</a:t>
+            </a:r>
+            <a:r>
+              <a:rPr lang="fr-FR" sz="800" dirty="0" smtClean="0">
+                <a:latin typeface="Stone Serif" pitchFamily="2" charset="0"/>
+              </a:rPr>
+              <a:t>, Harvard Business </a:t>
+            </a:r>
+            <a:r>
+              <a:rPr lang="fr-FR" sz="800" dirty="0" err="1" smtClean="0">
+                <a:latin typeface="Stone Serif" pitchFamily="2" charset="0"/>
+              </a:rPr>
+              <a:t>Review</a:t>
+            </a:r>
+            <a:r>
+              <a:rPr lang="fr-FR" sz="800" dirty="0" smtClean="0">
+                <a:latin typeface="Stone Serif" pitchFamily="2" charset="0"/>
+              </a:rPr>
+              <a:t> </a:t>
+            </a:r>
+            <a:r>
+              <a:rPr lang="fr-FR" sz="800" dirty="0" err="1" smtClean="0">
+                <a:latin typeface="Stone Serif" pitchFamily="2" charset="0"/>
+              </a:rPr>
+              <a:t>Press</a:t>
+            </a:r>
+            <a:r>
+              <a:rPr lang="fr-FR" sz="800" dirty="0" smtClean="0">
+                <a:latin typeface="Stone Serif" pitchFamily="2" charset="0"/>
+              </a:rPr>
+              <a:t>, 2016.</a:t>
+            </a:r>
+            <a:endParaRPr lang="fr-FR" sz="800" i="1" dirty="0" smtClean="0">
+              <a:latin typeface="Stone Serif" pitchFamily="2" charset="0"/>
+            </a:endParaRPr>
+          </a:p>
+        </p:txBody>
+      </p:sp>
+      <p:sp>
+        <p:nvSpPr>
+          <p:cNvPr id="27" name="ZoneTexte 26"/>
+          <p:cNvSpPr txBox="1"/>
+          <p:nvPr/>
+        </p:nvSpPr>
+        <p:spPr>
+          <a:xfrm>
+            <a:off x="432366" y="3616374"/>
+            <a:ext cx="4901634" cy="279307"/>
+          </a:xfrm>
+          <a:prstGeom prst="rect">
+            <a:avLst/>
+          </a:prstGeom>
+          <a:solidFill>
+            <a:srgbClr val="FFBDF5"/>
+          </a:solidFill>
+        </p:spPr>
+        <p:txBody>
+          <a:bodyPr wrap="square" rtlCol="0">
+            <a:spAutoFit/>
+          </a:bodyPr>
+          <a:lstStyle/>
+          <a:p>
+            <a:pPr>
+              <a:lnSpc>
+                <a:spcPct val="135000"/>
+              </a:lnSpc>
+            </a:pPr>
+            <a:r>
+              <a:rPr lang="fr-FR" sz="900" dirty="0" smtClean="0">
+                <a:latin typeface="Stone Serif" pitchFamily="2" charset="0"/>
+              </a:rPr>
+              <a:t>To go </a:t>
+            </a:r>
+            <a:r>
+              <a:rPr lang="fr-FR" sz="900" dirty="0" err="1" smtClean="0">
+                <a:latin typeface="Stone Serif" pitchFamily="2" charset="0"/>
+              </a:rPr>
+              <a:t>further</a:t>
+            </a:r>
+            <a:endParaRPr lang="fr-FR" sz="900" dirty="0">
+              <a:latin typeface="Stone Serif" pitchFamily="2" charset="0"/>
+            </a:endParaRPr>
+          </a:p>
+        </p:txBody>
+      </p:sp>
+      <p:sp>
+        <p:nvSpPr>
+          <p:cNvPr id="16" name="ZoneTexte 15"/>
+          <p:cNvSpPr txBox="1"/>
+          <p:nvPr/>
+        </p:nvSpPr>
+        <p:spPr>
+          <a:xfrm>
+            <a:off x="5381500" y="3601734"/>
+            <a:ext cx="1947876" cy="279307"/>
+          </a:xfrm>
+          <a:prstGeom prst="rect">
+            <a:avLst/>
+          </a:prstGeom>
+          <a:solidFill>
+            <a:srgbClr val="FFBDF5"/>
+          </a:solidFill>
+        </p:spPr>
+        <p:txBody>
+          <a:bodyPr wrap="square" rtlCol="0">
+            <a:spAutoFit/>
+          </a:bodyPr>
+          <a:lstStyle/>
+          <a:p>
+            <a:pPr>
+              <a:lnSpc>
+                <a:spcPct val="135000"/>
+              </a:lnSpc>
+            </a:pPr>
+            <a:r>
+              <a:rPr lang="fr-FR" sz="900" dirty="0" smtClean="0">
+                <a:latin typeface="Stone Serif" pitchFamily="2" charset="0"/>
+              </a:rPr>
+              <a:t>To guide </a:t>
+            </a:r>
+            <a:r>
+              <a:rPr lang="fr-FR" sz="900" dirty="0" err="1" smtClean="0">
+                <a:latin typeface="Stone Serif" pitchFamily="2" charset="0"/>
+              </a:rPr>
+              <a:t>your</a:t>
+            </a:r>
+            <a:r>
+              <a:rPr lang="fr-FR" sz="900" dirty="0" smtClean="0">
+                <a:latin typeface="Stone Serif" pitchFamily="2" charset="0"/>
+              </a:rPr>
+              <a:t> </a:t>
+            </a:r>
+            <a:r>
+              <a:rPr lang="fr-FR" sz="900" dirty="0" err="1" smtClean="0">
+                <a:latin typeface="Stone Serif" pitchFamily="2" charset="0"/>
+              </a:rPr>
+              <a:t>company</a:t>
+            </a:r>
+            <a:endParaRPr lang="fr-FR" sz="900" dirty="0">
+              <a:latin typeface="Stone Serif" pitchFamily="2" charset="0"/>
+            </a:endParaRPr>
+          </a:p>
+        </p:txBody>
+      </p:sp>
+    </p:spTree>
+    <p:extLst>
+      <p:ext uri="{BB962C8B-B14F-4D97-AF65-F5344CB8AC3E}">
+        <p14:creationId xmlns:p14="http://schemas.microsoft.com/office/powerpoint/2010/main" val="3739985825"/>
+      </p:ext>
+    </p:extLst>
+  </p:cSld>
+  <p:clrMapOvr>
+    <a:masterClrMapping/>
+  </p:clrMapOvr>
+</p:sld>
+</file>
+
 <file path=ppt/slides/slide2.xml><?xml version="1.0" encoding="utf-8"?>
 <p:sld xmlns:a="http://schemas.openxmlformats.org/drawingml/2006/main" xmlns:r="http://schemas.openxmlformats.org/officeDocument/2006/relationships" xmlns:p="http://schemas.openxmlformats.org/presentationml/2006/main">
   <p:cSld>
@@ -12075,39 +15057,27 @@
               <a:rPr lang="en-US" sz="700" dirty="0" smtClean="0">
                 <a:latin typeface="Stone Serif" pitchFamily="2" charset="0"/>
               </a:rPr>
-              <a:t>analysis suffices</a:t>
-            </a:r>
-            <a:r>
+              <a:t>analysis suffices.</a:t>
+            </a:r>
+            <a:br>
               <a:rPr lang="en-US" sz="700" dirty="0" smtClean="0">
                 <a:latin typeface="Stone Serif" pitchFamily="2" charset="0"/>
               </a:rPr>
-              <a:t>.</a:t>
-            </a:r>
-            <a:r>
-              <a:rPr lang="en-US" sz="700" dirty="0">
-                <a:latin typeface="Stone Serif" pitchFamily="2" charset="0"/>
-              </a:rPr>
-              <a:t/>
-            </a:r>
-            <a:br>
-              <a:rPr lang="en-US" sz="700" dirty="0">
-                <a:latin typeface="Stone Serif" pitchFamily="2" charset="0"/>
-              </a:rPr>
             </a:br>
             <a:r>
-              <a:rPr lang="en-US" sz="700" dirty="0">
+              <a:rPr lang="en-US" sz="700" dirty="0" smtClean="0">
                 <a:latin typeface="Stone Serif" pitchFamily="2" charset="0"/>
               </a:rPr>
               <a:t>- treat AI results as ground truth. AI has biases which need an interdisciplinary team to identify and </a:t>
             </a:r>
             <a:r>
-              <a:rPr lang="en-US" sz="700" dirty="0" err="1">
+              <a:rPr lang="en-US" sz="700" dirty="0" err="1" smtClean="0">
                 <a:latin typeface="Stone Serif" pitchFamily="2" charset="0"/>
               </a:rPr>
               <a:t>debias</a:t>
             </a:r>
             <a:r>
-              <a:rPr lang="en-US" sz="700">
+              <a:rPr lang="en-US" sz="700" dirty="0" smtClean="0">
                 <a:latin typeface="Stone Serif" pitchFamily="2" charset="0"/>
               </a:rPr>
               <a:t>.</a:t>

</xml_diff>

<commit_message>
updated card on blockchain with better company example
</commit_message>
<xml_diff>
--- a/docs/content/en/cards-en.pptx
+++ b/docs/content/en/cards-en.pptx
@@ -136,6 +136,10 @@
             <p14:sldId id="268"/>
             <p14:sldId id="264"/>
             <p14:sldId id="265"/>
+          </p14:sldIdLst>
+        </p14:section>
+        <p14:section name="Section sans titre" id="{963F048F-70BA-473E-8CCE-178A7C8DE07C}">
+          <p14:sldIdLst>
             <p14:sldId id="269"/>
             <p14:sldId id="270"/>
           </p14:sldIdLst>
@@ -231,7 +235,7 @@
           <a:p>
             <a:fld id="{D121557B-95DC-4F9D-80D7-494E711A263C}" type="datetimeFigureOut">
               <a:rPr lang="fr-FR" smtClean="0"/>
-              <a:t>12/06/2019</a:t>
+              <a:t>13/06/2019</a:t>
             </a:fld>
             <a:endParaRPr lang="fr-FR"/>
           </a:p>
@@ -397,7 +401,7 @@
           <a:p>
             <a:fld id="{34B0D5AD-2B20-4FC5-9805-AA792A2BEE79}" type="datetimeFigureOut">
               <a:rPr lang="fr-FR" smtClean="0"/>
-              <a:t>12/06/2019</a:t>
+              <a:t>13/06/2019</a:t>
             </a:fld>
             <a:endParaRPr lang="fr-FR"/>
           </a:p>
@@ -858,7 +862,7 @@
           <a:p>
             <a:fld id="{654FF092-CFE9-4329-97B3-D872B1066925}" type="datetimeFigureOut">
               <a:rPr lang="fr-FR" smtClean="0"/>
-              <a:t>12/06/2019</a:t>
+              <a:t>13/06/2019</a:t>
             </a:fld>
             <a:endParaRPr lang="fr-FR"/>
           </a:p>
@@ -1028,7 +1032,7 @@
           <a:p>
             <a:fld id="{654FF092-CFE9-4329-97B3-D872B1066925}" type="datetimeFigureOut">
               <a:rPr lang="fr-FR" smtClean="0"/>
-              <a:t>12/06/2019</a:t>
+              <a:t>13/06/2019</a:t>
             </a:fld>
             <a:endParaRPr lang="fr-FR"/>
           </a:p>
@@ -1208,7 +1212,7 @@
           <a:p>
             <a:fld id="{654FF092-CFE9-4329-97B3-D872B1066925}" type="datetimeFigureOut">
               <a:rPr lang="fr-FR" smtClean="0"/>
-              <a:t>12/06/2019</a:t>
+              <a:t>13/06/2019</a:t>
             </a:fld>
             <a:endParaRPr lang="fr-FR"/>
           </a:p>
@@ -1378,7 +1382,7 @@
           <a:p>
             <a:fld id="{654FF092-CFE9-4329-97B3-D872B1066925}" type="datetimeFigureOut">
               <a:rPr lang="fr-FR" smtClean="0"/>
-              <a:t>12/06/2019</a:t>
+              <a:t>13/06/2019</a:t>
             </a:fld>
             <a:endParaRPr lang="fr-FR"/>
           </a:p>
@@ -1622,7 +1626,7 @@
           <a:p>
             <a:fld id="{654FF092-CFE9-4329-97B3-D872B1066925}" type="datetimeFigureOut">
               <a:rPr lang="fr-FR" smtClean="0"/>
-              <a:t>12/06/2019</a:t>
+              <a:t>13/06/2019</a:t>
             </a:fld>
             <a:endParaRPr lang="fr-FR"/>
           </a:p>
@@ -1854,7 +1858,7 @@
           <a:p>
             <a:fld id="{654FF092-CFE9-4329-97B3-D872B1066925}" type="datetimeFigureOut">
               <a:rPr lang="fr-FR" smtClean="0"/>
-              <a:t>12/06/2019</a:t>
+              <a:t>13/06/2019</a:t>
             </a:fld>
             <a:endParaRPr lang="fr-FR"/>
           </a:p>
@@ -2221,7 +2225,7 @@
           <a:p>
             <a:fld id="{654FF092-CFE9-4329-97B3-D872B1066925}" type="datetimeFigureOut">
               <a:rPr lang="fr-FR" smtClean="0"/>
-              <a:t>12/06/2019</a:t>
+              <a:t>13/06/2019</a:t>
             </a:fld>
             <a:endParaRPr lang="fr-FR"/>
           </a:p>
@@ -2339,7 +2343,7 @@
           <a:p>
             <a:fld id="{654FF092-CFE9-4329-97B3-D872B1066925}" type="datetimeFigureOut">
               <a:rPr lang="fr-FR" smtClean="0"/>
-              <a:t>12/06/2019</a:t>
+              <a:t>13/06/2019</a:t>
             </a:fld>
             <a:endParaRPr lang="fr-FR"/>
           </a:p>
@@ -2434,7 +2438,7 @@
           <a:p>
             <a:fld id="{654FF092-CFE9-4329-97B3-D872B1066925}" type="datetimeFigureOut">
               <a:rPr lang="fr-FR" smtClean="0"/>
-              <a:t>12/06/2019</a:t>
+              <a:t>13/06/2019</a:t>
             </a:fld>
             <a:endParaRPr lang="fr-FR"/>
           </a:p>
@@ -2711,7 +2715,7 @@
           <a:p>
             <a:fld id="{654FF092-CFE9-4329-97B3-D872B1066925}" type="datetimeFigureOut">
               <a:rPr lang="fr-FR" smtClean="0"/>
-              <a:t>12/06/2019</a:t>
+              <a:t>13/06/2019</a:t>
             </a:fld>
             <a:endParaRPr lang="fr-FR"/>
           </a:p>
@@ -2968,7 +2972,7 @@
           <a:p>
             <a:fld id="{654FF092-CFE9-4329-97B3-D872B1066925}" type="datetimeFigureOut">
               <a:rPr lang="fr-FR" smtClean="0"/>
-              <a:t>12/06/2019</a:t>
+              <a:t>13/06/2019</a:t>
             </a:fld>
             <a:endParaRPr lang="fr-FR"/>
           </a:p>
@@ -3181,7 +3185,7 @@
           <a:p>
             <a:fld id="{654FF092-CFE9-4329-97B3-D872B1066925}" type="datetimeFigureOut">
               <a:rPr lang="fr-FR" smtClean="0"/>
-              <a:t>12/06/2019</a:t>
+              <a:t>13/06/2019</a:t>
             </a:fld>
             <a:endParaRPr lang="fr-FR"/>
           </a:p>
@@ -9046,6 +9050,257 @@
       </p:grpSpPr>
       <p:sp>
         <p:nvSpPr>
+          <p:cNvPr id="20" name="Sous-titre 2"/>
+          <p:cNvSpPr txBox="1">
+            <a:spLocks/>
+          </p:cNvSpPr>
+          <p:nvPr/>
+        </p:nvSpPr>
+        <p:spPr>
+          <a:xfrm>
+            <a:off x="3250752" y="3853440"/>
+            <a:ext cx="1658872" cy="1276467"/>
+          </a:xfrm>
+          <a:prstGeom prst="rect">
+            <a:avLst/>
+          </a:prstGeom>
+          <a:ln>
+            <a:solidFill>
+              <a:schemeClr val="tx1"/>
+            </a:solidFill>
+            <a:prstDash val="dash"/>
+          </a:ln>
+        </p:spPr>
+        <p:txBody>
+          <a:bodyPr vert="horz" lIns="91440" tIns="45720" rIns="91440" bIns="45720" rtlCol="0">
+            <a:noAutofit/>
+          </a:bodyPr>
+          <a:lstStyle>
+            <a:lvl1pPr marL="0" indent="0" algn="ctr" defTabSz="717530" rtl="0" eaLnBrk="1" latinLnBrk="0" hangingPunct="1">
+              <a:lnSpc>
+                <a:spcPct val="90000"/>
+              </a:lnSpc>
+              <a:spcBef>
+                <a:spcPts val="785"/>
+              </a:spcBef>
+              <a:buFont typeface="Arial" panose="020B0604020202020204" pitchFamily="34" charset="0"/>
+              <a:buNone/>
+              <a:defRPr sz="1883" kern="1200">
+                <a:solidFill>
+                  <a:schemeClr val="tx1"/>
+                </a:solidFill>
+                <a:latin typeface="+mn-lt"/>
+                <a:ea typeface="+mn-ea"/>
+                <a:cs typeface="+mn-cs"/>
+              </a:defRPr>
+            </a:lvl1pPr>
+            <a:lvl2pPr marL="358765" indent="0" algn="ctr" defTabSz="717530" rtl="0" eaLnBrk="1" latinLnBrk="0" hangingPunct="1">
+              <a:lnSpc>
+                <a:spcPct val="90000"/>
+              </a:lnSpc>
+              <a:spcBef>
+                <a:spcPts val="392"/>
+              </a:spcBef>
+              <a:buFont typeface="Arial" panose="020B0604020202020204" pitchFamily="34" charset="0"/>
+              <a:buNone/>
+              <a:defRPr sz="1569" kern="1200">
+                <a:solidFill>
+                  <a:schemeClr val="tx1"/>
+                </a:solidFill>
+                <a:latin typeface="+mn-lt"/>
+                <a:ea typeface="+mn-ea"/>
+                <a:cs typeface="+mn-cs"/>
+              </a:defRPr>
+            </a:lvl2pPr>
+            <a:lvl3pPr marL="717530" indent="0" algn="ctr" defTabSz="717530" rtl="0" eaLnBrk="1" latinLnBrk="0" hangingPunct="1">
+              <a:lnSpc>
+                <a:spcPct val="90000"/>
+              </a:lnSpc>
+              <a:spcBef>
+                <a:spcPts val="392"/>
+              </a:spcBef>
+              <a:buFont typeface="Arial" panose="020B0604020202020204" pitchFamily="34" charset="0"/>
+              <a:buNone/>
+              <a:defRPr sz="1412" kern="1200">
+                <a:solidFill>
+                  <a:schemeClr val="tx1"/>
+                </a:solidFill>
+                <a:latin typeface="+mn-lt"/>
+                <a:ea typeface="+mn-ea"/>
+                <a:cs typeface="+mn-cs"/>
+              </a:defRPr>
+            </a:lvl3pPr>
+            <a:lvl4pPr marL="1076295" indent="0" algn="ctr" defTabSz="717530" rtl="0" eaLnBrk="1" latinLnBrk="0" hangingPunct="1">
+              <a:lnSpc>
+                <a:spcPct val="90000"/>
+              </a:lnSpc>
+              <a:spcBef>
+                <a:spcPts val="392"/>
+              </a:spcBef>
+              <a:buFont typeface="Arial" panose="020B0604020202020204" pitchFamily="34" charset="0"/>
+              <a:buNone/>
+              <a:defRPr sz="1256" kern="1200">
+                <a:solidFill>
+                  <a:schemeClr val="tx1"/>
+                </a:solidFill>
+                <a:latin typeface="+mn-lt"/>
+                <a:ea typeface="+mn-ea"/>
+                <a:cs typeface="+mn-cs"/>
+              </a:defRPr>
+            </a:lvl4pPr>
+            <a:lvl5pPr marL="1435059" indent="0" algn="ctr" defTabSz="717530" rtl="0" eaLnBrk="1" latinLnBrk="0" hangingPunct="1">
+              <a:lnSpc>
+                <a:spcPct val="90000"/>
+              </a:lnSpc>
+              <a:spcBef>
+                <a:spcPts val="392"/>
+              </a:spcBef>
+              <a:buFont typeface="Arial" panose="020B0604020202020204" pitchFamily="34" charset="0"/>
+              <a:buNone/>
+              <a:defRPr sz="1256" kern="1200">
+                <a:solidFill>
+                  <a:schemeClr val="tx1"/>
+                </a:solidFill>
+                <a:latin typeface="+mn-lt"/>
+                <a:ea typeface="+mn-ea"/>
+                <a:cs typeface="+mn-cs"/>
+              </a:defRPr>
+            </a:lvl5pPr>
+            <a:lvl6pPr marL="1793824" indent="0" algn="ctr" defTabSz="717530" rtl="0" eaLnBrk="1" latinLnBrk="0" hangingPunct="1">
+              <a:lnSpc>
+                <a:spcPct val="90000"/>
+              </a:lnSpc>
+              <a:spcBef>
+                <a:spcPts val="392"/>
+              </a:spcBef>
+              <a:buFont typeface="Arial" panose="020B0604020202020204" pitchFamily="34" charset="0"/>
+              <a:buNone/>
+              <a:defRPr sz="1256" kern="1200">
+                <a:solidFill>
+                  <a:schemeClr val="tx1"/>
+                </a:solidFill>
+                <a:latin typeface="+mn-lt"/>
+                <a:ea typeface="+mn-ea"/>
+                <a:cs typeface="+mn-cs"/>
+              </a:defRPr>
+            </a:lvl6pPr>
+            <a:lvl7pPr marL="2152589" indent="0" algn="ctr" defTabSz="717530" rtl="0" eaLnBrk="1" latinLnBrk="0" hangingPunct="1">
+              <a:lnSpc>
+                <a:spcPct val="90000"/>
+              </a:lnSpc>
+              <a:spcBef>
+                <a:spcPts val="392"/>
+              </a:spcBef>
+              <a:buFont typeface="Arial" panose="020B0604020202020204" pitchFamily="34" charset="0"/>
+              <a:buNone/>
+              <a:defRPr sz="1256" kern="1200">
+                <a:solidFill>
+                  <a:schemeClr val="tx1"/>
+                </a:solidFill>
+                <a:latin typeface="+mn-lt"/>
+                <a:ea typeface="+mn-ea"/>
+                <a:cs typeface="+mn-cs"/>
+              </a:defRPr>
+            </a:lvl7pPr>
+            <a:lvl8pPr marL="2511354" indent="0" algn="ctr" defTabSz="717530" rtl="0" eaLnBrk="1" latinLnBrk="0" hangingPunct="1">
+              <a:lnSpc>
+                <a:spcPct val="90000"/>
+              </a:lnSpc>
+              <a:spcBef>
+                <a:spcPts val="392"/>
+              </a:spcBef>
+              <a:buFont typeface="Arial" panose="020B0604020202020204" pitchFamily="34" charset="0"/>
+              <a:buNone/>
+              <a:defRPr sz="1256" kern="1200">
+                <a:solidFill>
+                  <a:schemeClr val="tx1"/>
+                </a:solidFill>
+                <a:latin typeface="+mn-lt"/>
+                <a:ea typeface="+mn-ea"/>
+                <a:cs typeface="+mn-cs"/>
+              </a:defRPr>
+            </a:lvl8pPr>
+            <a:lvl9pPr marL="2870119" indent="0" algn="ctr" defTabSz="717530" rtl="0" eaLnBrk="1" latinLnBrk="0" hangingPunct="1">
+              <a:lnSpc>
+                <a:spcPct val="90000"/>
+              </a:lnSpc>
+              <a:spcBef>
+                <a:spcPts val="392"/>
+              </a:spcBef>
+              <a:buFont typeface="Arial" panose="020B0604020202020204" pitchFamily="34" charset="0"/>
+              <a:buNone/>
+              <a:defRPr sz="1256" kern="1200">
+                <a:solidFill>
+                  <a:schemeClr val="tx1"/>
+                </a:solidFill>
+                <a:latin typeface="+mn-lt"/>
+                <a:ea typeface="+mn-ea"/>
+                <a:cs typeface="+mn-cs"/>
+              </a:defRPr>
+            </a:lvl9pPr>
+          </a:lstStyle>
+          <a:p>
+            <a:pPr algn="l">
+              <a:lnSpc>
+                <a:spcPct val="135000"/>
+              </a:lnSpc>
+            </a:pPr>
+            <a:r>
+              <a:rPr lang="fr-FR" sz="750" b="1" dirty="0" err="1" smtClean="0">
+                <a:latin typeface="Stone Serif" pitchFamily="2" charset="0"/>
+              </a:rPr>
+              <a:t>Guardtime</a:t>
+            </a:r>
+            <a:r>
+              <a:rPr lang="fr-FR" sz="750" b="1" dirty="0" smtClean="0">
+                <a:latin typeface="Stone Serif" pitchFamily="2" charset="0"/>
+              </a:rPr>
+              <a:t> HSX </a:t>
+            </a:r>
+            <a:r>
+              <a:rPr lang="en-US" sz="750" dirty="0">
+                <a:latin typeface="Stone Serif" pitchFamily="2" charset="0"/>
+              </a:rPr>
+              <a:t>"</a:t>
+            </a:r>
+            <a:r>
+              <a:rPr lang="en-US" sz="750" dirty="0" smtClean="0">
+                <a:latin typeface="Stone Serif" pitchFamily="2" charset="0"/>
+              </a:rPr>
+              <a:t>bridges </a:t>
+            </a:r>
+            <a:r>
+              <a:rPr lang="en-US" sz="750" dirty="0">
+                <a:latin typeface="Stone Serif" pitchFamily="2" charset="0"/>
+              </a:rPr>
+              <a:t>the gap between patients, providers, payers, regulators and </a:t>
+            </a:r>
+            <a:r>
+              <a:rPr lang="en-US" sz="750" dirty="0" err="1">
+                <a:latin typeface="Stone Serif" pitchFamily="2" charset="0"/>
+              </a:rPr>
+              <a:t>pharma</a:t>
+            </a:r>
+            <a:r>
+              <a:rPr lang="en-US" sz="750" dirty="0">
+                <a:latin typeface="Stone Serif" pitchFamily="2" charset="0"/>
+              </a:rPr>
+              <a:t> by seamlessly transporting data across multiple healthcare stakeholders, delivering secure use of a single, truthful version of health data</a:t>
+            </a:r>
+            <a:r>
+              <a:rPr lang="en-US" sz="750" dirty="0" smtClean="0">
+                <a:latin typeface="Stone Serif" pitchFamily="2" charset="0"/>
+              </a:rPr>
+              <a:t>.”</a:t>
+            </a:r>
+            <a:endParaRPr lang="fr-FR" sz="750" dirty="0">
+              <a:latin typeface="Stone Serif" pitchFamily="2" charset="0"/>
+            </a:endParaRPr>
+          </a:p>
+        </p:txBody>
+      </p:sp>
+      <p:sp>
+        <p:nvSpPr>
           <p:cNvPr id="17" name="Sous-titre 2"/>
           <p:cNvSpPr txBox="1">
             <a:spLocks/>
@@ -9464,7 +9719,19 @@
               <a:rPr lang="en-US" sz="800" dirty="0">
                 <a:latin typeface="Stone Serif" pitchFamily="2" charset="0"/>
               </a:rPr>
-              <a:t> variants ("distributed ledgers"), implement and manage them, and create related services (certification, audit, marketplaces, etc.)</a:t>
+              <a:t> variants ("distributed </a:t>
+            </a:r>
+            <a:r>
+              <a:rPr lang="en-US" sz="800" dirty="0" smtClean="0">
+                <a:latin typeface="Stone Serif" pitchFamily="2" charset="0"/>
+              </a:rPr>
+              <a:t>ledgers“, “smart contracts”), </a:t>
+            </a:r>
+            <a:r>
+              <a:rPr lang="en-US" sz="800" dirty="0">
+                <a:latin typeface="Stone Serif" pitchFamily="2" charset="0"/>
+              </a:rPr>
+              <a:t>implement and manage them, and create related services (certification, audit, marketplaces, etc.)</a:t>
             </a:r>
             <a:endParaRPr lang="fr-FR" sz="800" dirty="0" smtClean="0">
               <a:latin typeface="Stone Serif" pitchFamily="2" charset="0"/>
@@ -10373,7 +10640,7 @@
       </p:sp>
       <p:sp>
         <p:nvSpPr>
-          <p:cNvPr id="23" name="Sous-titre 2"/>
+          <p:cNvPr id="24" name="Sous-titre 2"/>
           <p:cNvSpPr txBox="1">
             <a:spLocks/>
           </p:cNvSpPr>
@@ -10381,8 +10648,8 @@
         </p:nvSpPr>
         <p:spPr>
           <a:xfrm>
-            <a:off x="432368" y="3852847"/>
-            <a:ext cx="1311374" cy="1292778"/>
+            <a:off x="2152051" y="3846212"/>
+            <a:ext cx="1038179" cy="1276467"/>
           </a:xfrm>
           <a:prstGeom prst="rect">
             <a:avLst/>
@@ -10569,251 +10836,6 @@
               </a:lnSpc>
             </a:pPr>
             <a:r>
-              <a:rPr lang="en-US" sz="800" b="1" dirty="0" err="1">
-                <a:latin typeface="Stone Serif" pitchFamily="2" charset="0"/>
-              </a:rPr>
-              <a:t>Quantmetry</a:t>
-            </a:r>
-            <a:r>
-              <a:rPr lang="en-US" sz="800" b="1" dirty="0">
-                <a:latin typeface="Stone Serif" pitchFamily="2" charset="0"/>
-              </a:rPr>
-              <a:t> </a:t>
-            </a:r>
-            <a:r>
-              <a:rPr lang="en-US" sz="800" dirty="0">
-                <a:latin typeface="Stone Serif" pitchFamily="2" charset="0"/>
-              </a:rPr>
-              <a:t>uses the </a:t>
-            </a:r>
-            <a:r>
-              <a:rPr lang="en-US" sz="800" dirty="0" err="1">
-                <a:latin typeface="Stone Serif" pitchFamily="2" charset="0"/>
-              </a:rPr>
-              <a:t>blockchain</a:t>
-            </a:r>
-            <a:r>
-              <a:rPr lang="en-US" sz="800" dirty="0">
-                <a:latin typeface="Stone Serif" pitchFamily="2" charset="0"/>
-              </a:rPr>
-              <a:t> to ensure the transfer of assets (here, datasets) between stakeholders, without </a:t>
-            </a:r>
-            <a:r>
-              <a:rPr lang="en-US" sz="800" dirty="0" smtClean="0">
-                <a:latin typeface="Stone Serif" pitchFamily="2" charset="0"/>
-              </a:rPr>
-              <a:t>the need for trusted </a:t>
-            </a:r>
-            <a:r>
-              <a:rPr lang="en-US" sz="800" dirty="0">
-                <a:latin typeface="Stone Serif" pitchFamily="2" charset="0"/>
-              </a:rPr>
-              <a:t>third parties.</a:t>
-            </a:r>
-            <a:endParaRPr lang="fr-FR" sz="800" dirty="0">
-              <a:latin typeface="Stone Serif" pitchFamily="2" charset="0"/>
-            </a:endParaRPr>
-          </a:p>
-        </p:txBody>
-      </p:sp>
-      <p:sp>
-        <p:nvSpPr>
-          <p:cNvPr id="24" name="Sous-titre 2"/>
-          <p:cNvSpPr txBox="1">
-            <a:spLocks/>
-          </p:cNvSpPr>
-          <p:nvPr/>
-        </p:nvSpPr>
-        <p:spPr>
-          <a:xfrm>
-            <a:off x="3668954" y="3846212"/>
-            <a:ext cx="1073169" cy="1276467"/>
-          </a:xfrm>
-          <a:prstGeom prst="rect">
-            <a:avLst/>
-          </a:prstGeom>
-          <a:ln>
-            <a:solidFill>
-              <a:schemeClr val="tx1"/>
-            </a:solidFill>
-            <a:prstDash val="dash"/>
-          </a:ln>
-        </p:spPr>
-        <p:txBody>
-          <a:bodyPr vert="horz" lIns="91440" tIns="45720" rIns="91440" bIns="45720" rtlCol="0">
-            <a:normAutofit/>
-          </a:bodyPr>
-          <a:lstStyle>
-            <a:lvl1pPr marL="0" indent="0" algn="ctr" defTabSz="717530" rtl="0" eaLnBrk="1" latinLnBrk="0" hangingPunct="1">
-              <a:lnSpc>
-                <a:spcPct val="90000"/>
-              </a:lnSpc>
-              <a:spcBef>
-                <a:spcPts val="785"/>
-              </a:spcBef>
-              <a:buFont typeface="Arial" panose="020B0604020202020204" pitchFamily="34" charset="0"/>
-              <a:buNone/>
-              <a:defRPr sz="1883" kern="1200">
-                <a:solidFill>
-                  <a:schemeClr val="tx1"/>
-                </a:solidFill>
-                <a:latin typeface="+mn-lt"/>
-                <a:ea typeface="+mn-ea"/>
-                <a:cs typeface="+mn-cs"/>
-              </a:defRPr>
-            </a:lvl1pPr>
-            <a:lvl2pPr marL="358765" indent="0" algn="ctr" defTabSz="717530" rtl="0" eaLnBrk="1" latinLnBrk="0" hangingPunct="1">
-              <a:lnSpc>
-                <a:spcPct val="90000"/>
-              </a:lnSpc>
-              <a:spcBef>
-                <a:spcPts val="392"/>
-              </a:spcBef>
-              <a:buFont typeface="Arial" panose="020B0604020202020204" pitchFamily="34" charset="0"/>
-              <a:buNone/>
-              <a:defRPr sz="1569" kern="1200">
-                <a:solidFill>
-                  <a:schemeClr val="tx1"/>
-                </a:solidFill>
-                <a:latin typeface="+mn-lt"/>
-                <a:ea typeface="+mn-ea"/>
-                <a:cs typeface="+mn-cs"/>
-              </a:defRPr>
-            </a:lvl2pPr>
-            <a:lvl3pPr marL="717530" indent="0" algn="ctr" defTabSz="717530" rtl="0" eaLnBrk="1" latinLnBrk="0" hangingPunct="1">
-              <a:lnSpc>
-                <a:spcPct val="90000"/>
-              </a:lnSpc>
-              <a:spcBef>
-                <a:spcPts val="392"/>
-              </a:spcBef>
-              <a:buFont typeface="Arial" panose="020B0604020202020204" pitchFamily="34" charset="0"/>
-              <a:buNone/>
-              <a:defRPr sz="1412" kern="1200">
-                <a:solidFill>
-                  <a:schemeClr val="tx1"/>
-                </a:solidFill>
-                <a:latin typeface="+mn-lt"/>
-                <a:ea typeface="+mn-ea"/>
-                <a:cs typeface="+mn-cs"/>
-              </a:defRPr>
-            </a:lvl3pPr>
-            <a:lvl4pPr marL="1076295" indent="0" algn="ctr" defTabSz="717530" rtl="0" eaLnBrk="1" latinLnBrk="0" hangingPunct="1">
-              <a:lnSpc>
-                <a:spcPct val="90000"/>
-              </a:lnSpc>
-              <a:spcBef>
-                <a:spcPts val="392"/>
-              </a:spcBef>
-              <a:buFont typeface="Arial" panose="020B0604020202020204" pitchFamily="34" charset="0"/>
-              <a:buNone/>
-              <a:defRPr sz="1256" kern="1200">
-                <a:solidFill>
-                  <a:schemeClr val="tx1"/>
-                </a:solidFill>
-                <a:latin typeface="+mn-lt"/>
-                <a:ea typeface="+mn-ea"/>
-                <a:cs typeface="+mn-cs"/>
-              </a:defRPr>
-            </a:lvl4pPr>
-            <a:lvl5pPr marL="1435059" indent="0" algn="ctr" defTabSz="717530" rtl="0" eaLnBrk="1" latinLnBrk="0" hangingPunct="1">
-              <a:lnSpc>
-                <a:spcPct val="90000"/>
-              </a:lnSpc>
-              <a:spcBef>
-                <a:spcPts val="392"/>
-              </a:spcBef>
-              <a:buFont typeface="Arial" panose="020B0604020202020204" pitchFamily="34" charset="0"/>
-              <a:buNone/>
-              <a:defRPr sz="1256" kern="1200">
-                <a:solidFill>
-                  <a:schemeClr val="tx1"/>
-                </a:solidFill>
-                <a:latin typeface="+mn-lt"/>
-                <a:ea typeface="+mn-ea"/>
-                <a:cs typeface="+mn-cs"/>
-              </a:defRPr>
-            </a:lvl5pPr>
-            <a:lvl6pPr marL="1793824" indent="0" algn="ctr" defTabSz="717530" rtl="0" eaLnBrk="1" latinLnBrk="0" hangingPunct="1">
-              <a:lnSpc>
-                <a:spcPct val="90000"/>
-              </a:lnSpc>
-              <a:spcBef>
-                <a:spcPts val="392"/>
-              </a:spcBef>
-              <a:buFont typeface="Arial" panose="020B0604020202020204" pitchFamily="34" charset="0"/>
-              <a:buNone/>
-              <a:defRPr sz="1256" kern="1200">
-                <a:solidFill>
-                  <a:schemeClr val="tx1"/>
-                </a:solidFill>
-                <a:latin typeface="+mn-lt"/>
-                <a:ea typeface="+mn-ea"/>
-                <a:cs typeface="+mn-cs"/>
-              </a:defRPr>
-            </a:lvl6pPr>
-            <a:lvl7pPr marL="2152589" indent="0" algn="ctr" defTabSz="717530" rtl="0" eaLnBrk="1" latinLnBrk="0" hangingPunct="1">
-              <a:lnSpc>
-                <a:spcPct val="90000"/>
-              </a:lnSpc>
-              <a:spcBef>
-                <a:spcPts val="392"/>
-              </a:spcBef>
-              <a:buFont typeface="Arial" panose="020B0604020202020204" pitchFamily="34" charset="0"/>
-              <a:buNone/>
-              <a:defRPr sz="1256" kern="1200">
-                <a:solidFill>
-                  <a:schemeClr val="tx1"/>
-                </a:solidFill>
-                <a:latin typeface="+mn-lt"/>
-                <a:ea typeface="+mn-ea"/>
-                <a:cs typeface="+mn-cs"/>
-              </a:defRPr>
-            </a:lvl7pPr>
-            <a:lvl8pPr marL="2511354" indent="0" algn="ctr" defTabSz="717530" rtl="0" eaLnBrk="1" latinLnBrk="0" hangingPunct="1">
-              <a:lnSpc>
-                <a:spcPct val="90000"/>
-              </a:lnSpc>
-              <a:spcBef>
-                <a:spcPts val="392"/>
-              </a:spcBef>
-              <a:buFont typeface="Arial" panose="020B0604020202020204" pitchFamily="34" charset="0"/>
-              <a:buNone/>
-              <a:defRPr sz="1256" kern="1200">
-                <a:solidFill>
-                  <a:schemeClr val="tx1"/>
-                </a:solidFill>
-                <a:latin typeface="+mn-lt"/>
-                <a:ea typeface="+mn-ea"/>
-                <a:cs typeface="+mn-cs"/>
-              </a:defRPr>
-            </a:lvl8pPr>
-            <a:lvl9pPr marL="2870119" indent="0" algn="ctr" defTabSz="717530" rtl="0" eaLnBrk="1" latinLnBrk="0" hangingPunct="1">
-              <a:lnSpc>
-                <a:spcPct val="90000"/>
-              </a:lnSpc>
-              <a:spcBef>
-                <a:spcPts val="392"/>
-              </a:spcBef>
-              <a:buFont typeface="Arial" panose="020B0604020202020204" pitchFamily="34" charset="0"/>
-              <a:buNone/>
-              <a:defRPr sz="1256" kern="1200">
-                <a:solidFill>
-                  <a:schemeClr val="tx1"/>
-                </a:solidFill>
-                <a:latin typeface="+mn-lt"/>
-                <a:ea typeface="+mn-ea"/>
-                <a:cs typeface="+mn-cs"/>
-              </a:defRPr>
-            </a:lvl9pPr>
-          </a:lstStyle>
-          <a:p>
-            <a:pPr algn="l">
-              <a:lnSpc>
-                <a:spcPct val="135000"/>
-              </a:lnSpc>
-            </a:pPr>
-            <a:r>
               <a:rPr lang="fr-FR" sz="800" b="1" dirty="0" err="1" smtClean="0">
                 <a:latin typeface="Stone Serif" pitchFamily="2" charset="0"/>
               </a:rPr>
@@ -10889,8 +10911,8 @@
         </p:nvSpPr>
         <p:spPr>
           <a:xfrm>
-            <a:off x="1840155" y="3846268"/>
-            <a:ext cx="1732386" cy="1276411"/>
+            <a:off x="436663" y="3846268"/>
+            <a:ext cx="1654866" cy="1276411"/>
           </a:xfrm>
           <a:prstGeom prst="rect">
             <a:avLst/>
@@ -11168,8 +11190,8 @@
         </p:nvSpPr>
         <p:spPr>
           <a:xfrm>
-            <a:off x="432658" y="3572412"/>
-            <a:ext cx="4309466" cy="320857"/>
+            <a:off x="432657" y="3572412"/>
+            <a:ext cx="4500849" cy="320857"/>
           </a:xfrm>
           <a:prstGeom prst="rect">
             <a:avLst/>
@@ -11252,8 +11274,8 @@
         </p:nvSpPr>
         <p:spPr>
           <a:xfrm>
-            <a:off x="4880615" y="3824485"/>
-            <a:ext cx="2349525" cy="1298194"/>
+            <a:off x="5082363" y="3824485"/>
+            <a:ext cx="2147777" cy="1298194"/>
           </a:xfrm>
           <a:prstGeom prst="rect">
             <a:avLst/>
@@ -11516,8 +11538,8 @@
         </p:nvSpPr>
         <p:spPr>
           <a:xfrm>
-            <a:off x="4880617" y="3581066"/>
-            <a:ext cx="2349524" cy="279307"/>
+            <a:off x="5045149" y="3581066"/>
+            <a:ext cx="2184992" cy="279307"/>
           </a:xfrm>
           <a:prstGeom prst="rect">
             <a:avLst/>
@@ -13306,7 +13328,7 @@
               <a:t> digital infrastructure </a:t>
             </a:r>
             <a:r>
-              <a:rPr lang="fr-FR" sz="700" smtClean="0">
+              <a:rPr lang="fr-FR" sz="700" dirty="0" err="1" smtClean="0">
                 <a:latin typeface="Stone Serif" pitchFamily="2" charset="0"/>
               </a:rPr>
               <a:t>enabling</a:t>

</xml_diff>